<commit_message>
ppt e diagrama de classe
</commit_message>
<xml_diff>
--- a/Documentação/Apresentação - Sprint 3.pptx
+++ b/Documentação/Apresentação - Sprint 3.pptx
@@ -9,17 +9,19 @@
     <p:sldId id="281" r:id="rId3"/>
     <p:sldId id="297" r:id="rId4"/>
     <p:sldId id="298" r:id="rId5"/>
-    <p:sldId id="296" r:id="rId6"/>
-    <p:sldId id="295" r:id="rId7"/>
-    <p:sldId id="294" r:id="rId8"/>
-    <p:sldId id="292" r:id="rId9"/>
-    <p:sldId id="286" r:id="rId10"/>
-    <p:sldId id="291" r:id="rId11"/>
-    <p:sldId id="287" r:id="rId12"/>
-    <p:sldId id="289" r:id="rId13"/>
-    <p:sldId id="288" r:id="rId14"/>
-    <p:sldId id="299" r:id="rId15"/>
-    <p:sldId id="290" r:id="rId16"/>
+    <p:sldId id="264" r:id="rId6"/>
+    <p:sldId id="296" r:id="rId7"/>
+    <p:sldId id="295" r:id="rId8"/>
+    <p:sldId id="294" r:id="rId9"/>
+    <p:sldId id="292" r:id="rId10"/>
+    <p:sldId id="289" r:id="rId11"/>
+    <p:sldId id="286" r:id="rId12"/>
+    <p:sldId id="300" r:id="rId13"/>
+    <p:sldId id="287" r:id="rId14"/>
+    <p:sldId id="288" r:id="rId15"/>
+    <p:sldId id="291" r:id="rId16"/>
+    <p:sldId id="299" r:id="rId17"/>
+    <p:sldId id="290" r:id="rId18"/>
   </p:sldIdLst>
   <p:sldSz cx="12192000" cy="6858000"/>
   <p:notesSz cx="6858000" cy="9144000"/>
@@ -129,13 +131,175 @@
 <file path=ppt/revisionInfo.xml><?xml version="1.0" encoding="utf-8"?>
 <p1510:revInfo xmlns:a="http://schemas.openxmlformats.org/drawingml/2006/main" xmlns:r="http://schemas.openxmlformats.org/officeDocument/2006/relationships" xmlns:p1510="http://schemas.microsoft.com/office/powerpoint/2015/10/main">
   <p1510:revLst>
-    <p1510:client id="{BDD547D6-9985-4471-8D69-22FBC0393EC8}" v="79" dt="2020-06-13T13:07:58.915"/>
+    <p1510:client id="{DAECEB32-C126-44A1-B729-3AADB1682972}" v="34" dt="2020-06-16T20:16:32.863"/>
   </p1510:revLst>
 </p1510:revInfo>
 </file>
 
 <file path=ppt/changesInfos/changesInfo1.xml><?xml version="1.0" encoding="utf-8"?>
 <pc:chgInfo xmlns:a="http://schemas.openxmlformats.org/drawingml/2006/main" xmlns:r="http://schemas.openxmlformats.org/officeDocument/2006/relationships" xmlns:ac="http://schemas.microsoft.com/office/drawing/2013/main/command" xmlns:pc="http://schemas.microsoft.com/office/powerpoint/2013/main/command">
+  <pc:docChgLst>
+    <pc:chgData name="Fernando C Correa" userId="a08d7f3c16d54179" providerId="LiveId" clId="{DAECEB32-C126-44A1-B729-3AADB1682972}"/>
+    <pc:docChg chg="custSel addSld modSld sldOrd">
+      <pc:chgData name="Fernando C Correa" userId="a08d7f3c16d54179" providerId="LiveId" clId="{DAECEB32-C126-44A1-B729-3AADB1682972}" dt="2020-06-16T20:17:21.930" v="88"/>
+      <pc:docMkLst>
+        <pc:docMk/>
+      </pc:docMkLst>
+      <pc:sldChg chg="add">
+        <pc:chgData name="Fernando C Correa" userId="a08d7f3c16d54179" providerId="LiveId" clId="{DAECEB32-C126-44A1-B729-3AADB1682972}" dt="2020-06-16T20:16:32.859" v="78"/>
+        <pc:sldMkLst>
+          <pc:docMk/>
+          <pc:sldMk cId="0" sldId="264"/>
+        </pc:sldMkLst>
+      </pc:sldChg>
+      <pc:sldChg chg="ord">
+        <pc:chgData name="Fernando C Correa" userId="a08d7f3c16d54179" providerId="LiveId" clId="{DAECEB32-C126-44A1-B729-3AADB1682972}" dt="2020-06-16T20:17:18.293" v="86"/>
+        <pc:sldMkLst>
+          <pc:docMk/>
+          <pc:sldMk cId="2582316661" sldId="287"/>
+        </pc:sldMkLst>
+      </pc:sldChg>
+      <pc:sldChg chg="ord">
+        <pc:chgData name="Fernando C Correa" userId="a08d7f3c16d54179" providerId="LiveId" clId="{DAECEB32-C126-44A1-B729-3AADB1682972}" dt="2020-06-16T20:17:21.930" v="88"/>
+        <pc:sldMkLst>
+          <pc:docMk/>
+          <pc:sldMk cId="4264086694" sldId="288"/>
+        </pc:sldMkLst>
+      </pc:sldChg>
+      <pc:sldChg chg="ord">
+        <pc:chgData name="Fernando C Correa" userId="a08d7f3c16d54179" providerId="LiveId" clId="{DAECEB32-C126-44A1-B729-3AADB1682972}" dt="2020-06-16T20:17:08.568" v="84"/>
+        <pc:sldMkLst>
+          <pc:docMk/>
+          <pc:sldMk cId="1295663715" sldId="289"/>
+        </pc:sldMkLst>
+      </pc:sldChg>
+      <pc:sldChg chg="addSp delSp modSp mod">
+        <pc:chgData name="Fernando C Correa" userId="a08d7f3c16d54179" providerId="LiveId" clId="{DAECEB32-C126-44A1-B729-3AADB1682972}" dt="2020-06-16T20:15:12.102" v="77" actId="1076"/>
+        <pc:sldMkLst>
+          <pc:docMk/>
+          <pc:sldMk cId="1034810671" sldId="291"/>
+        </pc:sldMkLst>
+        <pc:picChg chg="add mod">
+          <ac:chgData name="Fernando C Correa" userId="a08d7f3c16d54179" providerId="LiveId" clId="{DAECEB32-C126-44A1-B729-3AADB1682972}" dt="2020-06-16T20:15:12.102" v="77" actId="1076"/>
+          <ac:picMkLst>
+            <pc:docMk/>
+            <pc:sldMk cId="1034810671" sldId="291"/>
+            <ac:picMk id="4" creationId="{1BED938E-3B90-421B-BA22-8FB3C8FFB03D}"/>
+          </ac:picMkLst>
+        </pc:picChg>
+        <pc:picChg chg="del">
+          <ac:chgData name="Fernando C Correa" userId="a08d7f3c16d54179" providerId="LiveId" clId="{DAECEB32-C126-44A1-B729-3AADB1682972}" dt="2020-06-16T20:14:54.021" v="73" actId="478"/>
+          <ac:picMkLst>
+            <pc:docMk/>
+            <pc:sldMk cId="1034810671" sldId="291"/>
+            <ac:picMk id="8" creationId="{3968D855-CD48-4E97-8B57-CF08A2ABD60F}"/>
+          </ac:picMkLst>
+        </pc:picChg>
+      </pc:sldChg>
+      <pc:sldChg chg="modSp mod">
+        <pc:chgData name="Fernando C Correa" userId="a08d7f3c16d54179" providerId="LiveId" clId="{DAECEB32-C126-44A1-B729-3AADB1682972}" dt="2020-06-16T19:52:42.001" v="66" actId="1076"/>
+        <pc:sldMkLst>
+          <pc:docMk/>
+          <pc:sldMk cId="3697814180" sldId="294"/>
+        </pc:sldMkLst>
+        <pc:picChg chg="mod">
+          <ac:chgData name="Fernando C Correa" userId="a08d7f3c16d54179" providerId="LiveId" clId="{DAECEB32-C126-44A1-B729-3AADB1682972}" dt="2020-06-16T19:52:42.001" v="66" actId="1076"/>
+          <ac:picMkLst>
+            <pc:docMk/>
+            <pc:sldMk cId="3697814180" sldId="294"/>
+            <ac:picMk id="8" creationId="{F57F7578-876D-417C-8950-659CF2829DCC}"/>
+          </ac:picMkLst>
+        </pc:picChg>
+      </pc:sldChg>
+      <pc:sldChg chg="addSp delSp modSp add mod ord">
+        <pc:chgData name="Fernando C Correa" userId="a08d7f3c16d54179" providerId="LiveId" clId="{DAECEB32-C126-44A1-B729-3AADB1682972}" dt="2020-06-16T19:56:19.861" v="72" actId="1076"/>
+        <pc:sldMkLst>
+          <pc:docMk/>
+          <pc:sldMk cId="2462845540" sldId="300"/>
+        </pc:sldMkLst>
+        <pc:spChg chg="mod">
+          <ac:chgData name="Fernando C Correa" userId="a08d7f3c16d54179" providerId="LiveId" clId="{DAECEB32-C126-44A1-B729-3AADB1682972}" dt="2020-06-16T19:49:40.835" v="46" actId="20577"/>
+          <ac:spMkLst>
+            <pc:docMk/>
+            <pc:sldMk cId="2462845540" sldId="300"/>
+            <ac:spMk id="2" creationId="{00000000-0000-0000-0000-000000000000}"/>
+          </ac:spMkLst>
+        </pc:spChg>
+        <pc:spChg chg="del">
+          <ac:chgData name="Fernando C Correa" userId="a08d7f3c16d54179" providerId="LiveId" clId="{DAECEB32-C126-44A1-B729-3AADB1682972}" dt="2020-06-16T19:48:00.487" v="20" actId="478"/>
+          <ac:spMkLst>
+            <pc:docMk/>
+            <pc:sldMk cId="2462845540" sldId="300"/>
+            <ac:spMk id="10" creationId="{00000000-0000-0000-0000-000000000000}"/>
+          </ac:spMkLst>
+        </pc:spChg>
+        <pc:picChg chg="add del mod">
+          <ac:chgData name="Fernando C Correa" userId="a08d7f3c16d54179" providerId="LiveId" clId="{DAECEB32-C126-44A1-B729-3AADB1682972}" dt="2020-06-16T19:46:05.066" v="4" actId="478"/>
+          <ac:picMkLst>
+            <pc:docMk/>
+            <pc:sldMk cId="2462845540" sldId="300"/>
+            <ac:picMk id="3" creationId="{B704A7BC-0A8A-4B1B-9D05-A4A66FDFBC36}"/>
+          </ac:picMkLst>
+        </pc:picChg>
+        <pc:picChg chg="add mod">
+          <ac:chgData name="Fernando C Correa" userId="a08d7f3c16d54179" providerId="LiveId" clId="{DAECEB32-C126-44A1-B729-3AADB1682972}" dt="2020-06-16T19:56:13.809" v="70" actId="1076"/>
+          <ac:picMkLst>
+            <pc:docMk/>
+            <pc:sldMk cId="2462845540" sldId="300"/>
+            <ac:picMk id="5" creationId="{05D0ED45-D674-4D1C-9168-43929F63670A}"/>
+          </ac:picMkLst>
+        </pc:picChg>
+        <pc:picChg chg="del">
+          <ac:chgData name="Fernando C Correa" userId="a08d7f3c16d54179" providerId="LiveId" clId="{DAECEB32-C126-44A1-B729-3AADB1682972}" dt="2020-06-16T19:45:58.530" v="1" actId="478"/>
+          <ac:picMkLst>
+            <pc:docMk/>
+            <pc:sldMk cId="2462845540" sldId="300"/>
+            <ac:picMk id="8" creationId="{F57F7578-876D-417C-8950-659CF2829DCC}"/>
+          </ac:picMkLst>
+        </pc:picChg>
+        <pc:picChg chg="add del mod">
+          <ac:chgData name="Fernando C Correa" userId="a08d7f3c16d54179" providerId="LiveId" clId="{DAECEB32-C126-44A1-B729-3AADB1682972}" dt="2020-06-16T19:56:06.768" v="68" actId="478"/>
+          <ac:picMkLst>
+            <pc:docMk/>
+            <pc:sldMk cId="2462845540" sldId="300"/>
+            <ac:picMk id="15" creationId="{0E85ABA3-1D94-4E56-A367-933CC7E51027}"/>
+          </ac:picMkLst>
+        </pc:picChg>
+        <pc:picChg chg="add del">
+          <ac:chgData name="Fernando C Correa" userId="a08d7f3c16d54179" providerId="LiveId" clId="{DAECEB32-C126-44A1-B729-3AADB1682972}" dt="2020-06-16T19:48:00.487" v="20" actId="478"/>
+          <ac:picMkLst>
+            <pc:docMk/>
+            <pc:sldMk cId="2462845540" sldId="300"/>
+            <ac:picMk id="1026" creationId="{1AE3563D-E69E-405F-8AE2-6C3F957B8582}"/>
+          </ac:picMkLst>
+        </pc:picChg>
+        <pc:picChg chg="add mod">
+          <ac:chgData name="Fernando C Correa" userId="a08d7f3c16d54179" providerId="LiveId" clId="{DAECEB32-C126-44A1-B729-3AADB1682972}" dt="2020-06-16T19:56:19.861" v="72" actId="1076"/>
+          <ac:picMkLst>
+            <pc:docMk/>
+            <pc:sldMk cId="2462845540" sldId="300"/>
+            <ac:picMk id="1028" creationId="{4D52BBEE-2B65-4A2C-8909-4A9068D56737}"/>
+          </ac:picMkLst>
+        </pc:picChg>
+        <pc:picChg chg="add mod">
+          <ac:chgData name="Fernando C Correa" userId="a08d7f3c16d54179" providerId="LiveId" clId="{DAECEB32-C126-44A1-B729-3AADB1682972}" dt="2020-06-16T19:56:17.750" v="71" actId="1076"/>
+          <ac:picMkLst>
+            <pc:docMk/>
+            <pc:sldMk cId="2462845540" sldId="300"/>
+            <ac:picMk id="1030" creationId="{5FA43E33-8005-4382-9B8C-63CBEE494F0D}"/>
+          </ac:picMkLst>
+        </pc:picChg>
+        <pc:picChg chg="add del mod">
+          <ac:chgData name="Fernando C Correa" userId="a08d7f3c16d54179" providerId="LiveId" clId="{DAECEB32-C126-44A1-B729-3AADB1682972}" dt="2020-06-16T19:56:06.022" v="67" actId="478"/>
+          <ac:picMkLst>
+            <pc:docMk/>
+            <pc:sldMk cId="2462845540" sldId="300"/>
+            <ac:picMk id="1032" creationId="{2D90E7C1-77A2-43FD-ACA3-C9E93D064031}"/>
+          </ac:picMkLst>
+        </pc:picChg>
+      </pc:sldChg>
+    </pc:docChg>
+  </pc:docChgLst>
   <pc:docChgLst>
     <pc:chgData name="Fernando C Correa" userId="a08d7f3c16d54179" providerId="LiveId" clId="{BDD547D6-9985-4471-8D69-22FBC0393EC8}"/>
     <pc:docChg chg="undo custSel mod addSld delSld modSld sldOrd">
@@ -25306,7 +25470,7 @@
           <a:p>
             <a:fld id="{25037C36-C8CA-4564-9B7E-8E9BA0061FB2}" type="datetimeFigureOut">
               <a:rPr lang="pt-BR" smtClean="0"/>
-              <a:t>13/06/2020</a:t>
+              <a:t>16/06/2020</a:t>
             </a:fld>
             <a:endParaRPr lang="pt-BR"/>
           </a:p>
@@ -25504,7 +25668,7 @@
           <a:p>
             <a:fld id="{25037C36-C8CA-4564-9B7E-8E9BA0061FB2}" type="datetimeFigureOut">
               <a:rPr lang="pt-BR" smtClean="0"/>
-              <a:t>13/06/2020</a:t>
+              <a:t>16/06/2020</a:t>
             </a:fld>
             <a:endParaRPr lang="pt-BR"/>
           </a:p>
@@ -25712,7 +25876,7 @@
           <a:p>
             <a:fld id="{25037C36-C8CA-4564-9B7E-8E9BA0061FB2}" type="datetimeFigureOut">
               <a:rPr lang="pt-BR" smtClean="0"/>
-              <a:t>13/06/2020</a:t>
+              <a:t>16/06/2020</a:t>
             </a:fld>
             <a:endParaRPr lang="pt-BR"/>
           </a:p>
@@ -25910,7 +26074,7 @@
           <a:p>
             <a:fld id="{25037C36-C8CA-4564-9B7E-8E9BA0061FB2}" type="datetimeFigureOut">
               <a:rPr lang="pt-BR" smtClean="0"/>
-              <a:t>13/06/2020</a:t>
+              <a:t>16/06/2020</a:t>
             </a:fld>
             <a:endParaRPr lang="pt-BR"/>
           </a:p>
@@ -26185,7 +26349,7 @@
           <a:p>
             <a:fld id="{25037C36-C8CA-4564-9B7E-8E9BA0061FB2}" type="datetimeFigureOut">
               <a:rPr lang="pt-BR" smtClean="0"/>
-              <a:t>13/06/2020</a:t>
+              <a:t>16/06/2020</a:t>
             </a:fld>
             <a:endParaRPr lang="pt-BR"/>
           </a:p>
@@ -26450,7 +26614,7 @@
           <a:p>
             <a:fld id="{25037C36-C8CA-4564-9B7E-8E9BA0061FB2}" type="datetimeFigureOut">
               <a:rPr lang="pt-BR" smtClean="0"/>
-              <a:t>13/06/2020</a:t>
+              <a:t>16/06/2020</a:t>
             </a:fld>
             <a:endParaRPr lang="pt-BR"/>
           </a:p>
@@ -26862,7 +27026,7 @@
           <a:p>
             <a:fld id="{25037C36-C8CA-4564-9B7E-8E9BA0061FB2}" type="datetimeFigureOut">
               <a:rPr lang="pt-BR" smtClean="0"/>
-              <a:t>13/06/2020</a:t>
+              <a:t>16/06/2020</a:t>
             </a:fld>
             <a:endParaRPr lang="pt-BR"/>
           </a:p>
@@ -27003,7 +27167,7 @@
           <a:p>
             <a:fld id="{25037C36-C8CA-4564-9B7E-8E9BA0061FB2}" type="datetimeFigureOut">
               <a:rPr lang="pt-BR" smtClean="0"/>
-              <a:t>13/06/2020</a:t>
+              <a:t>16/06/2020</a:t>
             </a:fld>
             <a:endParaRPr lang="pt-BR"/>
           </a:p>
@@ -27116,7 +27280,7 @@
           <a:p>
             <a:fld id="{25037C36-C8CA-4564-9B7E-8E9BA0061FB2}" type="datetimeFigureOut">
               <a:rPr lang="pt-BR" smtClean="0"/>
-              <a:t>13/06/2020</a:t>
+              <a:t>16/06/2020</a:t>
             </a:fld>
             <a:endParaRPr lang="pt-BR"/>
           </a:p>
@@ -27427,7 +27591,7 @@
           <a:p>
             <a:fld id="{25037C36-C8CA-4564-9B7E-8E9BA0061FB2}" type="datetimeFigureOut">
               <a:rPr lang="pt-BR" smtClean="0"/>
-              <a:t>13/06/2020</a:t>
+              <a:t>16/06/2020</a:t>
             </a:fld>
             <a:endParaRPr lang="pt-BR"/>
           </a:p>
@@ -27715,7 +27879,7 @@
           <a:p>
             <a:fld id="{25037C36-C8CA-4564-9B7E-8E9BA0061FB2}" type="datetimeFigureOut">
               <a:rPr lang="pt-BR" smtClean="0"/>
-              <a:t>13/06/2020</a:t>
+              <a:t>16/06/2020</a:t>
             </a:fld>
             <a:endParaRPr lang="pt-BR"/>
           </a:p>
@@ -27956,7 +28120,7 @@
           <a:p>
             <a:fld id="{25037C36-C8CA-4564-9B7E-8E9BA0061FB2}" type="datetimeFigureOut">
               <a:rPr lang="pt-BR" smtClean="0"/>
-              <a:t>13/06/2020</a:t>
+              <a:t>16/06/2020</a:t>
             </a:fld>
             <a:endParaRPr lang="pt-BR"/>
           </a:p>
@@ -28828,7 +28992,7 @@
           <a:p>
             <a:r>
               <a:rPr lang="pt-BR" dirty="0"/>
-              <a:t>Diagrama de Classe</a:t>
+              <a:t>Planilha de Software</a:t>
             </a:r>
           </a:p>
         </p:txBody>
@@ -29184,15 +29348,974 @@
       </p:grpSp>
       <p:pic>
         <p:nvPicPr>
-          <p:cNvPr id="8" name="Imagem 7" descr="Mapa colorido com texto preto sobre fundo branco&#10;&#10;Descrição gerada automaticamente">
+          <p:cNvPr id="11" name="Imagem 10">
             <a:extLst>
               <a:ext uri="{FF2B5EF4-FFF2-40B4-BE49-F238E27FC236}">
-                <a16:creationId xmlns:a16="http://schemas.microsoft.com/office/drawing/2014/main" id="{3968D855-CD48-4E97-8B57-CF08A2ABD60F}"/>
+                <a16:creationId xmlns:a16="http://schemas.microsoft.com/office/drawing/2014/main" id="{D1E3D129-AEE4-4620-B9D7-636720389400}"/>
               </a:ext>
             </a:extLst>
           </p:cNvPr>
           <p:cNvPicPr>
             <a:picLocks noChangeAspect="1"/>
+          </p:cNvPicPr>
+          <p:nvPr/>
+        </p:nvPicPr>
+        <p:blipFill>
+          <a:blip r:embed="rId2"/>
+          <a:stretch>
+            <a:fillRect/>
+          </a:stretch>
+        </p:blipFill>
+        <p:spPr>
+          <a:xfrm>
+            <a:off x="92363" y="2261470"/>
+            <a:ext cx="12007273" cy="2821818"/>
+          </a:xfrm>
+          <a:prstGeom prst="rect">
+            <a:avLst/>
+          </a:prstGeom>
+        </p:spPr>
+      </p:pic>
+    </p:spTree>
+    <p:extLst>
+      <p:ext uri="{BB962C8B-B14F-4D97-AF65-F5344CB8AC3E}">
+        <p14:creationId xmlns:p14="http://schemas.microsoft.com/office/powerpoint/2010/main" val="1295663715"/>
+      </p:ext>
+    </p:extLst>
+  </p:cSld>
+  <p:clrMapOvr>
+    <a:masterClrMapping/>
+  </p:clrMapOvr>
+</p:sld>
+</file>
+
+<file path=ppt/slides/slide11.xml><?xml version="1.0" encoding="utf-8"?>
+<p:sld xmlns:a="http://schemas.openxmlformats.org/drawingml/2006/main" xmlns:r="http://schemas.openxmlformats.org/officeDocument/2006/relationships" xmlns:p="http://schemas.openxmlformats.org/presentationml/2006/main">
+  <p:cSld>
+    <p:spTree>
+      <p:nvGrpSpPr>
+        <p:cNvPr id="1" name=""/>
+        <p:cNvGrpSpPr/>
+        <p:nvPr/>
+      </p:nvGrpSpPr>
+      <p:grpSpPr>
+        <a:xfrm>
+          <a:off x="0" y="0"/>
+          <a:ext cx="0" cy="0"/>
+          <a:chOff x="0" y="0"/>
+          <a:chExt cx="0" cy="0"/>
+        </a:xfrm>
+      </p:grpSpPr>
+      <p:sp>
+        <p:nvSpPr>
+          <p:cNvPr id="2" name="Título 1"/>
+          <p:cNvSpPr>
+            <a:spLocks noGrp="1"/>
+          </p:cNvSpPr>
+          <p:nvPr>
+            <p:ph type="title"/>
+          </p:nvPr>
+        </p:nvSpPr>
+        <p:spPr>
+          <a:xfrm>
+            <a:off x="1812897" y="518649"/>
+            <a:ext cx="9882278" cy="1067634"/>
+          </a:xfrm>
+        </p:spPr>
+        <p:txBody>
+          <a:bodyPr anchor="ctr">
+            <a:normAutofit/>
+          </a:bodyPr>
+          <a:lstStyle/>
+          <a:p>
+            <a:r>
+              <a:rPr lang="pt-BR" dirty="0" err="1"/>
+              <a:t>Product</a:t>
+            </a:r>
+            <a:r>
+              <a:rPr lang="pt-BR" dirty="0"/>
+              <a:t> / Sprint Backlog</a:t>
+            </a:r>
+          </a:p>
+        </p:txBody>
+      </p:sp>
+      <p:grpSp>
+        <p:nvGrpSpPr>
+          <p:cNvPr id="12" name="Group 11"/>
+          <p:cNvGrpSpPr>
+            <a:grpSpLocks noGrp="1" noUngrp="1" noRot="1" noChangeAspect="1" noMove="1" noResize="1"/>
+          </p:cNvGrpSpPr>
+          <p:nvPr/>
+        </p:nvGrpSpPr>
+        <p:grpSpPr>
+          <a:xfrm>
+            <a:off x="472021" y="628863"/>
+            <a:ext cx="1128382" cy="847206"/>
+            <a:chOff x="8183879" y="1000124"/>
+            <a:chExt cx="1562267" cy="1172973"/>
+          </a:xfrm>
+        </p:grpSpPr>
+        <p:sp>
+          <p:nvSpPr>
+            <p:cNvPr id="13" name="Freeform 5"/>
+            <p:cNvSpPr/>
+            <p:nvPr/>
+          </p:nvSpPr>
+          <p:spPr bwMode="auto">
+            <a:xfrm>
+              <a:off x="8183879" y="1348782"/>
+              <a:ext cx="935037" cy="824315"/>
+            </a:xfrm>
+            <a:custGeom>
+              <a:avLst/>
+              <a:gdLst>
+                <a:gd name="T0" fmla="*/ 225 w 785"/>
+                <a:gd name="T1" fmla="*/ 692 h 692"/>
+                <a:gd name="T2" fmla="*/ 177 w 785"/>
+                <a:gd name="T3" fmla="*/ 665 h 692"/>
+                <a:gd name="T4" fmla="*/ 9 w 785"/>
+                <a:gd name="T5" fmla="*/ 374 h 692"/>
+                <a:gd name="T6" fmla="*/ 9 w 785"/>
+                <a:gd name="T7" fmla="*/ 318 h 692"/>
+                <a:gd name="T8" fmla="*/ 177 w 785"/>
+                <a:gd name="T9" fmla="*/ 27 h 692"/>
+                <a:gd name="T10" fmla="*/ 225 w 785"/>
+                <a:gd name="T11" fmla="*/ 0 h 692"/>
+                <a:gd name="T12" fmla="*/ 561 w 785"/>
+                <a:gd name="T13" fmla="*/ 0 h 692"/>
+                <a:gd name="T14" fmla="*/ 609 w 785"/>
+                <a:gd name="T15" fmla="*/ 27 h 692"/>
+                <a:gd name="T16" fmla="*/ 777 w 785"/>
+                <a:gd name="T17" fmla="*/ 318 h 692"/>
+                <a:gd name="T18" fmla="*/ 777 w 785"/>
+                <a:gd name="T19" fmla="*/ 374 h 692"/>
+                <a:gd name="T20" fmla="*/ 609 w 785"/>
+                <a:gd name="T21" fmla="*/ 665 h 692"/>
+                <a:gd name="T22" fmla="*/ 561 w 785"/>
+                <a:gd name="T23" fmla="*/ 692 h 692"/>
+                <a:gd name="T24" fmla="*/ 225 w 785"/>
+                <a:gd name="T25" fmla="*/ 692 h 692"/>
+              </a:gdLst>
+              <a:ahLst/>
+              <a:cxnLst>
+                <a:cxn ang="0">
+                  <a:pos x="T0" y="T1"/>
+                </a:cxn>
+                <a:cxn ang="0">
+                  <a:pos x="T2" y="T3"/>
+                </a:cxn>
+                <a:cxn ang="0">
+                  <a:pos x="T4" y="T5"/>
+                </a:cxn>
+                <a:cxn ang="0">
+                  <a:pos x="T6" y="T7"/>
+                </a:cxn>
+                <a:cxn ang="0">
+                  <a:pos x="T8" y="T9"/>
+                </a:cxn>
+                <a:cxn ang="0">
+                  <a:pos x="T10" y="T11"/>
+                </a:cxn>
+                <a:cxn ang="0">
+                  <a:pos x="T12" y="T13"/>
+                </a:cxn>
+                <a:cxn ang="0">
+                  <a:pos x="T14" y="T15"/>
+                </a:cxn>
+                <a:cxn ang="0">
+                  <a:pos x="T16" y="T17"/>
+                </a:cxn>
+                <a:cxn ang="0">
+                  <a:pos x="T18" y="T19"/>
+                </a:cxn>
+                <a:cxn ang="0">
+                  <a:pos x="T20" y="T21"/>
+                </a:cxn>
+                <a:cxn ang="0">
+                  <a:pos x="T22" y="T23"/>
+                </a:cxn>
+                <a:cxn ang="0">
+                  <a:pos x="T24" y="T25"/>
+                </a:cxn>
+              </a:cxnLst>
+              <a:rect l="0" t="0" r="r" b="b"/>
+              <a:pathLst>
+                <a:path w="785" h="692">
+                  <a:moveTo>
+                    <a:pt x="225" y="692"/>
+                  </a:moveTo>
+                  <a:cubicBezTo>
+                    <a:pt x="207" y="692"/>
+                    <a:pt x="185" y="680"/>
+                    <a:pt x="177" y="665"/>
+                  </a:cubicBezTo>
+                  <a:cubicBezTo>
+                    <a:pt x="9" y="374"/>
+                    <a:pt x="9" y="374"/>
+                    <a:pt x="9" y="374"/>
+                  </a:cubicBezTo>
+                  <a:cubicBezTo>
+                    <a:pt x="0" y="358"/>
+                    <a:pt x="0" y="334"/>
+                    <a:pt x="9" y="318"/>
+                  </a:cubicBezTo>
+                  <a:cubicBezTo>
+                    <a:pt x="177" y="27"/>
+                    <a:pt x="177" y="27"/>
+                    <a:pt x="177" y="27"/>
+                  </a:cubicBezTo>
+                  <a:cubicBezTo>
+                    <a:pt x="185" y="12"/>
+                    <a:pt x="207" y="0"/>
+                    <a:pt x="225" y="0"/>
+                  </a:cubicBezTo>
+                  <a:cubicBezTo>
+                    <a:pt x="561" y="0"/>
+                    <a:pt x="561" y="0"/>
+                    <a:pt x="561" y="0"/>
+                  </a:cubicBezTo>
+                  <a:cubicBezTo>
+                    <a:pt x="578" y="0"/>
+                    <a:pt x="600" y="12"/>
+                    <a:pt x="609" y="27"/>
+                  </a:cubicBezTo>
+                  <a:cubicBezTo>
+                    <a:pt x="777" y="318"/>
+                    <a:pt x="777" y="318"/>
+                    <a:pt x="777" y="318"/>
+                  </a:cubicBezTo>
+                  <a:cubicBezTo>
+                    <a:pt x="785" y="334"/>
+                    <a:pt x="785" y="358"/>
+                    <a:pt x="777" y="374"/>
+                  </a:cubicBezTo>
+                  <a:cubicBezTo>
+                    <a:pt x="609" y="665"/>
+                    <a:pt x="609" y="665"/>
+                    <a:pt x="609" y="665"/>
+                  </a:cubicBezTo>
+                  <a:cubicBezTo>
+                    <a:pt x="600" y="680"/>
+                    <a:pt x="578" y="692"/>
+                    <a:pt x="561" y="692"/>
+                  </a:cubicBezTo>
+                  <a:lnTo>
+                    <a:pt x="225" y="692"/>
+                  </a:lnTo>
+                  <a:close/>
+                </a:path>
+              </a:pathLst>
+            </a:custGeom>
+            <a:noFill/>
+            <a:ln w="28575" cmpd="sng">
+              <a:solidFill>
+                <a:schemeClr val="tx1"/>
+              </a:solidFill>
+            </a:ln>
+          </p:spPr>
+          <p:txBody>
+            <a:bodyPr vert="horz" wrap="square" lIns="91440" tIns="45720" rIns="91440" bIns="45720" numCol="1" anchor="t" anchorCtr="0" compatLnSpc="1"/>
+            <a:lstStyle/>
+            <a:p>
+              <a:endParaRPr lang="en-US"/>
+            </a:p>
+          </p:txBody>
+        </p:sp>
+        <p:sp>
+          <p:nvSpPr>
+            <p:cNvPr id="14" name="Freeform 5"/>
+            <p:cNvSpPr/>
+            <p:nvPr/>
+          </p:nvSpPr>
+          <p:spPr bwMode="auto">
+            <a:xfrm>
+              <a:off x="8983979" y="1000124"/>
+              <a:ext cx="762167" cy="671915"/>
+            </a:xfrm>
+            <a:custGeom>
+              <a:avLst/>
+              <a:gdLst>
+                <a:gd name="T0" fmla="*/ 225 w 785"/>
+                <a:gd name="T1" fmla="*/ 692 h 692"/>
+                <a:gd name="T2" fmla="*/ 177 w 785"/>
+                <a:gd name="T3" fmla="*/ 665 h 692"/>
+                <a:gd name="T4" fmla="*/ 9 w 785"/>
+                <a:gd name="T5" fmla="*/ 374 h 692"/>
+                <a:gd name="T6" fmla="*/ 9 w 785"/>
+                <a:gd name="T7" fmla="*/ 318 h 692"/>
+                <a:gd name="T8" fmla="*/ 177 w 785"/>
+                <a:gd name="T9" fmla="*/ 27 h 692"/>
+                <a:gd name="T10" fmla="*/ 225 w 785"/>
+                <a:gd name="T11" fmla="*/ 0 h 692"/>
+                <a:gd name="T12" fmla="*/ 561 w 785"/>
+                <a:gd name="T13" fmla="*/ 0 h 692"/>
+                <a:gd name="T14" fmla="*/ 609 w 785"/>
+                <a:gd name="T15" fmla="*/ 27 h 692"/>
+                <a:gd name="T16" fmla="*/ 777 w 785"/>
+                <a:gd name="T17" fmla="*/ 318 h 692"/>
+                <a:gd name="T18" fmla="*/ 777 w 785"/>
+                <a:gd name="T19" fmla="*/ 374 h 692"/>
+                <a:gd name="T20" fmla="*/ 609 w 785"/>
+                <a:gd name="T21" fmla="*/ 665 h 692"/>
+                <a:gd name="T22" fmla="*/ 561 w 785"/>
+                <a:gd name="T23" fmla="*/ 692 h 692"/>
+                <a:gd name="T24" fmla="*/ 225 w 785"/>
+                <a:gd name="T25" fmla="*/ 692 h 692"/>
+              </a:gdLst>
+              <a:ahLst/>
+              <a:cxnLst>
+                <a:cxn ang="0">
+                  <a:pos x="T0" y="T1"/>
+                </a:cxn>
+                <a:cxn ang="0">
+                  <a:pos x="T2" y="T3"/>
+                </a:cxn>
+                <a:cxn ang="0">
+                  <a:pos x="T4" y="T5"/>
+                </a:cxn>
+                <a:cxn ang="0">
+                  <a:pos x="T6" y="T7"/>
+                </a:cxn>
+                <a:cxn ang="0">
+                  <a:pos x="T8" y="T9"/>
+                </a:cxn>
+                <a:cxn ang="0">
+                  <a:pos x="T10" y="T11"/>
+                </a:cxn>
+                <a:cxn ang="0">
+                  <a:pos x="T12" y="T13"/>
+                </a:cxn>
+                <a:cxn ang="0">
+                  <a:pos x="T14" y="T15"/>
+                </a:cxn>
+                <a:cxn ang="0">
+                  <a:pos x="T16" y="T17"/>
+                </a:cxn>
+                <a:cxn ang="0">
+                  <a:pos x="T18" y="T19"/>
+                </a:cxn>
+                <a:cxn ang="0">
+                  <a:pos x="T20" y="T21"/>
+                </a:cxn>
+                <a:cxn ang="0">
+                  <a:pos x="T22" y="T23"/>
+                </a:cxn>
+                <a:cxn ang="0">
+                  <a:pos x="T24" y="T25"/>
+                </a:cxn>
+              </a:cxnLst>
+              <a:rect l="0" t="0" r="r" b="b"/>
+              <a:pathLst>
+                <a:path w="785" h="692">
+                  <a:moveTo>
+                    <a:pt x="225" y="692"/>
+                  </a:moveTo>
+                  <a:cubicBezTo>
+                    <a:pt x="207" y="692"/>
+                    <a:pt x="185" y="680"/>
+                    <a:pt x="177" y="665"/>
+                  </a:cubicBezTo>
+                  <a:cubicBezTo>
+                    <a:pt x="9" y="374"/>
+                    <a:pt x="9" y="374"/>
+                    <a:pt x="9" y="374"/>
+                  </a:cubicBezTo>
+                  <a:cubicBezTo>
+                    <a:pt x="0" y="358"/>
+                    <a:pt x="0" y="334"/>
+                    <a:pt x="9" y="318"/>
+                  </a:cubicBezTo>
+                  <a:cubicBezTo>
+                    <a:pt x="177" y="27"/>
+                    <a:pt x="177" y="27"/>
+                    <a:pt x="177" y="27"/>
+                  </a:cubicBezTo>
+                  <a:cubicBezTo>
+                    <a:pt x="185" y="12"/>
+                    <a:pt x="207" y="0"/>
+                    <a:pt x="225" y="0"/>
+                  </a:cubicBezTo>
+                  <a:cubicBezTo>
+                    <a:pt x="561" y="0"/>
+                    <a:pt x="561" y="0"/>
+                    <a:pt x="561" y="0"/>
+                  </a:cubicBezTo>
+                  <a:cubicBezTo>
+                    <a:pt x="578" y="0"/>
+                    <a:pt x="600" y="12"/>
+                    <a:pt x="609" y="27"/>
+                  </a:cubicBezTo>
+                  <a:cubicBezTo>
+                    <a:pt x="777" y="318"/>
+                    <a:pt x="777" y="318"/>
+                    <a:pt x="777" y="318"/>
+                  </a:cubicBezTo>
+                  <a:cubicBezTo>
+                    <a:pt x="785" y="334"/>
+                    <a:pt x="785" y="358"/>
+                    <a:pt x="777" y="374"/>
+                  </a:cubicBezTo>
+                  <a:cubicBezTo>
+                    <a:pt x="609" y="665"/>
+                    <a:pt x="609" y="665"/>
+                    <a:pt x="609" y="665"/>
+                  </a:cubicBezTo>
+                  <a:cubicBezTo>
+                    <a:pt x="600" y="680"/>
+                    <a:pt x="578" y="692"/>
+                    <a:pt x="561" y="692"/>
+                  </a:cubicBezTo>
+                  <a:lnTo>
+                    <a:pt x="225" y="692"/>
+                  </a:lnTo>
+                  <a:close/>
+                </a:path>
+              </a:pathLst>
+            </a:custGeom>
+            <a:noFill/>
+            <a:ln w="28575" cmpd="sng">
+              <a:solidFill>
+                <a:schemeClr val="tx1"/>
+              </a:solidFill>
+            </a:ln>
+          </p:spPr>
+          <p:txBody>
+            <a:bodyPr vert="horz" wrap="square" lIns="91440" tIns="45720" rIns="91440" bIns="45720" numCol="1" anchor="t" anchorCtr="0" compatLnSpc="1"/>
+            <a:lstStyle/>
+            <a:p>
+              <a:endParaRPr lang="en-US"/>
+            </a:p>
+          </p:txBody>
+        </p:sp>
+      </p:grpSp>
+      <p:pic>
+        <p:nvPicPr>
+          <p:cNvPr id="11" name="Imagem 10">
+            <a:extLst>
+              <a:ext uri="{FF2B5EF4-FFF2-40B4-BE49-F238E27FC236}">
+                <a16:creationId xmlns:a16="http://schemas.microsoft.com/office/drawing/2014/main" id="{8F1A4823-8682-41E7-A5C1-1ABA20505B18}"/>
+              </a:ext>
+            </a:extLst>
+          </p:cNvPr>
+          <p:cNvPicPr>
+            <a:picLocks noChangeAspect="1"/>
+          </p:cNvPicPr>
+          <p:nvPr/>
+        </p:nvPicPr>
+        <p:blipFill>
+          <a:blip r:embed="rId2"/>
+          <a:stretch>
+            <a:fillRect/>
+          </a:stretch>
+        </p:blipFill>
+        <p:spPr>
+          <a:xfrm>
+            <a:off x="1994792" y="4571013"/>
+            <a:ext cx="8202408" cy="2102836"/>
+          </a:xfrm>
+          <a:prstGeom prst="rect">
+            <a:avLst/>
+          </a:prstGeom>
+        </p:spPr>
+      </p:pic>
+      <p:pic>
+        <p:nvPicPr>
+          <p:cNvPr id="15" name="Imagem 14">
+            <a:extLst>
+              <a:ext uri="{FF2B5EF4-FFF2-40B4-BE49-F238E27FC236}">
+                <a16:creationId xmlns:a16="http://schemas.microsoft.com/office/drawing/2014/main" id="{4E3D15D1-6C66-4859-8D2D-7DECB3E481F5}"/>
+              </a:ext>
+            </a:extLst>
+          </p:cNvPr>
+          <p:cNvPicPr>
+            <a:picLocks noChangeAspect="1"/>
+          </p:cNvPicPr>
+          <p:nvPr/>
+        </p:nvPicPr>
+        <p:blipFill>
+          <a:blip r:embed="rId3"/>
+          <a:stretch>
+            <a:fillRect/>
+          </a:stretch>
+        </p:blipFill>
+        <p:spPr>
+          <a:xfrm>
+            <a:off x="3643309" y="1586283"/>
+            <a:ext cx="4905375" cy="2001558"/>
+          </a:xfrm>
+          <a:prstGeom prst="rect">
+            <a:avLst/>
+          </a:prstGeom>
+        </p:spPr>
+      </p:pic>
+      <p:sp>
+        <p:nvSpPr>
+          <p:cNvPr id="6" name="Seta: para Baixo 5">
+            <a:extLst>
+              <a:ext uri="{FF2B5EF4-FFF2-40B4-BE49-F238E27FC236}">
+                <a16:creationId xmlns:a16="http://schemas.microsoft.com/office/drawing/2014/main" id="{C0FFF3D3-78AB-4F03-AEA3-F792F1C928B1}"/>
+              </a:ext>
+            </a:extLst>
+          </p:cNvPr>
+          <p:cNvSpPr/>
+          <p:nvPr/>
+        </p:nvSpPr>
+        <p:spPr>
+          <a:xfrm>
+            <a:off x="5872159" y="3679377"/>
+            <a:ext cx="447677" cy="800100"/>
+          </a:xfrm>
+          <a:prstGeom prst="downArrow">
+            <a:avLst/>
+          </a:prstGeom>
+          <a:solidFill>
+            <a:srgbClr val="92D050"/>
+          </a:solidFill>
+        </p:spPr>
+        <p:style>
+          <a:lnRef idx="2">
+            <a:schemeClr val="accent1">
+              <a:shade val="50000"/>
+            </a:schemeClr>
+          </a:lnRef>
+          <a:fillRef idx="1">
+            <a:schemeClr val="accent1"/>
+          </a:fillRef>
+          <a:effectRef idx="0">
+            <a:schemeClr val="accent1"/>
+          </a:effectRef>
+          <a:fontRef idx="minor">
+            <a:schemeClr val="lt1"/>
+          </a:fontRef>
+        </p:style>
+        <p:txBody>
+          <a:bodyPr rtlCol="0" anchor="ctr"/>
+          <a:lstStyle/>
+          <a:p>
+            <a:pPr algn="ctr"/>
+            <a:endParaRPr lang="pt-BR"/>
+          </a:p>
+        </p:txBody>
+      </p:sp>
+    </p:spTree>
+    <p:extLst>
+      <p:ext uri="{BB962C8B-B14F-4D97-AF65-F5344CB8AC3E}">
+        <p14:creationId xmlns:p14="http://schemas.microsoft.com/office/powerpoint/2010/main" val="1290913563"/>
+      </p:ext>
+    </p:extLst>
+  </p:cSld>
+  <p:clrMapOvr>
+    <a:masterClrMapping/>
+  </p:clrMapOvr>
+</p:sld>
+</file>
+
+<file path=ppt/slides/slide12.xml><?xml version="1.0" encoding="utf-8"?>
+<p:sld xmlns:a="http://schemas.openxmlformats.org/drawingml/2006/main" xmlns:r="http://schemas.openxmlformats.org/officeDocument/2006/relationships" xmlns:p="http://schemas.openxmlformats.org/presentationml/2006/main">
+  <p:cSld>
+    <p:spTree>
+      <p:nvGrpSpPr>
+        <p:cNvPr id="1" name=""/>
+        <p:cNvGrpSpPr/>
+        <p:nvPr/>
+      </p:nvGrpSpPr>
+      <p:grpSpPr>
+        <a:xfrm>
+          <a:off x="0" y="0"/>
+          <a:ext cx="0" cy="0"/>
+          <a:chOff x="0" y="0"/>
+          <a:chExt cx="0" cy="0"/>
+        </a:xfrm>
+      </p:grpSpPr>
+      <p:sp>
+        <p:nvSpPr>
+          <p:cNvPr id="2" name="Título 1"/>
+          <p:cNvSpPr>
+            <a:spLocks noGrp="1"/>
+          </p:cNvSpPr>
+          <p:nvPr>
+            <p:ph type="title"/>
+          </p:nvPr>
+        </p:nvSpPr>
+        <p:spPr>
+          <a:xfrm>
+            <a:off x="1812897" y="518649"/>
+            <a:ext cx="9882278" cy="1067634"/>
+          </a:xfrm>
+        </p:spPr>
+        <p:txBody>
+          <a:bodyPr anchor="ctr">
+            <a:normAutofit/>
+          </a:bodyPr>
+          <a:lstStyle/>
+          <a:p>
+            <a:r>
+              <a:rPr lang="pt-BR" dirty="0"/>
+              <a:t>Planejamento</a:t>
+            </a:r>
+          </a:p>
+        </p:txBody>
+      </p:sp>
+      <p:grpSp>
+        <p:nvGrpSpPr>
+          <p:cNvPr id="12" name="Group 11"/>
+          <p:cNvGrpSpPr>
+            <a:grpSpLocks noGrp="1" noUngrp="1" noRot="1" noChangeAspect="1" noMove="1" noResize="1"/>
+          </p:cNvGrpSpPr>
+          <p:nvPr/>
+        </p:nvGrpSpPr>
+        <p:grpSpPr>
+          <a:xfrm>
+            <a:off x="472021" y="628863"/>
+            <a:ext cx="1128382" cy="847206"/>
+            <a:chOff x="8183879" y="1000124"/>
+            <a:chExt cx="1562267" cy="1172973"/>
+          </a:xfrm>
+        </p:grpSpPr>
+        <p:sp>
+          <p:nvSpPr>
+            <p:cNvPr id="13" name="Freeform 5"/>
+            <p:cNvSpPr/>
+            <p:nvPr/>
+          </p:nvSpPr>
+          <p:spPr bwMode="auto">
+            <a:xfrm>
+              <a:off x="8183879" y="1348782"/>
+              <a:ext cx="935037" cy="824315"/>
+            </a:xfrm>
+            <a:custGeom>
+              <a:avLst/>
+              <a:gdLst>
+                <a:gd name="T0" fmla="*/ 225 w 785"/>
+                <a:gd name="T1" fmla="*/ 692 h 692"/>
+                <a:gd name="T2" fmla="*/ 177 w 785"/>
+                <a:gd name="T3" fmla="*/ 665 h 692"/>
+                <a:gd name="T4" fmla="*/ 9 w 785"/>
+                <a:gd name="T5" fmla="*/ 374 h 692"/>
+                <a:gd name="T6" fmla="*/ 9 w 785"/>
+                <a:gd name="T7" fmla="*/ 318 h 692"/>
+                <a:gd name="T8" fmla="*/ 177 w 785"/>
+                <a:gd name="T9" fmla="*/ 27 h 692"/>
+                <a:gd name="T10" fmla="*/ 225 w 785"/>
+                <a:gd name="T11" fmla="*/ 0 h 692"/>
+                <a:gd name="T12" fmla="*/ 561 w 785"/>
+                <a:gd name="T13" fmla="*/ 0 h 692"/>
+                <a:gd name="T14" fmla="*/ 609 w 785"/>
+                <a:gd name="T15" fmla="*/ 27 h 692"/>
+                <a:gd name="T16" fmla="*/ 777 w 785"/>
+                <a:gd name="T17" fmla="*/ 318 h 692"/>
+                <a:gd name="T18" fmla="*/ 777 w 785"/>
+                <a:gd name="T19" fmla="*/ 374 h 692"/>
+                <a:gd name="T20" fmla="*/ 609 w 785"/>
+                <a:gd name="T21" fmla="*/ 665 h 692"/>
+                <a:gd name="T22" fmla="*/ 561 w 785"/>
+                <a:gd name="T23" fmla="*/ 692 h 692"/>
+                <a:gd name="T24" fmla="*/ 225 w 785"/>
+                <a:gd name="T25" fmla="*/ 692 h 692"/>
+              </a:gdLst>
+              <a:ahLst/>
+              <a:cxnLst>
+                <a:cxn ang="0">
+                  <a:pos x="T0" y="T1"/>
+                </a:cxn>
+                <a:cxn ang="0">
+                  <a:pos x="T2" y="T3"/>
+                </a:cxn>
+                <a:cxn ang="0">
+                  <a:pos x="T4" y="T5"/>
+                </a:cxn>
+                <a:cxn ang="0">
+                  <a:pos x="T6" y="T7"/>
+                </a:cxn>
+                <a:cxn ang="0">
+                  <a:pos x="T8" y="T9"/>
+                </a:cxn>
+                <a:cxn ang="0">
+                  <a:pos x="T10" y="T11"/>
+                </a:cxn>
+                <a:cxn ang="0">
+                  <a:pos x="T12" y="T13"/>
+                </a:cxn>
+                <a:cxn ang="0">
+                  <a:pos x="T14" y="T15"/>
+                </a:cxn>
+                <a:cxn ang="0">
+                  <a:pos x="T16" y="T17"/>
+                </a:cxn>
+                <a:cxn ang="0">
+                  <a:pos x="T18" y="T19"/>
+                </a:cxn>
+                <a:cxn ang="0">
+                  <a:pos x="T20" y="T21"/>
+                </a:cxn>
+                <a:cxn ang="0">
+                  <a:pos x="T22" y="T23"/>
+                </a:cxn>
+                <a:cxn ang="0">
+                  <a:pos x="T24" y="T25"/>
+                </a:cxn>
+              </a:cxnLst>
+              <a:rect l="0" t="0" r="r" b="b"/>
+              <a:pathLst>
+                <a:path w="785" h="692">
+                  <a:moveTo>
+                    <a:pt x="225" y="692"/>
+                  </a:moveTo>
+                  <a:cubicBezTo>
+                    <a:pt x="207" y="692"/>
+                    <a:pt x="185" y="680"/>
+                    <a:pt x="177" y="665"/>
+                  </a:cubicBezTo>
+                  <a:cubicBezTo>
+                    <a:pt x="9" y="374"/>
+                    <a:pt x="9" y="374"/>
+                    <a:pt x="9" y="374"/>
+                  </a:cubicBezTo>
+                  <a:cubicBezTo>
+                    <a:pt x="0" y="358"/>
+                    <a:pt x="0" y="334"/>
+                    <a:pt x="9" y="318"/>
+                  </a:cubicBezTo>
+                  <a:cubicBezTo>
+                    <a:pt x="177" y="27"/>
+                    <a:pt x="177" y="27"/>
+                    <a:pt x="177" y="27"/>
+                  </a:cubicBezTo>
+                  <a:cubicBezTo>
+                    <a:pt x="185" y="12"/>
+                    <a:pt x="207" y="0"/>
+                    <a:pt x="225" y="0"/>
+                  </a:cubicBezTo>
+                  <a:cubicBezTo>
+                    <a:pt x="561" y="0"/>
+                    <a:pt x="561" y="0"/>
+                    <a:pt x="561" y="0"/>
+                  </a:cubicBezTo>
+                  <a:cubicBezTo>
+                    <a:pt x="578" y="0"/>
+                    <a:pt x="600" y="12"/>
+                    <a:pt x="609" y="27"/>
+                  </a:cubicBezTo>
+                  <a:cubicBezTo>
+                    <a:pt x="777" y="318"/>
+                    <a:pt x="777" y="318"/>
+                    <a:pt x="777" y="318"/>
+                  </a:cubicBezTo>
+                  <a:cubicBezTo>
+                    <a:pt x="785" y="334"/>
+                    <a:pt x="785" y="358"/>
+                    <a:pt x="777" y="374"/>
+                  </a:cubicBezTo>
+                  <a:cubicBezTo>
+                    <a:pt x="609" y="665"/>
+                    <a:pt x="609" y="665"/>
+                    <a:pt x="609" y="665"/>
+                  </a:cubicBezTo>
+                  <a:cubicBezTo>
+                    <a:pt x="600" y="680"/>
+                    <a:pt x="578" y="692"/>
+                    <a:pt x="561" y="692"/>
+                  </a:cubicBezTo>
+                  <a:lnTo>
+                    <a:pt x="225" y="692"/>
+                  </a:lnTo>
+                  <a:close/>
+                </a:path>
+              </a:pathLst>
+            </a:custGeom>
+            <a:noFill/>
+            <a:ln w="28575" cmpd="sng">
+              <a:solidFill>
+                <a:schemeClr val="tx1"/>
+              </a:solidFill>
+            </a:ln>
+          </p:spPr>
+          <p:txBody>
+            <a:bodyPr vert="horz" wrap="square" lIns="91440" tIns="45720" rIns="91440" bIns="45720" numCol="1" anchor="t" anchorCtr="0" compatLnSpc="1"/>
+            <a:lstStyle/>
+            <a:p>
+              <a:endParaRPr lang="en-US"/>
+            </a:p>
+          </p:txBody>
+        </p:sp>
+        <p:sp>
+          <p:nvSpPr>
+            <p:cNvPr id="14" name="Freeform 5"/>
+            <p:cNvSpPr/>
+            <p:nvPr/>
+          </p:nvSpPr>
+          <p:spPr bwMode="auto">
+            <a:xfrm>
+              <a:off x="8983979" y="1000124"/>
+              <a:ext cx="762167" cy="671915"/>
+            </a:xfrm>
+            <a:custGeom>
+              <a:avLst/>
+              <a:gdLst>
+                <a:gd name="T0" fmla="*/ 225 w 785"/>
+                <a:gd name="T1" fmla="*/ 692 h 692"/>
+                <a:gd name="T2" fmla="*/ 177 w 785"/>
+                <a:gd name="T3" fmla="*/ 665 h 692"/>
+                <a:gd name="T4" fmla="*/ 9 w 785"/>
+                <a:gd name="T5" fmla="*/ 374 h 692"/>
+                <a:gd name="T6" fmla="*/ 9 w 785"/>
+                <a:gd name="T7" fmla="*/ 318 h 692"/>
+                <a:gd name="T8" fmla="*/ 177 w 785"/>
+                <a:gd name="T9" fmla="*/ 27 h 692"/>
+                <a:gd name="T10" fmla="*/ 225 w 785"/>
+                <a:gd name="T11" fmla="*/ 0 h 692"/>
+                <a:gd name="T12" fmla="*/ 561 w 785"/>
+                <a:gd name="T13" fmla="*/ 0 h 692"/>
+                <a:gd name="T14" fmla="*/ 609 w 785"/>
+                <a:gd name="T15" fmla="*/ 27 h 692"/>
+                <a:gd name="T16" fmla="*/ 777 w 785"/>
+                <a:gd name="T17" fmla="*/ 318 h 692"/>
+                <a:gd name="T18" fmla="*/ 777 w 785"/>
+                <a:gd name="T19" fmla="*/ 374 h 692"/>
+                <a:gd name="T20" fmla="*/ 609 w 785"/>
+                <a:gd name="T21" fmla="*/ 665 h 692"/>
+                <a:gd name="T22" fmla="*/ 561 w 785"/>
+                <a:gd name="T23" fmla="*/ 692 h 692"/>
+                <a:gd name="T24" fmla="*/ 225 w 785"/>
+                <a:gd name="T25" fmla="*/ 692 h 692"/>
+              </a:gdLst>
+              <a:ahLst/>
+              <a:cxnLst>
+                <a:cxn ang="0">
+                  <a:pos x="T0" y="T1"/>
+                </a:cxn>
+                <a:cxn ang="0">
+                  <a:pos x="T2" y="T3"/>
+                </a:cxn>
+                <a:cxn ang="0">
+                  <a:pos x="T4" y="T5"/>
+                </a:cxn>
+                <a:cxn ang="0">
+                  <a:pos x="T6" y="T7"/>
+                </a:cxn>
+                <a:cxn ang="0">
+                  <a:pos x="T8" y="T9"/>
+                </a:cxn>
+                <a:cxn ang="0">
+                  <a:pos x="T10" y="T11"/>
+                </a:cxn>
+                <a:cxn ang="0">
+                  <a:pos x="T12" y="T13"/>
+                </a:cxn>
+                <a:cxn ang="0">
+                  <a:pos x="T14" y="T15"/>
+                </a:cxn>
+                <a:cxn ang="0">
+                  <a:pos x="T16" y="T17"/>
+                </a:cxn>
+                <a:cxn ang="0">
+                  <a:pos x="T18" y="T19"/>
+                </a:cxn>
+                <a:cxn ang="0">
+                  <a:pos x="T20" y="T21"/>
+                </a:cxn>
+                <a:cxn ang="0">
+                  <a:pos x="T22" y="T23"/>
+                </a:cxn>
+                <a:cxn ang="0">
+                  <a:pos x="T24" y="T25"/>
+                </a:cxn>
+              </a:cxnLst>
+              <a:rect l="0" t="0" r="r" b="b"/>
+              <a:pathLst>
+                <a:path w="785" h="692">
+                  <a:moveTo>
+                    <a:pt x="225" y="692"/>
+                  </a:moveTo>
+                  <a:cubicBezTo>
+                    <a:pt x="207" y="692"/>
+                    <a:pt x="185" y="680"/>
+                    <a:pt x="177" y="665"/>
+                  </a:cubicBezTo>
+                  <a:cubicBezTo>
+                    <a:pt x="9" y="374"/>
+                    <a:pt x="9" y="374"/>
+                    <a:pt x="9" y="374"/>
+                  </a:cubicBezTo>
+                  <a:cubicBezTo>
+                    <a:pt x="0" y="358"/>
+                    <a:pt x="0" y="334"/>
+                    <a:pt x="9" y="318"/>
+                  </a:cubicBezTo>
+                  <a:cubicBezTo>
+                    <a:pt x="177" y="27"/>
+                    <a:pt x="177" y="27"/>
+                    <a:pt x="177" y="27"/>
+                  </a:cubicBezTo>
+                  <a:cubicBezTo>
+                    <a:pt x="185" y="12"/>
+                    <a:pt x="207" y="0"/>
+                    <a:pt x="225" y="0"/>
+                  </a:cubicBezTo>
+                  <a:cubicBezTo>
+                    <a:pt x="561" y="0"/>
+                    <a:pt x="561" y="0"/>
+                    <a:pt x="561" y="0"/>
+                  </a:cubicBezTo>
+                  <a:cubicBezTo>
+                    <a:pt x="578" y="0"/>
+                    <a:pt x="600" y="12"/>
+                    <a:pt x="609" y="27"/>
+                  </a:cubicBezTo>
+                  <a:cubicBezTo>
+                    <a:pt x="777" y="318"/>
+                    <a:pt x="777" y="318"/>
+                    <a:pt x="777" y="318"/>
+                  </a:cubicBezTo>
+                  <a:cubicBezTo>
+                    <a:pt x="785" y="334"/>
+                    <a:pt x="785" y="358"/>
+                    <a:pt x="777" y="374"/>
+                  </a:cubicBezTo>
+                  <a:cubicBezTo>
+                    <a:pt x="609" y="665"/>
+                    <a:pt x="609" y="665"/>
+                    <a:pt x="609" y="665"/>
+                  </a:cubicBezTo>
+                  <a:cubicBezTo>
+                    <a:pt x="600" y="680"/>
+                    <a:pt x="578" y="692"/>
+                    <a:pt x="561" y="692"/>
+                  </a:cubicBezTo>
+                  <a:lnTo>
+                    <a:pt x="225" y="692"/>
+                  </a:lnTo>
+                  <a:close/>
+                </a:path>
+              </a:pathLst>
+            </a:custGeom>
+            <a:noFill/>
+            <a:ln w="28575" cmpd="sng">
+              <a:solidFill>
+                <a:schemeClr val="tx1"/>
+              </a:solidFill>
+            </a:ln>
+          </p:spPr>
+          <p:txBody>
+            <a:bodyPr vert="horz" wrap="square" lIns="91440" tIns="45720" rIns="91440" bIns="45720" numCol="1" anchor="t" anchorCtr="0" compatLnSpc="1"/>
+            <a:lstStyle/>
+            <a:p>
+              <a:endParaRPr lang="en-US"/>
+            </a:p>
+          </p:txBody>
+        </p:sp>
+      </p:grpSp>
+      <p:pic>
+        <p:nvPicPr>
+          <p:cNvPr id="1028" name="Picture 4" descr="Discord Icon for Metro UI Icon Set by Craftplacer on DeviantArt">
+            <a:extLst>
+              <a:ext uri="{FF2B5EF4-FFF2-40B4-BE49-F238E27FC236}">
+                <a16:creationId xmlns:a16="http://schemas.microsoft.com/office/drawing/2014/main" id="{4D52BBEE-2B65-4A2C-8909-4A9068D56737}"/>
+              </a:ext>
+            </a:extLst>
+          </p:cNvPr>
+          <p:cNvPicPr>
+            <a:picLocks noChangeAspect="1" noChangeArrowheads="1"/>
           </p:cNvPicPr>
           <p:nvPr/>
         </p:nvPicPr>
@@ -29204,14 +30327,111 @@
               </a:ext>
             </a:extLst>
           </a:blip>
+          <a:srcRect/>
+          <a:stretch>
+            <a:fillRect/>
+          </a:stretch>
+        </p:blipFill>
+        <p:spPr bwMode="auto">
+          <a:xfrm>
+            <a:off x="7408287" y="2742295"/>
+            <a:ext cx="1373405" cy="1373405"/>
+          </a:xfrm>
+          <a:prstGeom prst="rect">
+            <a:avLst/>
+          </a:prstGeom>
+          <a:noFill/>
+          <a:extLst>
+            <a:ext uri="{909E8E84-426E-40DD-AFC4-6F175D3DCCD1}">
+              <a14:hiddenFill xmlns:a14="http://schemas.microsoft.com/office/drawing/2010/main">
+                <a:solidFill>
+                  <a:srgbClr val="FFFFFF"/>
+                </a:solidFill>
+              </a14:hiddenFill>
+            </a:ext>
+          </a:extLst>
+        </p:spPr>
+      </p:pic>
+      <p:pic>
+        <p:nvPicPr>
+          <p:cNvPr id="1030" name="Picture 6" descr="Planner - Free logo icons">
+            <a:extLst>
+              <a:ext uri="{FF2B5EF4-FFF2-40B4-BE49-F238E27FC236}">
+                <a16:creationId xmlns:a16="http://schemas.microsoft.com/office/drawing/2014/main" id="{5FA43E33-8005-4382-9B8C-63CBEE494F0D}"/>
+              </a:ext>
+            </a:extLst>
+          </p:cNvPr>
+          <p:cNvPicPr>
+            <a:picLocks noChangeAspect="1" noChangeArrowheads="1"/>
+          </p:cNvPicPr>
+          <p:nvPr/>
+        </p:nvPicPr>
+        <p:blipFill>
+          <a:blip r:embed="rId3">
+            <a:extLst>
+              <a:ext uri="{28A0092B-C50C-407E-A947-70E740481C1C}">
+                <a14:useLocalDpi xmlns:a14="http://schemas.microsoft.com/office/drawing/2010/main" val="0"/>
+              </a:ext>
+            </a:extLst>
+          </a:blip>
+          <a:srcRect/>
+          <a:stretch>
+            <a:fillRect/>
+          </a:stretch>
+        </p:blipFill>
+        <p:spPr bwMode="auto">
+          <a:xfrm>
+            <a:off x="3410309" y="2742295"/>
+            <a:ext cx="1373404" cy="1373404"/>
+          </a:xfrm>
+          <a:prstGeom prst="rect">
+            <a:avLst/>
+          </a:prstGeom>
+          <a:noFill/>
+          <a:extLst>
+            <a:ext uri="{909E8E84-426E-40DD-AFC4-6F175D3DCCD1}">
+              <a14:hiddenFill xmlns:a14="http://schemas.microsoft.com/office/drawing/2010/main">
+                <a:solidFill>
+                  <a:srgbClr val="FFFFFF"/>
+                </a:solidFill>
+              </a14:hiddenFill>
+            </a:ext>
+          </a:extLst>
+        </p:spPr>
+      </p:pic>
+      <p:pic>
+        <p:nvPicPr>
+          <p:cNvPr id="5" name="Gráfico 4" descr="Adicionar">
+            <a:extLst>
+              <a:ext uri="{FF2B5EF4-FFF2-40B4-BE49-F238E27FC236}">
+                <a16:creationId xmlns:a16="http://schemas.microsoft.com/office/drawing/2014/main" id="{05D0ED45-D674-4D1C-9168-43929F63670A}"/>
+              </a:ext>
+            </a:extLst>
+          </p:cNvPr>
+          <p:cNvPicPr>
+            <a:picLocks noChangeAspect="1"/>
+          </p:cNvPicPr>
+          <p:nvPr/>
+        </p:nvPicPr>
+        <p:blipFill>
+          <a:blip r:embed="rId4">
+            <a:extLst>
+              <a:ext uri="{28A0092B-C50C-407E-A947-70E740481C1C}">
+                <a14:useLocalDpi xmlns:a14="http://schemas.microsoft.com/office/drawing/2010/main" val="0"/>
+              </a:ext>
+              <a:ext uri="{96DAC541-7B7A-43D3-8B79-37D633B846F1}">
+                <asvg:svgBlip xmlns:asvg="http://schemas.microsoft.com/office/drawing/2016/SVG/main" r:embed="rId5"/>
+              </a:ext>
+            </a:extLst>
+          </a:blip>
           <a:stretch>
             <a:fillRect/>
           </a:stretch>
         </p:blipFill>
         <p:spPr>
           <a:xfrm>
-            <a:off x="2052637" y="1947750"/>
-            <a:ext cx="8086725" cy="4548783"/>
+            <a:off x="5638800" y="2971797"/>
+            <a:ext cx="914400" cy="914400"/>
           </a:xfrm>
           <a:prstGeom prst="rect">
             <a:avLst/>
@@ -29221,7 +30441,7 @@
     </p:spTree>
     <p:extLst>
       <p:ext uri="{BB962C8B-B14F-4D97-AF65-F5344CB8AC3E}">
-        <p14:creationId xmlns:p14="http://schemas.microsoft.com/office/powerpoint/2010/main" val="1034810671"/>
+        <p14:creationId xmlns:p14="http://schemas.microsoft.com/office/powerpoint/2010/main" val="2462845540"/>
       </p:ext>
     </p:extLst>
   </p:cSld>
@@ -29231,7 +30451,7 @@
 </p:sld>
 </file>
 
-<file path=ppt/slides/slide11.xml><?xml version="1.0" encoding="utf-8"?>
+<file path=ppt/slides/slide13.xml><?xml version="1.0" encoding="utf-8"?>
 <p:sld xmlns:a="http://schemas.openxmlformats.org/drawingml/2006/main" xmlns:r="http://schemas.openxmlformats.org/officeDocument/2006/relationships" xmlns:p="http://schemas.openxmlformats.org/presentationml/2006/main">
   <p:cSld>
     <p:spTree>
@@ -29720,490 +30940,7 @@
 </p:sld>
 </file>
 
-<file path=ppt/slides/slide12.xml><?xml version="1.0" encoding="utf-8"?>
-<p:sld xmlns:a="http://schemas.openxmlformats.org/drawingml/2006/main" xmlns:r="http://schemas.openxmlformats.org/officeDocument/2006/relationships" xmlns:p="http://schemas.openxmlformats.org/presentationml/2006/main">
-  <p:cSld>
-    <p:spTree>
-      <p:nvGrpSpPr>
-        <p:cNvPr id="1" name=""/>
-        <p:cNvGrpSpPr/>
-        <p:nvPr/>
-      </p:nvGrpSpPr>
-      <p:grpSpPr>
-        <a:xfrm>
-          <a:off x="0" y="0"/>
-          <a:ext cx="0" cy="0"/>
-          <a:chOff x="0" y="0"/>
-          <a:chExt cx="0" cy="0"/>
-        </a:xfrm>
-      </p:grpSpPr>
-      <p:sp useBgFill="1">
-        <p:nvSpPr>
-          <p:cNvPr id="10" name="Rectangle 9"/>
-          <p:cNvSpPr>
-            <a:spLocks noGrp="1" noRot="1" noChangeAspect="1" noMove="1" noResize="1" noEditPoints="1" noAdjustHandles="1" noChangeArrowheads="1" noChangeShapeType="1" noTextEdit="1"/>
-          </p:cNvSpPr>
-          <p:nvPr/>
-        </p:nvSpPr>
-        <p:spPr>
-          <a:xfrm>
-            <a:off x="0" y="0"/>
-            <a:ext cx="12192000" cy="6858000"/>
-          </a:xfrm>
-          <a:prstGeom prst="rect">
-            <a:avLst/>
-          </a:prstGeom>
-          <a:ln>
-            <a:noFill/>
-          </a:ln>
-        </p:spPr>
-        <p:style>
-          <a:lnRef idx="2">
-            <a:schemeClr val="accent1">
-              <a:shade val="50000"/>
-            </a:schemeClr>
-          </a:lnRef>
-          <a:fillRef idx="1">
-            <a:schemeClr val="accent1"/>
-          </a:fillRef>
-          <a:effectRef idx="0">
-            <a:schemeClr val="accent1"/>
-          </a:effectRef>
-          <a:fontRef idx="minor">
-            <a:schemeClr val="lt1"/>
-          </a:fontRef>
-        </p:style>
-        <p:txBody>
-          <a:bodyPr rtlCol="0" anchor="ctr"/>
-          <a:lstStyle/>
-          <a:p>
-            <a:pPr algn="ctr"/>
-            <a:endParaRPr lang="en-US" dirty="0"/>
-          </a:p>
-        </p:txBody>
-      </p:sp>
-      <p:sp>
-        <p:nvSpPr>
-          <p:cNvPr id="2" name="Título 1"/>
-          <p:cNvSpPr>
-            <a:spLocks noGrp="1"/>
-          </p:cNvSpPr>
-          <p:nvPr>
-            <p:ph type="title"/>
-          </p:nvPr>
-        </p:nvSpPr>
-        <p:spPr>
-          <a:xfrm>
-            <a:off x="1812897" y="518649"/>
-            <a:ext cx="9882278" cy="1067634"/>
-          </a:xfrm>
-        </p:spPr>
-        <p:txBody>
-          <a:bodyPr anchor="ctr">
-            <a:normAutofit/>
-          </a:bodyPr>
-          <a:lstStyle/>
-          <a:p>
-            <a:r>
-              <a:rPr lang="pt-BR" dirty="0"/>
-              <a:t>Planilha de Software</a:t>
-            </a:r>
-          </a:p>
-        </p:txBody>
-      </p:sp>
-      <p:grpSp>
-        <p:nvGrpSpPr>
-          <p:cNvPr id="12" name="Group 11"/>
-          <p:cNvGrpSpPr>
-            <a:grpSpLocks noGrp="1" noUngrp="1" noRot="1" noChangeAspect="1" noMove="1" noResize="1"/>
-          </p:cNvGrpSpPr>
-          <p:nvPr/>
-        </p:nvGrpSpPr>
-        <p:grpSpPr>
-          <a:xfrm>
-            <a:off x="472021" y="628863"/>
-            <a:ext cx="1128382" cy="847206"/>
-            <a:chOff x="8183879" y="1000124"/>
-            <a:chExt cx="1562267" cy="1172973"/>
-          </a:xfrm>
-        </p:grpSpPr>
-        <p:sp>
-          <p:nvSpPr>
-            <p:cNvPr id="13" name="Freeform 5"/>
-            <p:cNvSpPr/>
-            <p:nvPr/>
-          </p:nvSpPr>
-          <p:spPr bwMode="auto">
-            <a:xfrm>
-              <a:off x="8183879" y="1348782"/>
-              <a:ext cx="935037" cy="824315"/>
-            </a:xfrm>
-            <a:custGeom>
-              <a:avLst/>
-              <a:gdLst>
-                <a:gd name="T0" fmla="*/ 225 w 785"/>
-                <a:gd name="T1" fmla="*/ 692 h 692"/>
-                <a:gd name="T2" fmla="*/ 177 w 785"/>
-                <a:gd name="T3" fmla="*/ 665 h 692"/>
-                <a:gd name="T4" fmla="*/ 9 w 785"/>
-                <a:gd name="T5" fmla="*/ 374 h 692"/>
-                <a:gd name="T6" fmla="*/ 9 w 785"/>
-                <a:gd name="T7" fmla="*/ 318 h 692"/>
-                <a:gd name="T8" fmla="*/ 177 w 785"/>
-                <a:gd name="T9" fmla="*/ 27 h 692"/>
-                <a:gd name="T10" fmla="*/ 225 w 785"/>
-                <a:gd name="T11" fmla="*/ 0 h 692"/>
-                <a:gd name="T12" fmla="*/ 561 w 785"/>
-                <a:gd name="T13" fmla="*/ 0 h 692"/>
-                <a:gd name="T14" fmla="*/ 609 w 785"/>
-                <a:gd name="T15" fmla="*/ 27 h 692"/>
-                <a:gd name="T16" fmla="*/ 777 w 785"/>
-                <a:gd name="T17" fmla="*/ 318 h 692"/>
-                <a:gd name="T18" fmla="*/ 777 w 785"/>
-                <a:gd name="T19" fmla="*/ 374 h 692"/>
-                <a:gd name="T20" fmla="*/ 609 w 785"/>
-                <a:gd name="T21" fmla="*/ 665 h 692"/>
-                <a:gd name="T22" fmla="*/ 561 w 785"/>
-                <a:gd name="T23" fmla="*/ 692 h 692"/>
-                <a:gd name="T24" fmla="*/ 225 w 785"/>
-                <a:gd name="T25" fmla="*/ 692 h 692"/>
-              </a:gdLst>
-              <a:ahLst/>
-              <a:cxnLst>
-                <a:cxn ang="0">
-                  <a:pos x="T0" y="T1"/>
-                </a:cxn>
-                <a:cxn ang="0">
-                  <a:pos x="T2" y="T3"/>
-                </a:cxn>
-                <a:cxn ang="0">
-                  <a:pos x="T4" y="T5"/>
-                </a:cxn>
-                <a:cxn ang="0">
-                  <a:pos x="T6" y="T7"/>
-                </a:cxn>
-                <a:cxn ang="0">
-                  <a:pos x="T8" y="T9"/>
-                </a:cxn>
-                <a:cxn ang="0">
-                  <a:pos x="T10" y="T11"/>
-                </a:cxn>
-                <a:cxn ang="0">
-                  <a:pos x="T12" y="T13"/>
-                </a:cxn>
-                <a:cxn ang="0">
-                  <a:pos x="T14" y="T15"/>
-                </a:cxn>
-                <a:cxn ang="0">
-                  <a:pos x="T16" y="T17"/>
-                </a:cxn>
-                <a:cxn ang="0">
-                  <a:pos x="T18" y="T19"/>
-                </a:cxn>
-                <a:cxn ang="0">
-                  <a:pos x="T20" y="T21"/>
-                </a:cxn>
-                <a:cxn ang="0">
-                  <a:pos x="T22" y="T23"/>
-                </a:cxn>
-                <a:cxn ang="0">
-                  <a:pos x="T24" y="T25"/>
-                </a:cxn>
-              </a:cxnLst>
-              <a:rect l="0" t="0" r="r" b="b"/>
-              <a:pathLst>
-                <a:path w="785" h="692">
-                  <a:moveTo>
-                    <a:pt x="225" y="692"/>
-                  </a:moveTo>
-                  <a:cubicBezTo>
-                    <a:pt x="207" y="692"/>
-                    <a:pt x="185" y="680"/>
-                    <a:pt x="177" y="665"/>
-                  </a:cubicBezTo>
-                  <a:cubicBezTo>
-                    <a:pt x="9" y="374"/>
-                    <a:pt x="9" y="374"/>
-                    <a:pt x="9" y="374"/>
-                  </a:cubicBezTo>
-                  <a:cubicBezTo>
-                    <a:pt x="0" y="358"/>
-                    <a:pt x="0" y="334"/>
-                    <a:pt x="9" y="318"/>
-                  </a:cubicBezTo>
-                  <a:cubicBezTo>
-                    <a:pt x="177" y="27"/>
-                    <a:pt x="177" y="27"/>
-                    <a:pt x="177" y="27"/>
-                  </a:cubicBezTo>
-                  <a:cubicBezTo>
-                    <a:pt x="185" y="12"/>
-                    <a:pt x="207" y="0"/>
-                    <a:pt x="225" y="0"/>
-                  </a:cubicBezTo>
-                  <a:cubicBezTo>
-                    <a:pt x="561" y="0"/>
-                    <a:pt x="561" y="0"/>
-                    <a:pt x="561" y="0"/>
-                  </a:cubicBezTo>
-                  <a:cubicBezTo>
-                    <a:pt x="578" y="0"/>
-                    <a:pt x="600" y="12"/>
-                    <a:pt x="609" y="27"/>
-                  </a:cubicBezTo>
-                  <a:cubicBezTo>
-                    <a:pt x="777" y="318"/>
-                    <a:pt x="777" y="318"/>
-                    <a:pt x="777" y="318"/>
-                  </a:cubicBezTo>
-                  <a:cubicBezTo>
-                    <a:pt x="785" y="334"/>
-                    <a:pt x="785" y="358"/>
-                    <a:pt x="777" y="374"/>
-                  </a:cubicBezTo>
-                  <a:cubicBezTo>
-                    <a:pt x="609" y="665"/>
-                    <a:pt x="609" y="665"/>
-                    <a:pt x="609" y="665"/>
-                  </a:cubicBezTo>
-                  <a:cubicBezTo>
-                    <a:pt x="600" y="680"/>
-                    <a:pt x="578" y="692"/>
-                    <a:pt x="561" y="692"/>
-                  </a:cubicBezTo>
-                  <a:lnTo>
-                    <a:pt x="225" y="692"/>
-                  </a:lnTo>
-                  <a:close/>
-                </a:path>
-              </a:pathLst>
-            </a:custGeom>
-            <a:noFill/>
-            <a:ln w="28575" cmpd="sng">
-              <a:solidFill>
-                <a:schemeClr val="tx1"/>
-              </a:solidFill>
-            </a:ln>
-          </p:spPr>
-          <p:txBody>
-            <a:bodyPr vert="horz" wrap="square" lIns="91440" tIns="45720" rIns="91440" bIns="45720" numCol="1" anchor="t" anchorCtr="0" compatLnSpc="1"/>
-            <a:lstStyle/>
-            <a:p>
-              <a:endParaRPr lang="en-US"/>
-            </a:p>
-          </p:txBody>
-        </p:sp>
-        <p:sp>
-          <p:nvSpPr>
-            <p:cNvPr id="14" name="Freeform 5"/>
-            <p:cNvSpPr/>
-            <p:nvPr/>
-          </p:nvSpPr>
-          <p:spPr bwMode="auto">
-            <a:xfrm>
-              <a:off x="8983979" y="1000124"/>
-              <a:ext cx="762167" cy="671915"/>
-            </a:xfrm>
-            <a:custGeom>
-              <a:avLst/>
-              <a:gdLst>
-                <a:gd name="T0" fmla="*/ 225 w 785"/>
-                <a:gd name="T1" fmla="*/ 692 h 692"/>
-                <a:gd name="T2" fmla="*/ 177 w 785"/>
-                <a:gd name="T3" fmla="*/ 665 h 692"/>
-                <a:gd name="T4" fmla="*/ 9 w 785"/>
-                <a:gd name="T5" fmla="*/ 374 h 692"/>
-                <a:gd name="T6" fmla="*/ 9 w 785"/>
-                <a:gd name="T7" fmla="*/ 318 h 692"/>
-                <a:gd name="T8" fmla="*/ 177 w 785"/>
-                <a:gd name="T9" fmla="*/ 27 h 692"/>
-                <a:gd name="T10" fmla="*/ 225 w 785"/>
-                <a:gd name="T11" fmla="*/ 0 h 692"/>
-                <a:gd name="T12" fmla="*/ 561 w 785"/>
-                <a:gd name="T13" fmla="*/ 0 h 692"/>
-                <a:gd name="T14" fmla="*/ 609 w 785"/>
-                <a:gd name="T15" fmla="*/ 27 h 692"/>
-                <a:gd name="T16" fmla="*/ 777 w 785"/>
-                <a:gd name="T17" fmla="*/ 318 h 692"/>
-                <a:gd name="T18" fmla="*/ 777 w 785"/>
-                <a:gd name="T19" fmla="*/ 374 h 692"/>
-                <a:gd name="T20" fmla="*/ 609 w 785"/>
-                <a:gd name="T21" fmla="*/ 665 h 692"/>
-                <a:gd name="T22" fmla="*/ 561 w 785"/>
-                <a:gd name="T23" fmla="*/ 692 h 692"/>
-                <a:gd name="T24" fmla="*/ 225 w 785"/>
-                <a:gd name="T25" fmla="*/ 692 h 692"/>
-              </a:gdLst>
-              <a:ahLst/>
-              <a:cxnLst>
-                <a:cxn ang="0">
-                  <a:pos x="T0" y="T1"/>
-                </a:cxn>
-                <a:cxn ang="0">
-                  <a:pos x="T2" y="T3"/>
-                </a:cxn>
-                <a:cxn ang="0">
-                  <a:pos x="T4" y="T5"/>
-                </a:cxn>
-                <a:cxn ang="0">
-                  <a:pos x="T6" y="T7"/>
-                </a:cxn>
-                <a:cxn ang="0">
-                  <a:pos x="T8" y="T9"/>
-                </a:cxn>
-                <a:cxn ang="0">
-                  <a:pos x="T10" y="T11"/>
-                </a:cxn>
-                <a:cxn ang="0">
-                  <a:pos x="T12" y="T13"/>
-                </a:cxn>
-                <a:cxn ang="0">
-                  <a:pos x="T14" y="T15"/>
-                </a:cxn>
-                <a:cxn ang="0">
-                  <a:pos x="T16" y="T17"/>
-                </a:cxn>
-                <a:cxn ang="0">
-                  <a:pos x="T18" y="T19"/>
-                </a:cxn>
-                <a:cxn ang="0">
-                  <a:pos x="T20" y="T21"/>
-                </a:cxn>
-                <a:cxn ang="0">
-                  <a:pos x="T22" y="T23"/>
-                </a:cxn>
-                <a:cxn ang="0">
-                  <a:pos x="T24" y="T25"/>
-                </a:cxn>
-              </a:cxnLst>
-              <a:rect l="0" t="0" r="r" b="b"/>
-              <a:pathLst>
-                <a:path w="785" h="692">
-                  <a:moveTo>
-                    <a:pt x="225" y="692"/>
-                  </a:moveTo>
-                  <a:cubicBezTo>
-                    <a:pt x="207" y="692"/>
-                    <a:pt x="185" y="680"/>
-                    <a:pt x="177" y="665"/>
-                  </a:cubicBezTo>
-                  <a:cubicBezTo>
-                    <a:pt x="9" y="374"/>
-                    <a:pt x="9" y="374"/>
-                    <a:pt x="9" y="374"/>
-                  </a:cubicBezTo>
-                  <a:cubicBezTo>
-                    <a:pt x="0" y="358"/>
-                    <a:pt x="0" y="334"/>
-                    <a:pt x="9" y="318"/>
-                  </a:cubicBezTo>
-                  <a:cubicBezTo>
-                    <a:pt x="177" y="27"/>
-                    <a:pt x="177" y="27"/>
-                    <a:pt x="177" y="27"/>
-                  </a:cubicBezTo>
-                  <a:cubicBezTo>
-                    <a:pt x="185" y="12"/>
-                    <a:pt x="207" y="0"/>
-                    <a:pt x="225" y="0"/>
-                  </a:cubicBezTo>
-                  <a:cubicBezTo>
-                    <a:pt x="561" y="0"/>
-                    <a:pt x="561" y="0"/>
-                    <a:pt x="561" y="0"/>
-                  </a:cubicBezTo>
-                  <a:cubicBezTo>
-                    <a:pt x="578" y="0"/>
-                    <a:pt x="600" y="12"/>
-                    <a:pt x="609" y="27"/>
-                  </a:cubicBezTo>
-                  <a:cubicBezTo>
-                    <a:pt x="777" y="318"/>
-                    <a:pt x="777" y="318"/>
-                    <a:pt x="777" y="318"/>
-                  </a:cubicBezTo>
-                  <a:cubicBezTo>
-                    <a:pt x="785" y="334"/>
-                    <a:pt x="785" y="358"/>
-                    <a:pt x="777" y="374"/>
-                  </a:cubicBezTo>
-                  <a:cubicBezTo>
-                    <a:pt x="609" y="665"/>
-                    <a:pt x="609" y="665"/>
-                    <a:pt x="609" y="665"/>
-                  </a:cubicBezTo>
-                  <a:cubicBezTo>
-                    <a:pt x="600" y="680"/>
-                    <a:pt x="578" y="692"/>
-                    <a:pt x="561" y="692"/>
-                  </a:cubicBezTo>
-                  <a:lnTo>
-                    <a:pt x="225" y="692"/>
-                  </a:lnTo>
-                  <a:close/>
-                </a:path>
-              </a:pathLst>
-            </a:custGeom>
-            <a:noFill/>
-            <a:ln w="28575" cmpd="sng">
-              <a:solidFill>
-                <a:schemeClr val="tx1"/>
-              </a:solidFill>
-            </a:ln>
-          </p:spPr>
-          <p:txBody>
-            <a:bodyPr vert="horz" wrap="square" lIns="91440" tIns="45720" rIns="91440" bIns="45720" numCol="1" anchor="t" anchorCtr="0" compatLnSpc="1"/>
-            <a:lstStyle/>
-            <a:p>
-              <a:endParaRPr lang="en-US"/>
-            </a:p>
-          </p:txBody>
-        </p:sp>
-      </p:grpSp>
-      <p:pic>
-        <p:nvPicPr>
-          <p:cNvPr id="11" name="Imagem 10">
-            <a:extLst>
-              <a:ext uri="{FF2B5EF4-FFF2-40B4-BE49-F238E27FC236}">
-                <a16:creationId xmlns:a16="http://schemas.microsoft.com/office/drawing/2014/main" id="{D1E3D129-AEE4-4620-B9D7-636720389400}"/>
-              </a:ext>
-            </a:extLst>
-          </p:cNvPr>
-          <p:cNvPicPr>
-            <a:picLocks noChangeAspect="1"/>
-          </p:cNvPicPr>
-          <p:nvPr/>
-        </p:nvPicPr>
-        <p:blipFill>
-          <a:blip r:embed="rId2"/>
-          <a:stretch>
-            <a:fillRect/>
-          </a:stretch>
-        </p:blipFill>
-        <p:spPr>
-          <a:xfrm>
-            <a:off x="92363" y="2261470"/>
-            <a:ext cx="12007273" cy="2821818"/>
-          </a:xfrm>
-          <a:prstGeom prst="rect">
-            <a:avLst/>
-          </a:prstGeom>
-        </p:spPr>
-      </p:pic>
-    </p:spTree>
-    <p:extLst>
-      <p:ext uri="{BB962C8B-B14F-4D97-AF65-F5344CB8AC3E}">
-        <p14:creationId xmlns:p14="http://schemas.microsoft.com/office/powerpoint/2010/main" val="1295663715"/>
-      </p:ext>
-    </p:extLst>
-  </p:cSld>
-  <p:clrMapOvr>
-    <a:masterClrMapping/>
-  </p:clrMapOvr>
-</p:sld>
-</file>
-
-<file path=ppt/slides/slide13.xml><?xml version="1.0" encoding="utf-8"?>
+<file path=ppt/slides/slide14.xml><?xml version="1.0" encoding="utf-8"?>
 <p:sld xmlns:a="http://schemas.openxmlformats.org/drawingml/2006/main" xmlns:r="http://schemas.openxmlformats.org/officeDocument/2006/relationships" xmlns:p="http://schemas.openxmlformats.org/presentationml/2006/main">
   <p:cSld>
     <p:spTree>
@@ -30692,7 +31429,496 @@
 </p:sld>
 </file>
 
-<file path=ppt/slides/slide14.xml><?xml version="1.0" encoding="utf-8"?>
+<file path=ppt/slides/slide15.xml><?xml version="1.0" encoding="utf-8"?>
+<p:sld xmlns:a="http://schemas.openxmlformats.org/drawingml/2006/main" xmlns:r="http://schemas.openxmlformats.org/officeDocument/2006/relationships" xmlns:p="http://schemas.openxmlformats.org/presentationml/2006/main">
+  <p:cSld>
+    <p:spTree>
+      <p:nvGrpSpPr>
+        <p:cNvPr id="1" name=""/>
+        <p:cNvGrpSpPr/>
+        <p:nvPr/>
+      </p:nvGrpSpPr>
+      <p:grpSpPr>
+        <a:xfrm>
+          <a:off x="0" y="0"/>
+          <a:ext cx="0" cy="0"/>
+          <a:chOff x="0" y="0"/>
+          <a:chExt cx="0" cy="0"/>
+        </a:xfrm>
+      </p:grpSpPr>
+      <p:sp useBgFill="1">
+        <p:nvSpPr>
+          <p:cNvPr id="10" name="Rectangle 9"/>
+          <p:cNvSpPr>
+            <a:spLocks noGrp="1" noRot="1" noChangeAspect="1" noMove="1" noResize="1" noEditPoints="1" noAdjustHandles="1" noChangeArrowheads="1" noChangeShapeType="1" noTextEdit="1"/>
+          </p:cNvSpPr>
+          <p:nvPr/>
+        </p:nvSpPr>
+        <p:spPr>
+          <a:xfrm>
+            <a:off x="0" y="0"/>
+            <a:ext cx="12192000" cy="6858000"/>
+          </a:xfrm>
+          <a:prstGeom prst="rect">
+            <a:avLst/>
+          </a:prstGeom>
+          <a:ln>
+            <a:noFill/>
+          </a:ln>
+        </p:spPr>
+        <p:style>
+          <a:lnRef idx="2">
+            <a:schemeClr val="accent1">
+              <a:shade val="50000"/>
+            </a:schemeClr>
+          </a:lnRef>
+          <a:fillRef idx="1">
+            <a:schemeClr val="accent1"/>
+          </a:fillRef>
+          <a:effectRef idx="0">
+            <a:schemeClr val="accent1"/>
+          </a:effectRef>
+          <a:fontRef idx="minor">
+            <a:schemeClr val="lt1"/>
+          </a:fontRef>
+        </p:style>
+        <p:txBody>
+          <a:bodyPr rtlCol="0" anchor="ctr"/>
+          <a:lstStyle/>
+          <a:p>
+            <a:pPr algn="ctr"/>
+            <a:endParaRPr lang="en-US" dirty="0"/>
+          </a:p>
+        </p:txBody>
+      </p:sp>
+      <p:sp>
+        <p:nvSpPr>
+          <p:cNvPr id="2" name="Título 1"/>
+          <p:cNvSpPr>
+            <a:spLocks noGrp="1"/>
+          </p:cNvSpPr>
+          <p:nvPr>
+            <p:ph type="title"/>
+          </p:nvPr>
+        </p:nvSpPr>
+        <p:spPr>
+          <a:xfrm>
+            <a:off x="1812897" y="518649"/>
+            <a:ext cx="9882278" cy="1067634"/>
+          </a:xfrm>
+        </p:spPr>
+        <p:txBody>
+          <a:bodyPr anchor="ctr">
+            <a:normAutofit/>
+          </a:bodyPr>
+          <a:lstStyle/>
+          <a:p>
+            <a:r>
+              <a:rPr lang="pt-BR" dirty="0"/>
+              <a:t>Diagrama de Classe</a:t>
+            </a:r>
+          </a:p>
+        </p:txBody>
+      </p:sp>
+      <p:grpSp>
+        <p:nvGrpSpPr>
+          <p:cNvPr id="12" name="Group 11"/>
+          <p:cNvGrpSpPr>
+            <a:grpSpLocks noGrp="1" noUngrp="1" noRot="1" noChangeAspect="1" noMove="1" noResize="1"/>
+          </p:cNvGrpSpPr>
+          <p:nvPr/>
+        </p:nvGrpSpPr>
+        <p:grpSpPr>
+          <a:xfrm>
+            <a:off x="472021" y="628863"/>
+            <a:ext cx="1128382" cy="847206"/>
+            <a:chOff x="8183879" y="1000124"/>
+            <a:chExt cx="1562267" cy="1172973"/>
+          </a:xfrm>
+        </p:grpSpPr>
+        <p:sp>
+          <p:nvSpPr>
+            <p:cNvPr id="13" name="Freeform 5"/>
+            <p:cNvSpPr/>
+            <p:nvPr/>
+          </p:nvSpPr>
+          <p:spPr bwMode="auto">
+            <a:xfrm>
+              <a:off x="8183879" y="1348782"/>
+              <a:ext cx="935037" cy="824315"/>
+            </a:xfrm>
+            <a:custGeom>
+              <a:avLst/>
+              <a:gdLst>
+                <a:gd name="T0" fmla="*/ 225 w 785"/>
+                <a:gd name="T1" fmla="*/ 692 h 692"/>
+                <a:gd name="T2" fmla="*/ 177 w 785"/>
+                <a:gd name="T3" fmla="*/ 665 h 692"/>
+                <a:gd name="T4" fmla="*/ 9 w 785"/>
+                <a:gd name="T5" fmla="*/ 374 h 692"/>
+                <a:gd name="T6" fmla="*/ 9 w 785"/>
+                <a:gd name="T7" fmla="*/ 318 h 692"/>
+                <a:gd name="T8" fmla="*/ 177 w 785"/>
+                <a:gd name="T9" fmla="*/ 27 h 692"/>
+                <a:gd name="T10" fmla="*/ 225 w 785"/>
+                <a:gd name="T11" fmla="*/ 0 h 692"/>
+                <a:gd name="T12" fmla="*/ 561 w 785"/>
+                <a:gd name="T13" fmla="*/ 0 h 692"/>
+                <a:gd name="T14" fmla="*/ 609 w 785"/>
+                <a:gd name="T15" fmla="*/ 27 h 692"/>
+                <a:gd name="T16" fmla="*/ 777 w 785"/>
+                <a:gd name="T17" fmla="*/ 318 h 692"/>
+                <a:gd name="T18" fmla="*/ 777 w 785"/>
+                <a:gd name="T19" fmla="*/ 374 h 692"/>
+                <a:gd name="T20" fmla="*/ 609 w 785"/>
+                <a:gd name="T21" fmla="*/ 665 h 692"/>
+                <a:gd name="T22" fmla="*/ 561 w 785"/>
+                <a:gd name="T23" fmla="*/ 692 h 692"/>
+                <a:gd name="T24" fmla="*/ 225 w 785"/>
+                <a:gd name="T25" fmla="*/ 692 h 692"/>
+              </a:gdLst>
+              <a:ahLst/>
+              <a:cxnLst>
+                <a:cxn ang="0">
+                  <a:pos x="T0" y="T1"/>
+                </a:cxn>
+                <a:cxn ang="0">
+                  <a:pos x="T2" y="T3"/>
+                </a:cxn>
+                <a:cxn ang="0">
+                  <a:pos x="T4" y="T5"/>
+                </a:cxn>
+                <a:cxn ang="0">
+                  <a:pos x="T6" y="T7"/>
+                </a:cxn>
+                <a:cxn ang="0">
+                  <a:pos x="T8" y="T9"/>
+                </a:cxn>
+                <a:cxn ang="0">
+                  <a:pos x="T10" y="T11"/>
+                </a:cxn>
+                <a:cxn ang="0">
+                  <a:pos x="T12" y="T13"/>
+                </a:cxn>
+                <a:cxn ang="0">
+                  <a:pos x="T14" y="T15"/>
+                </a:cxn>
+                <a:cxn ang="0">
+                  <a:pos x="T16" y="T17"/>
+                </a:cxn>
+                <a:cxn ang="0">
+                  <a:pos x="T18" y="T19"/>
+                </a:cxn>
+                <a:cxn ang="0">
+                  <a:pos x="T20" y="T21"/>
+                </a:cxn>
+                <a:cxn ang="0">
+                  <a:pos x="T22" y="T23"/>
+                </a:cxn>
+                <a:cxn ang="0">
+                  <a:pos x="T24" y="T25"/>
+                </a:cxn>
+              </a:cxnLst>
+              <a:rect l="0" t="0" r="r" b="b"/>
+              <a:pathLst>
+                <a:path w="785" h="692">
+                  <a:moveTo>
+                    <a:pt x="225" y="692"/>
+                  </a:moveTo>
+                  <a:cubicBezTo>
+                    <a:pt x="207" y="692"/>
+                    <a:pt x="185" y="680"/>
+                    <a:pt x="177" y="665"/>
+                  </a:cubicBezTo>
+                  <a:cubicBezTo>
+                    <a:pt x="9" y="374"/>
+                    <a:pt x="9" y="374"/>
+                    <a:pt x="9" y="374"/>
+                  </a:cubicBezTo>
+                  <a:cubicBezTo>
+                    <a:pt x="0" y="358"/>
+                    <a:pt x="0" y="334"/>
+                    <a:pt x="9" y="318"/>
+                  </a:cubicBezTo>
+                  <a:cubicBezTo>
+                    <a:pt x="177" y="27"/>
+                    <a:pt x="177" y="27"/>
+                    <a:pt x="177" y="27"/>
+                  </a:cubicBezTo>
+                  <a:cubicBezTo>
+                    <a:pt x="185" y="12"/>
+                    <a:pt x="207" y="0"/>
+                    <a:pt x="225" y="0"/>
+                  </a:cubicBezTo>
+                  <a:cubicBezTo>
+                    <a:pt x="561" y="0"/>
+                    <a:pt x="561" y="0"/>
+                    <a:pt x="561" y="0"/>
+                  </a:cubicBezTo>
+                  <a:cubicBezTo>
+                    <a:pt x="578" y="0"/>
+                    <a:pt x="600" y="12"/>
+                    <a:pt x="609" y="27"/>
+                  </a:cubicBezTo>
+                  <a:cubicBezTo>
+                    <a:pt x="777" y="318"/>
+                    <a:pt x="777" y="318"/>
+                    <a:pt x="777" y="318"/>
+                  </a:cubicBezTo>
+                  <a:cubicBezTo>
+                    <a:pt x="785" y="334"/>
+                    <a:pt x="785" y="358"/>
+                    <a:pt x="777" y="374"/>
+                  </a:cubicBezTo>
+                  <a:cubicBezTo>
+                    <a:pt x="609" y="665"/>
+                    <a:pt x="609" y="665"/>
+                    <a:pt x="609" y="665"/>
+                  </a:cubicBezTo>
+                  <a:cubicBezTo>
+                    <a:pt x="600" y="680"/>
+                    <a:pt x="578" y="692"/>
+                    <a:pt x="561" y="692"/>
+                  </a:cubicBezTo>
+                  <a:lnTo>
+                    <a:pt x="225" y="692"/>
+                  </a:lnTo>
+                  <a:close/>
+                </a:path>
+              </a:pathLst>
+            </a:custGeom>
+            <a:noFill/>
+            <a:ln w="28575" cmpd="sng">
+              <a:solidFill>
+                <a:schemeClr val="tx1"/>
+              </a:solidFill>
+            </a:ln>
+          </p:spPr>
+          <p:txBody>
+            <a:bodyPr vert="horz" wrap="square" lIns="91440" tIns="45720" rIns="91440" bIns="45720" numCol="1" anchor="t" anchorCtr="0" compatLnSpc="1"/>
+            <a:lstStyle/>
+            <a:p>
+              <a:endParaRPr lang="en-US"/>
+            </a:p>
+          </p:txBody>
+        </p:sp>
+        <p:sp>
+          <p:nvSpPr>
+            <p:cNvPr id="14" name="Freeform 5"/>
+            <p:cNvSpPr/>
+            <p:nvPr/>
+          </p:nvSpPr>
+          <p:spPr bwMode="auto">
+            <a:xfrm>
+              <a:off x="8983979" y="1000124"/>
+              <a:ext cx="762167" cy="671915"/>
+            </a:xfrm>
+            <a:custGeom>
+              <a:avLst/>
+              <a:gdLst>
+                <a:gd name="T0" fmla="*/ 225 w 785"/>
+                <a:gd name="T1" fmla="*/ 692 h 692"/>
+                <a:gd name="T2" fmla="*/ 177 w 785"/>
+                <a:gd name="T3" fmla="*/ 665 h 692"/>
+                <a:gd name="T4" fmla="*/ 9 w 785"/>
+                <a:gd name="T5" fmla="*/ 374 h 692"/>
+                <a:gd name="T6" fmla="*/ 9 w 785"/>
+                <a:gd name="T7" fmla="*/ 318 h 692"/>
+                <a:gd name="T8" fmla="*/ 177 w 785"/>
+                <a:gd name="T9" fmla="*/ 27 h 692"/>
+                <a:gd name="T10" fmla="*/ 225 w 785"/>
+                <a:gd name="T11" fmla="*/ 0 h 692"/>
+                <a:gd name="T12" fmla="*/ 561 w 785"/>
+                <a:gd name="T13" fmla="*/ 0 h 692"/>
+                <a:gd name="T14" fmla="*/ 609 w 785"/>
+                <a:gd name="T15" fmla="*/ 27 h 692"/>
+                <a:gd name="T16" fmla="*/ 777 w 785"/>
+                <a:gd name="T17" fmla="*/ 318 h 692"/>
+                <a:gd name="T18" fmla="*/ 777 w 785"/>
+                <a:gd name="T19" fmla="*/ 374 h 692"/>
+                <a:gd name="T20" fmla="*/ 609 w 785"/>
+                <a:gd name="T21" fmla="*/ 665 h 692"/>
+                <a:gd name="T22" fmla="*/ 561 w 785"/>
+                <a:gd name="T23" fmla="*/ 692 h 692"/>
+                <a:gd name="T24" fmla="*/ 225 w 785"/>
+                <a:gd name="T25" fmla="*/ 692 h 692"/>
+              </a:gdLst>
+              <a:ahLst/>
+              <a:cxnLst>
+                <a:cxn ang="0">
+                  <a:pos x="T0" y="T1"/>
+                </a:cxn>
+                <a:cxn ang="0">
+                  <a:pos x="T2" y="T3"/>
+                </a:cxn>
+                <a:cxn ang="0">
+                  <a:pos x="T4" y="T5"/>
+                </a:cxn>
+                <a:cxn ang="0">
+                  <a:pos x="T6" y="T7"/>
+                </a:cxn>
+                <a:cxn ang="0">
+                  <a:pos x="T8" y="T9"/>
+                </a:cxn>
+                <a:cxn ang="0">
+                  <a:pos x="T10" y="T11"/>
+                </a:cxn>
+                <a:cxn ang="0">
+                  <a:pos x="T12" y="T13"/>
+                </a:cxn>
+                <a:cxn ang="0">
+                  <a:pos x="T14" y="T15"/>
+                </a:cxn>
+                <a:cxn ang="0">
+                  <a:pos x="T16" y="T17"/>
+                </a:cxn>
+                <a:cxn ang="0">
+                  <a:pos x="T18" y="T19"/>
+                </a:cxn>
+                <a:cxn ang="0">
+                  <a:pos x="T20" y="T21"/>
+                </a:cxn>
+                <a:cxn ang="0">
+                  <a:pos x="T22" y="T23"/>
+                </a:cxn>
+                <a:cxn ang="0">
+                  <a:pos x="T24" y="T25"/>
+                </a:cxn>
+              </a:cxnLst>
+              <a:rect l="0" t="0" r="r" b="b"/>
+              <a:pathLst>
+                <a:path w="785" h="692">
+                  <a:moveTo>
+                    <a:pt x="225" y="692"/>
+                  </a:moveTo>
+                  <a:cubicBezTo>
+                    <a:pt x="207" y="692"/>
+                    <a:pt x="185" y="680"/>
+                    <a:pt x="177" y="665"/>
+                  </a:cubicBezTo>
+                  <a:cubicBezTo>
+                    <a:pt x="9" y="374"/>
+                    <a:pt x="9" y="374"/>
+                    <a:pt x="9" y="374"/>
+                  </a:cubicBezTo>
+                  <a:cubicBezTo>
+                    <a:pt x="0" y="358"/>
+                    <a:pt x="0" y="334"/>
+                    <a:pt x="9" y="318"/>
+                  </a:cubicBezTo>
+                  <a:cubicBezTo>
+                    <a:pt x="177" y="27"/>
+                    <a:pt x="177" y="27"/>
+                    <a:pt x="177" y="27"/>
+                  </a:cubicBezTo>
+                  <a:cubicBezTo>
+                    <a:pt x="185" y="12"/>
+                    <a:pt x="207" y="0"/>
+                    <a:pt x="225" y="0"/>
+                  </a:cubicBezTo>
+                  <a:cubicBezTo>
+                    <a:pt x="561" y="0"/>
+                    <a:pt x="561" y="0"/>
+                    <a:pt x="561" y="0"/>
+                  </a:cubicBezTo>
+                  <a:cubicBezTo>
+                    <a:pt x="578" y="0"/>
+                    <a:pt x="600" y="12"/>
+                    <a:pt x="609" y="27"/>
+                  </a:cubicBezTo>
+                  <a:cubicBezTo>
+                    <a:pt x="777" y="318"/>
+                    <a:pt x="777" y="318"/>
+                    <a:pt x="777" y="318"/>
+                  </a:cubicBezTo>
+                  <a:cubicBezTo>
+                    <a:pt x="785" y="334"/>
+                    <a:pt x="785" y="358"/>
+                    <a:pt x="777" y="374"/>
+                  </a:cubicBezTo>
+                  <a:cubicBezTo>
+                    <a:pt x="609" y="665"/>
+                    <a:pt x="609" y="665"/>
+                    <a:pt x="609" y="665"/>
+                  </a:cubicBezTo>
+                  <a:cubicBezTo>
+                    <a:pt x="600" y="680"/>
+                    <a:pt x="578" y="692"/>
+                    <a:pt x="561" y="692"/>
+                  </a:cubicBezTo>
+                  <a:lnTo>
+                    <a:pt x="225" y="692"/>
+                  </a:lnTo>
+                  <a:close/>
+                </a:path>
+              </a:pathLst>
+            </a:custGeom>
+            <a:noFill/>
+            <a:ln w="28575" cmpd="sng">
+              <a:solidFill>
+                <a:schemeClr val="tx1"/>
+              </a:solidFill>
+            </a:ln>
+          </p:spPr>
+          <p:txBody>
+            <a:bodyPr vert="horz" wrap="square" lIns="91440" tIns="45720" rIns="91440" bIns="45720" numCol="1" anchor="t" anchorCtr="0" compatLnSpc="1"/>
+            <a:lstStyle/>
+            <a:p>
+              <a:endParaRPr lang="en-US"/>
+            </a:p>
+          </p:txBody>
+        </p:sp>
+      </p:grpSp>
+      <p:pic>
+        <p:nvPicPr>
+          <p:cNvPr id="4" name="Imagem 3" descr="Tela de celular com texto preto sobre fundo branco&#10;&#10;Descrição gerada automaticamente">
+            <a:extLst>
+              <a:ext uri="{FF2B5EF4-FFF2-40B4-BE49-F238E27FC236}">
+                <a16:creationId xmlns:a16="http://schemas.microsoft.com/office/drawing/2014/main" id="{1BED938E-3B90-421B-BA22-8FB3C8FFB03D}"/>
+              </a:ext>
+            </a:extLst>
+          </p:cNvPr>
+          <p:cNvPicPr>
+            <a:picLocks noChangeAspect="1"/>
+          </p:cNvPicPr>
+          <p:nvPr/>
+        </p:nvPicPr>
+        <p:blipFill>
+          <a:blip r:embed="rId2">
+            <a:extLst>
+              <a:ext uri="{28A0092B-C50C-407E-A947-70E740481C1C}">
+                <a14:useLocalDpi xmlns:a14="http://schemas.microsoft.com/office/drawing/2010/main" val="0"/>
+              </a:ext>
+            </a:extLst>
+          </a:blip>
+          <a:stretch>
+            <a:fillRect/>
+          </a:stretch>
+        </p:blipFill>
+        <p:spPr>
+          <a:xfrm>
+            <a:off x="2662237" y="1586283"/>
+            <a:ext cx="6867525" cy="4962525"/>
+          </a:xfrm>
+          <a:prstGeom prst="rect">
+            <a:avLst/>
+          </a:prstGeom>
+        </p:spPr>
+      </p:pic>
+    </p:spTree>
+    <p:extLst>
+      <p:ext uri="{BB962C8B-B14F-4D97-AF65-F5344CB8AC3E}">
+        <p14:creationId xmlns:p14="http://schemas.microsoft.com/office/powerpoint/2010/main" val="1034810671"/>
+      </p:ext>
+    </p:extLst>
+  </p:cSld>
+  <p:clrMapOvr>
+    <a:masterClrMapping/>
+  </p:clrMapOvr>
+</p:sld>
+</file>
+
+<file path=ppt/slides/slide16.xml><?xml version="1.0" encoding="utf-8"?>
 <p:sld xmlns:a="http://schemas.openxmlformats.org/drawingml/2006/main" xmlns:r="http://schemas.openxmlformats.org/officeDocument/2006/relationships" xmlns:p="http://schemas.openxmlformats.org/presentationml/2006/main">
   <p:cSld>
     <p:spTree>
@@ -31175,7 +32401,7 @@
 </p:sld>
 </file>
 
-<file path=ppt/slides/slide15.xml><?xml version="1.0" encoding="utf-8"?>
+<file path=ppt/slides/slide17.xml><?xml version="1.0" encoding="utf-8"?>
 <p:sld xmlns:a="http://schemas.openxmlformats.org/drawingml/2006/main" xmlns:r="http://schemas.openxmlformats.org/officeDocument/2006/relationships" xmlns:p="http://schemas.openxmlformats.org/presentationml/2006/main">
   <p:cSld>
     <p:spTree>
@@ -33877,6 +35103,84 @@
           <a:chExt cx="0" cy="0"/>
         </a:xfrm>
       </p:grpSpPr>
+      <p:sp>
+        <p:nvSpPr>
+          <p:cNvPr id="2" name="Título 1"/>
+          <p:cNvSpPr>
+            <a:spLocks noGrp="1"/>
+          </p:cNvSpPr>
+          <p:nvPr>
+            <p:ph type="title"/>
+          </p:nvPr>
+        </p:nvSpPr>
+        <p:spPr/>
+        <p:txBody>
+          <a:bodyPr/>
+          <a:lstStyle/>
+          <a:p>
+            <a:r>
+              <a:rPr lang="pt-BR" dirty="0" err="1"/>
+              <a:t>Proto-Persona</a:t>
+            </a:r>
+            <a:endParaRPr lang="pt-BR" dirty="0"/>
+          </a:p>
+        </p:txBody>
+      </p:sp>
+      <p:pic>
+        <p:nvPicPr>
+          <p:cNvPr id="4" name="Imagem 3"/>
+          <p:cNvPicPr>
+            <a:picLocks noChangeAspect="1"/>
+          </p:cNvPicPr>
+          <p:nvPr/>
+        </p:nvPicPr>
+        <p:blipFill>
+          <a:blip r:embed="rId2">
+            <a:extLst>
+              <a:ext uri="{28A0092B-C50C-407E-A947-70E740481C1C}">
+                <a14:useLocalDpi xmlns:a14="http://schemas.microsoft.com/office/drawing/2010/main" val="0"/>
+              </a:ext>
+            </a:extLst>
+          </a:blip>
+          <a:stretch>
+            <a:fillRect/>
+          </a:stretch>
+        </p:blipFill>
+        <p:spPr>
+          <a:xfrm>
+            <a:off x="3802856" y="1690688"/>
+            <a:ext cx="4586287" cy="4586287"/>
+          </a:xfrm>
+          <a:prstGeom prst="rect">
+            <a:avLst/>
+          </a:prstGeom>
+        </p:spPr>
+      </p:pic>
+    </p:spTree>
+  </p:cSld>
+  <p:clrMapOvr>
+    <a:masterClrMapping/>
+  </p:clrMapOvr>
+</p:sld>
+</file>
+
+<file path=ppt/slides/slide6.xml><?xml version="1.0" encoding="utf-8"?>
+<p:sld xmlns:a="http://schemas.openxmlformats.org/drawingml/2006/main" xmlns:r="http://schemas.openxmlformats.org/officeDocument/2006/relationships" xmlns:p="http://schemas.openxmlformats.org/presentationml/2006/main">
+  <p:cSld>
+    <p:spTree>
+      <p:nvGrpSpPr>
+        <p:cNvPr id="1" name=""/>
+        <p:cNvGrpSpPr/>
+        <p:nvPr/>
+      </p:nvGrpSpPr>
+      <p:grpSpPr>
+        <a:xfrm>
+          <a:off x="0" y="0"/>
+          <a:ext cx="0" cy="0"/>
+          <a:chOff x="0" y="0"/>
+          <a:chExt cx="0" cy="0"/>
+        </a:xfrm>
+      </p:grpSpPr>
       <p:sp useBgFill="1">
         <p:nvSpPr>
           <p:cNvPr id="10" name="Rectangle 9"/>
@@ -36237,7 +37541,7 @@
 </p:sld>
 </file>
 
-<file path=ppt/slides/slide6.xml><?xml version="1.0" encoding="utf-8"?>
+<file path=ppt/slides/slide7.xml><?xml version="1.0" encoding="utf-8"?>
 <p:sld xmlns:a="http://schemas.openxmlformats.org/drawingml/2006/main" xmlns:r="http://schemas.openxmlformats.org/officeDocument/2006/relationships" xmlns:p="http://schemas.openxmlformats.org/presentationml/2006/main">
   <p:cSld>
     <p:spTree>
@@ -36725,7 +38029,7 @@
 </p:sld>
 </file>
 
-<file path=ppt/slides/slide7.xml><?xml version="1.0" encoding="utf-8"?>
+<file path=ppt/slides/slide8.xml><?xml version="1.0" encoding="utf-8"?>
 <p:sld xmlns:a="http://schemas.openxmlformats.org/drawingml/2006/main" xmlns:r="http://schemas.openxmlformats.org/officeDocument/2006/relationships" xmlns:p="http://schemas.openxmlformats.org/presentationml/2006/main">
   <p:cSld>
     <p:spTree>
@@ -37193,8 +38497,8 @@
         </p:blipFill>
         <p:spPr>
           <a:xfrm>
-            <a:off x="2073725" y="2025809"/>
-            <a:ext cx="8044549" cy="4313542"/>
+            <a:off x="1717380" y="1874296"/>
+            <a:ext cx="8757239" cy="4695691"/>
           </a:xfrm>
           <a:prstGeom prst="rect">
             <a:avLst/>
@@ -37214,7 +38518,7 @@
 </p:sld>
 </file>
 
-<file path=ppt/slides/slide8.xml><?xml version="1.0" encoding="utf-8"?>
+<file path=ppt/slides/slide9.xml><?xml version="1.0" encoding="utf-8"?>
 <p:sld xmlns:a="http://schemas.openxmlformats.org/drawingml/2006/main" xmlns:r="http://schemas.openxmlformats.org/officeDocument/2006/relationships" xmlns:p="http://schemas.openxmlformats.org/presentationml/2006/main">
   <p:cSld>
     <p:spTree>
@@ -37697,527 +39001,6 @@
 </p:sld>
 </file>
 
-<file path=ppt/slides/slide9.xml><?xml version="1.0" encoding="utf-8"?>
-<p:sld xmlns:a="http://schemas.openxmlformats.org/drawingml/2006/main" xmlns:r="http://schemas.openxmlformats.org/officeDocument/2006/relationships" xmlns:p="http://schemas.openxmlformats.org/presentationml/2006/main">
-  <p:cSld>
-    <p:spTree>
-      <p:nvGrpSpPr>
-        <p:cNvPr id="1" name=""/>
-        <p:cNvGrpSpPr/>
-        <p:nvPr/>
-      </p:nvGrpSpPr>
-      <p:grpSpPr>
-        <a:xfrm>
-          <a:off x="0" y="0"/>
-          <a:ext cx="0" cy="0"/>
-          <a:chOff x="0" y="0"/>
-          <a:chExt cx="0" cy="0"/>
-        </a:xfrm>
-      </p:grpSpPr>
-      <p:sp>
-        <p:nvSpPr>
-          <p:cNvPr id="2" name="Título 1"/>
-          <p:cNvSpPr>
-            <a:spLocks noGrp="1"/>
-          </p:cNvSpPr>
-          <p:nvPr>
-            <p:ph type="title"/>
-          </p:nvPr>
-        </p:nvSpPr>
-        <p:spPr>
-          <a:xfrm>
-            <a:off x="1812897" y="518649"/>
-            <a:ext cx="9882278" cy="1067634"/>
-          </a:xfrm>
-        </p:spPr>
-        <p:txBody>
-          <a:bodyPr anchor="ctr">
-            <a:normAutofit/>
-          </a:bodyPr>
-          <a:lstStyle/>
-          <a:p>
-            <a:r>
-              <a:rPr lang="pt-BR" dirty="0" err="1"/>
-              <a:t>Product</a:t>
-            </a:r>
-            <a:r>
-              <a:rPr lang="pt-BR" dirty="0"/>
-              <a:t> / Sprint Backlog</a:t>
-            </a:r>
-          </a:p>
-        </p:txBody>
-      </p:sp>
-      <p:grpSp>
-        <p:nvGrpSpPr>
-          <p:cNvPr id="12" name="Group 11"/>
-          <p:cNvGrpSpPr>
-            <a:grpSpLocks noGrp="1" noUngrp="1" noRot="1" noChangeAspect="1" noMove="1" noResize="1"/>
-          </p:cNvGrpSpPr>
-          <p:nvPr/>
-        </p:nvGrpSpPr>
-        <p:grpSpPr>
-          <a:xfrm>
-            <a:off x="472021" y="628863"/>
-            <a:ext cx="1128382" cy="847206"/>
-            <a:chOff x="8183879" y="1000124"/>
-            <a:chExt cx="1562267" cy="1172973"/>
-          </a:xfrm>
-        </p:grpSpPr>
-        <p:sp>
-          <p:nvSpPr>
-            <p:cNvPr id="13" name="Freeform 5"/>
-            <p:cNvSpPr/>
-            <p:nvPr/>
-          </p:nvSpPr>
-          <p:spPr bwMode="auto">
-            <a:xfrm>
-              <a:off x="8183879" y="1348782"/>
-              <a:ext cx="935037" cy="824315"/>
-            </a:xfrm>
-            <a:custGeom>
-              <a:avLst/>
-              <a:gdLst>
-                <a:gd name="T0" fmla="*/ 225 w 785"/>
-                <a:gd name="T1" fmla="*/ 692 h 692"/>
-                <a:gd name="T2" fmla="*/ 177 w 785"/>
-                <a:gd name="T3" fmla="*/ 665 h 692"/>
-                <a:gd name="T4" fmla="*/ 9 w 785"/>
-                <a:gd name="T5" fmla="*/ 374 h 692"/>
-                <a:gd name="T6" fmla="*/ 9 w 785"/>
-                <a:gd name="T7" fmla="*/ 318 h 692"/>
-                <a:gd name="T8" fmla="*/ 177 w 785"/>
-                <a:gd name="T9" fmla="*/ 27 h 692"/>
-                <a:gd name="T10" fmla="*/ 225 w 785"/>
-                <a:gd name="T11" fmla="*/ 0 h 692"/>
-                <a:gd name="T12" fmla="*/ 561 w 785"/>
-                <a:gd name="T13" fmla="*/ 0 h 692"/>
-                <a:gd name="T14" fmla="*/ 609 w 785"/>
-                <a:gd name="T15" fmla="*/ 27 h 692"/>
-                <a:gd name="T16" fmla="*/ 777 w 785"/>
-                <a:gd name="T17" fmla="*/ 318 h 692"/>
-                <a:gd name="T18" fmla="*/ 777 w 785"/>
-                <a:gd name="T19" fmla="*/ 374 h 692"/>
-                <a:gd name="T20" fmla="*/ 609 w 785"/>
-                <a:gd name="T21" fmla="*/ 665 h 692"/>
-                <a:gd name="T22" fmla="*/ 561 w 785"/>
-                <a:gd name="T23" fmla="*/ 692 h 692"/>
-                <a:gd name="T24" fmla="*/ 225 w 785"/>
-                <a:gd name="T25" fmla="*/ 692 h 692"/>
-              </a:gdLst>
-              <a:ahLst/>
-              <a:cxnLst>
-                <a:cxn ang="0">
-                  <a:pos x="T0" y="T1"/>
-                </a:cxn>
-                <a:cxn ang="0">
-                  <a:pos x="T2" y="T3"/>
-                </a:cxn>
-                <a:cxn ang="0">
-                  <a:pos x="T4" y="T5"/>
-                </a:cxn>
-                <a:cxn ang="0">
-                  <a:pos x="T6" y="T7"/>
-                </a:cxn>
-                <a:cxn ang="0">
-                  <a:pos x="T8" y="T9"/>
-                </a:cxn>
-                <a:cxn ang="0">
-                  <a:pos x="T10" y="T11"/>
-                </a:cxn>
-                <a:cxn ang="0">
-                  <a:pos x="T12" y="T13"/>
-                </a:cxn>
-                <a:cxn ang="0">
-                  <a:pos x="T14" y="T15"/>
-                </a:cxn>
-                <a:cxn ang="0">
-                  <a:pos x="T16" y="T17"/>
-                </a:cxn>
-                <a:cxn ang="0">
-                  <a:pos x="T18" y="T19"/>
-                </a:cxn>
-                <a:cxn ang="0">
-                  <a:pos x="T20" y="T21"/>
-                </a:cxn>
-                <a:cxn ang="0">
-                  <a:pos x="T22" y="T23"/>
-                </a:cxn>
-                <a:cxn ang="0">
-                  <a:pos x="T24" y="T25"/>
-                </a:cxn>
-              </a:cxnLst>
-              <a:rect l="0" t="0" r="r" b="b"/>
-              <a:pathLst>
-                <a:path w="785" h="692">
-                  <a:moveTo>
-                    <a:pt x="225" y="692"/>
-                  </a:moveTo>
-                  <a:cubicBezTo>
-                    <a:pt x="207" y="692"/>
-                    <a:pt x="185" y="680"/>
-                    <a:pt x="177" y="665"/>
-                  </a:cubicBezTo>
-                  <a:cubicBezTo>
-                    <a:pt x="9" y="374"/>
-                    <a:pt x="9" y="374"/>
-                    <a:pt x="9" y="374"/>
-                  </a:cubicBezTo>
-                  <a:cubicBezTo>
-                    <a:pt x="0" y="358"/>
-                    <a:pt x="0" y="334"/>
-                    <a:pt x="9" y="318"/>
-                  </a:cubicBezTo>
-                  <a:cubicBezTo>
-                    <a:pt x="177" y="27"/>
-                    <a:pt x="177" y="27"/>
-                    <a:pt x="177" y="27"/>
-                  </a:cubicBezTo>
-                  <a:cubicBezTo>
-                    <a:pt x="185" y="12"/>
-                    <a:pt x="207" y="0"/>
-                    <a:pt x="225" y="0"/>
-                  </a:cubicBezTo>
-                  <a:cubicBezTo>
-                    <a:pt x="561" y="0"/>
-                    <a:pt x="561" y="0"/>
-                    <a:pt x="561" y="0"/>
-                  </a:cubicBezTo>
-                  <a:cubicBezTo>
-                    <a:pt x="578" y="0"/>
-                    <a:pt x="600" y="12"/>
-                    <a:pt x="609" y="27"/>
-                  </a:cubicBezTo>
-                  <a:cubicBezTo>
-                    <a:pt x="777" y="318"/>
-                    <a:pt x="777" y="318"/>
-                    <a:pt x="777" y="318"/>
-                  </a:cubicBezTo>
-                  <a:cubicBezTo>
-                    <a:pt x="785" y="334"/>
-                    <a:pt x="785" y="358"/>
-                    <a:pt x="777" y="374"/>
-                  </a:cubicBezTo>
-                  <a:cubicBezTo>
-                    <a:pt x="609" y="665"/>
-                    <a:pt x="609" y="665"/>
-                    <a:pt x="609" y="665"/>
-                  </a:cubicBezTo>
-                  <a:cubicBezTo>
-                    <a:pt x="600" y="680"/>
-                    <a:pt x="578" y="692"/>
-                    <a:pt x="561" y="692"/>
-                  </a:cubicBezTo>
-                  <a:lnTo>
-                    <a:pt x="225" y="692"/>
-                  </a:lnTo>
-                  <a:close/>
-                </a:path>
-              </a:pathLst>
-            </a:custGeom>
-            <a:noFill/>
-            <a:ln w="28575" cmpd="sng">
-              <a:solidFill>
-                <a:schemeClr val="tx1"/>
-              </a:solidFill>
-            </a:ln>
-          </p:spPr>
-          <p:txBody>
-            <a:bodyPr vert="horz" wrap="square" lIns="91440" tIns="45720" rIns="91440" bIns="45720" numCol="1" anchor="t" anchorCtr="0" compatLnSpc="1"/>
-            <a:lstStyle/>
-            <a:p>
-              <a:endParaRPr lang="en-US"/>
-            </a:p>
-          </p:txBody>
-        </p:sp>
-        <p:sp>
-          <p:nvSpPr>
-            <p:cNvPr id="14" name="Freeform 5"/>
-            <p:cNvSpPr/>
-            <p:nvPr/>
-          </p:nvSpPr>
-          <p:spPr bwMode="auto">
-            <a:xfrm>
-              <a:off x="8983979" y="1000124"/>
-              <a:ext cx="762167" cy="671915"/>
-            </a:xfrm>
-            <a:custGeom>
-              <a:avLst/>
-              <a:gdLst>
-                <a:gd name="T0" fmla="*/ 225 w 785"/>
-                <a:gd name="T1" fmla="*/ 692 h 692"/>
-                <a:gd name="T2" fmla="*/ 177 w 785"/>
-                <a:gd name="T3" fmla="*/ 665 h 692"/>
-                <a:gd name="T4" fmla="*/ 9 w 785"/>
-                <a:gd name="T5" fmla="*/ 374 h 692"/>
-                <a:gd name="T6" fmla="*/ 9 w 785"/>
-                <a:gd name="T7" fmla="*/ 318 h 692"/>
-                <a:gd name="T8" fmla="*/ 177 w 785"/>
-                <a:gd name="T9" fmla="*/ 27 h 692"/>
-                <a:gd name="T10" fmla="*/ 225 w 785"/>
-                <a:gd name="T11" fmla="*/ 0 h 692"/>
-                <a:gd name="T12" fmla="*/ 561 w 785"/>
-                <a:gd name="T13" fmla="*/ 0 h 692"/>
-                <a:gd name="T14" fmla="*/ 609 w 785"/>
-                <a:gd name="T15" fmla="*/ 27 h 692"/>
-                <a:gd name="T16" fmla="*/ 777 w 785"/>
-                <a:gd name="T17" fmla="*/ 318 h 692"/>
-                <a:gd name="T18" fmla="*/ 777 w 785"/>
-                <a:gd name="T19" fmla="*/ 374 h 692"/>
-                <a:gd name="T20" fmla="*/ 609 w 785"/>
-                <a:gd name="T21" fmla="*/ 665 h 692"/>
-                <a:gd name="T22" fmla="*/ 561 w 785"/>
-                <a:gd name="T23" fmla="*/ 692 h 692"/>
-                <a:gd name="T24" fmla="*/ 225 w 785"/>
-                <a:gd name="T25" fmla="*/ 692 h 692"/>
-              </a:gdLst>
-              <a:ahLst/>
-              <a:cxnLst>
-                <a:cxn ang="0">
-                  <a:pos x="T0" y="T1"/>
-                </a:cxn>
-                <a:cxn ang="0">
-                  <a:pos x="T2" y="T3"/>
-                </a:cxn>
-                <a:cxn ang="0">
-                  <a:pos x="T4" y="T5"/>
-                </a:cxn>
-                <a:cxn ang="0">
-                  <a:pos x="T6" y="T7"/>
-                </a:cxn>
-                <a:cxn ang="0">
-                  <a:pos x="T8" y="T9"/>
-                </a:cxn>
-                <a:cxn ang="0">
-                  <a:pos x="T10" y="T11"/>
-                </a:cxn>
-                <a:cxn ang="0">
-                  <a:pos x="T12" y="T13"/>
-                </a:cxn>
-                <a:cxn ang="0">
-                  <a:pos x="T14" y="T15"/>
-                </a:cxn>
-                <a:cxn ang="0">
-                  <a:pos x="T16" y="T17"/>
-                </a:cxn>
-                <a:cxn ang="0">
-                  <a:pos x="T18" y="T19"/>
-                </a:cxn>
-                <a:cxn ang="0">
-                  <a:pos x="T20" y="T21"/>
-                </a:cxn>
-                <a:cxn ang="0">
-                  <a:pos x="T22" y="T23"/>
-                </a:cxn>
-                <a:cxn ang="0">
-                  <a:pos x="T24" y="T25"/>
-                </a:cxn>
-              </a:cxnLst>
-              <a:rect l="0" t="0" r="r" b="b"/>
-              <a:pathLst>
-                <a:path w="785" h="692">
-                  <a:moveTo>
-                    <a:pt x="225" y="692"/>
-                  </a:moveTo>
-                  <a:cubicBezTo>
-                    <a:pt x="207" y="692"/>
-                    <a:pt x="185" y="680"/>
-                    <a:pt x="177" y="665"/>
-                  </a:cubicBezTo>
-                  <a:cubicBezTo>
-                    <a:pt x="9" y="374"/>
-                    <a:pt x="9" y="374"/>
-                    <a:pt x="9" y="374"/>
-                  </a:cubicBezTo>
-                  <a:cubicBezTo>
-                    <a:pt x="0" y="358"/>
-                    <a:pt x="0" y="334"/>
-                    <a:pt x="9" y="318"/>
-                  </a:cubicBezTo>
-                  <a:cubicBezTo>
-                    <a:pt x="177" y="27"/>
-                    <a:pt x="177" y="27"/>
-                    <a:pt x="177" y="27"/>
-                  </a:cubicBezTo>
-                  <a:cubicBezTo>
-                    <a:pt x="185" y="12"/>
-                    <a:pt x="207" y="0"/>
-                    <a:pt x="225" y="0"/>
-                  </a:cubicBezTo>
-                  <a:cubicBezTo>
-                    <a:pt x="561" y="0"/>
-                    <a:pt x="561" y="0"/>
-                    <a:pt x="561" y="0"/>
-                  </a:cubicBezTo>
-                  <a:cubicBezTo>
-                    <a:pt x="578" y="0"/>
-                    <a:pt x="600" y="12"/>
-                    <a:pt x="609" y="27"/>
-                  </a:cubicBezTo>
-                  <a:cubicBezTo>
-                    <a:pt x="777" y="318"/>
-                    <a:pt x="777" y="318"/>
-                    <a:pt x="777" y="318"/>
-                  </a:cubicBezTo>
-                  <a:cubicBezTo>
-                    <a:pt x="785" y="334"/>
-                    <a:pt x="785" y="358"/>
-                    <a:pt x="777" y="374"/>
-                  </a:cubicBezTo>
-                  <a:cubicBezTo>
-                    <a:pt x="609" y="665"/>
-                    <a:pt x="609" y="665"/>
-                    <a:pt x="609" y="665"/>
-                  </a:cubicBezTo>
-                  <a:cubicBezTo>
-                    <a:pt x="600" y="680"/>
-                    <a:pt x="578" y="692"/>
-                    <a:pt x="561" y="692"/>
-                  </a:cubicBezTo>
-                  <a:lnTo>
-                    <a:pt x="225" y="692"/>
-                  </a:lnTo>
-                  <a:close/>
-                </a:path>
-              </a:pathLst>
-            </a:custGeom>
-            <a:noFill/>
-            <a:ln w="28575" cmpd="sng">
-              <a:solidFill>
-                <a:schemeClr val="tx1"/>
-              </a:solidFill>
-            </a:ln>
-          </p:spPr>
-          <p:txBody>
-            <a:bodyPr vert="horz" wrap="square" lIns="91440" tIns="45720" rIns="91440" bIns="45720" numCol="1" anchor="t" anchorCtr="0" compatLnSpc="1"/>
-            <a:lstStyle/>
-            <a:p>
-              <a:endParaRPr lang="en-US"/>
-            </a:p>
-          </p:txBody>
-        </p:sp>
-      </p:grpSp>
-      <p:pic>
-        <p:nvPicPr>
-          <p:cNvPr id="11" name="Imagem 10">
-            <a:extLst>
-              <a:ext uri="{FF2B5EF4-FFF2-40B4-BE49-F238E27FC236}">
-                <a16:creationId xmlns:a16="http://schemas.microsoft.com/office/drawing/2014/main" id="{8F1A4823-8682-41E7-A5C1-1ABA20505B18}"/>
-              </a:ext>
-            </a:extLst>
-          </p:cNvPr>
-          <p:cNvPicPr>
-            <a:picLocks noChangeAspect="1"/>
-          </p:cNvPicPr>
-          <p:nvPr/>
-        </p:nvPicPr>
-        <p:blipFill>
-          <a:blip r:embed="rId2"/>
-          <a:stretch>
-            <a:fillRect/>
-          </a:stretch>
-        </p:blipFill>
-        <p:spPr>
-          <a:xfrm>
-            <a:off x="1994792" y="4571013"/>
-            <a:ext cx="8202408" cy="2102836"/>
-          </a:xfrm>
-          <a:prstGeom prst="rect">
-            <a:avLst/>
-          </a:prstGeom>
-        </p:spPr>
-      </p:pic>
-      <p:pic>
-        <p:nvPicPr>
-          <p:cNvPr id="15" name="Imagem 14">
-            <a:extLst>
-              <a:ext uri="{FF2B5EF4-FFF2-40B4-BE49-F238E27FC236}">
-                <a16:creationId xmlns:a16="http://schemas.microsoft.com/office/drawing/2014/main" id="{4E3D15D1-6C66-4859-8D2D-7DECB3E481F5}"/>
-              </a:ext>
-            </a:extLst>
-          </p:cNvPr>
-          <p:cNvPicPr>
-            <a:picLocks noChangeAspect="1"/>
-          </p:cNvPicPr>
-          <p:nvPr/>
-        </p:nvPicPr>
-        <p:blipFill>
-          <a:blip r:embed="rId3"/>
-          <a:stretch>
-            <a:fillRect/>
-          </a:stretch>
-        </p:blipFill>
-        <p:spPr>
-          <a:xfrm>
-            <a:off x="3643309" y="1586283"/>
-            <a:ext cx="4905375" cy="2001558"/>
-          </a:xfrm>
-          <a:prstGeom prst="rect">
-            <a:avLst/>
-          </a:prstGeom>
-        </p:spPr>
-      </p:pic>
-      <p:sp>
-        <p:nvSpPr>
-          <p:cNvPr id="6" name="Seta: para Baixo 5">
-            <a:extLst>
-              <a:ext uri="{FF2B5EF4-FFF2-40B4-BE49-F238E27FC236}">
-                <a16:creationId xmlns:a16="http://schemas.microsoft.com/office/drawing/2014/main" id="{C0FFF3D3-78AB-4F03-AEA3-F792F1C928B1}"/>
-              </a:ext>
-            </a:extLst>
-          </p:cNvPr>
-          <p:cNvSpPr/>
-          <p:nvPr/>
-        </p:nvSpPr>
-        <p:spPr>
-          <a:xfrm>
-            <a:off x="5872159" y="3679377"/>
-            <a:ext cx="447677" cy="800100"/>
-          </a:xfrm>
-          <a:prstGeom prst="downArrow">
-            <a:avLst/>
-          </a:prstGeom>
-          <a:solidFill>
-            <a:srgbClr val="92D050"/>
-          </a:solidFill>
-        </p:spPr>
-        <p:style>
-          <a:lnRef idx="2">
-            <a:schemeClr val="accent1">
-              <a:shade val="50000"/>
-            </a:schemeClr>
-          </a:lnRef>
-          <a:fillRef idx="1">
-            <a:schemeClr val="accent1"/>
-          </a:fillRef>
-          <a:effectRef idx="0">
-            <a:schemeClr val="accent1"/>
-          </a:effectRef>
-          <a:fontRef idx="minor">
-            <a:schemeClr val="lt1"/>
-          </a:fontRef>
-        </p:style>
-        <p:txBody>
-          <a:bodyPr rtlCol="0" anchor="ctr"/>
-          <a:lstStyle/>
-          <a:p>
-            <a:pPr algn="ctr"/>
-            <a:endParaRPr lang="pt-BR"/>
-          </a:p>
-        </p:txBody>
-      </p:sp>
-    </p:spTree>
-    <p:extLst>
-      <p:ext uri="{BB962C8B-B14F-4D97-AF65-F5344CB8AC3E}">
-        <p14:creationId xmlns:p14="http://schemas.microsoft.com/office/powerpoint/2010/main" val="1290913563"/>
-      </p:ext>
-    </p:extLst>
-  </p:cSld>
-  <p:clrMapOvr>
-    <a:masterClrMapping/>
-  </p:clrMapOvr>
-</p:sld>
-</file>
-
 <file path=ppt/theme/theme1.xml><?xml version="1.0" encoding="utf-8"?>
 <a:theme xmlns:a="http://schemas.openxmlformats.org/drawingml/2006/main" name="Tema do Office">
   <a:themeElements>

</xml_diff>

<commit_message>
PPT e desenho de arquitetura
</commit_message>
<xml_diff>
--- a/Documentação/Apresentação - Sprint 3.pptx
+++ b/Documentação/Apresentação - Sprint 3.pptx
@@ -19,9 +19,11 @@
     <p:sldId id="300" r:id="rId13"/>
     <p:sldId id="287" r:id="rId14"/>
     <p:sldId id="304" r:id="rId15"/>
-    <p:sldId id="305" r:id="rId16"/>
-    <p:sldId id="299" r:id="rId17"/>
-    <p:sldId id="290" r:id="rId18"/>
+    <p:sldId id="309" r:id="rId16"/>
+    <p:sldId id="308" r:id="rId17"/>
+    <p:sldId id="305" r:id="rId18"/>
+    <p:sldId id="299" r:id="rId19"/>
+    <p:sldId id="290" r:id="rId20"/>
   </p:sldIdLst>
   <p:sldSz cx="12192000" cy="6858000"/>
   <p:notesSz cx="6858000" cy="9144000"/>
@@ -131,7 +133,7 @@
 <file path=ppt/revisionInfo.xml><?xml version="1.0" encoding="utf-8"?>
 <p1510:revInfo xmlns:a="http://schemas.openxmlformats.org/drawingml/2006/main" xmlns:r="http://schemas.openxmlformats.org/officeDocument/2006/relationships" xmlns:p1510="http://schemas.microsoft.com/office/powerpoint/2015/10/main">
   <p1510:revLst>
-    <p1510:client id="{DAECEB32-C126-44A1-B729-3AADB1682972}" v="523" dt="2020-06-17T02:53:41.780"/>
+    <p1510:client id="{DAECEB32-C126-44A1-B729-3AADB1682972}" v="543" dt="2020-06-18T22:40:15.195"/>
   </p1510:revLst>
 </p1510:revInfo>
 </file>
@@ -141,7 +143,7 @@
   <pc:docChgLst>
     <pc:chgData name="Fernando C Correa" userId="a08d7f3c16d54179" providerId="LiveId" clId="{DAECEB32-C126-44A1-B729-3AADB1682972}"/>
     <pc:docChg chg="undo custSel addSld delSld modSld sldOrd">
-      <pc:chgData name="Fernando C Correa" userId="a08d7f3c16d54179" providerId="LiveId" clId="{DAECEB32-C126-44A1-B729-3AADB1682972}" dt="2020-06-17T15:51:28.331" v="2097" actId="1035"/>
+      <pc:chgData name="Fernando C Correa" userId="a08d7f3c16d54179" providerId="LiveId" clId="{DAECEB32-C126-44A1-B729-3AADB1682972}" dt="2020-06-18T22:40:15.195" v="2142"/>
       <pc:docMkLst>
         <pc:docMk/>
       </pc:docMkLst>
@@ -279,7 +281,7 @@
         </pc:picChg>
       </pc:sldChg>
       <pc:sldChg chg="addSp delSp modSp mod ord modAnim">
-        <pc:chgData name="Fernando C Correa" userId="a08d7f3c16d54179" providerId="LiveId" clId="{DAECEB32-C126-44A1-B729-3AADB1682972}" dt="2020-06-17T02:30:11.096" v="1735"/>
+        <pc:chgData name="Fernando C Correa" userId="a08d7f3c16d54179" providerId="LiveId" clId="{DAECEB32-C126-44A1-B729-3AADB1682972}" dt="2020-06-18T22:39:20.964" v="2135"/>
         <pc:sldMkLst>
           <pc:docMk/>
           <pc:sldMk cId="2582316661" sldId="287"/>
@@ -642,7 +644,7 @@
         </pc:picChg>
       </pc:sldChg>
       <pc:sldChg chg="addSp delSp modSp mod ord modAnim">
-        <pc:chgData name="Fernando C Correa" userId="a08d7f3c16d54179" providerId="LiveId" clId="{DAECEB32-C126-44A1-B729-3AADB1682972}" dt="2020-06-17T02:43:38.305" v="1946" actId="1035"/>
+        <pc:chgData name="Fernando C Correa" userId="a08d7f3c16d54179" providerId="LiveId" clId="{DAECEB32-C126-44A1-B729-3AADB1682972}" dt="2020-06-18T22:39:42.892" v="2138"/>
         <pc:sldMkLst>
           <pc:docMk/>
           <pc:sldMk cId="1133719789" sldId="292"/>
@@ -841,7 +843,7 @@
         </pc:picChg>
       </pc:sldChg>
       <pc:sldChg chg="addSp delSp modSp mod modAnim">
-        <pc:chgData name="Fernando C Correa" userId="a08d7f3c16d54179" providerId="LiveId" clId="{DAECEB32-C126-44A1-B729-3AADB1682972}" dt="2020-06-17T15:51:28.331" v="2097" actId="1035"/>
+        <pc:chgData name="Fernando C Correa" userId="a08d7f3c16d54179" providerId="LiveId" clId="{DAECEB32-C126-44A1-B729-3AADB1682972}" dt="2020-06-18T22:39:49.404" v="2140"/>
         <pc:sldMkLst>
           <pc:docMk/>
           <pc:sldMk cId="3697814180" sldId="294"/>
@@ -920,7 +922,7 @@
         </pc:picChg>
       </pc:sldChg>
       <pc:sldChg chg="addSp delSp modSp mod modAnim">
-        <pc:chgData name="Fernando C Correa" userId="a08d7f3c16d54179" providerId="LiveId" clId="{DAECEB32-C126-44A1-B729-3AADB1682972}" dt="2020-06-17T02:42:05.025" v="1932" actId="1035"/>
+        <pc:chgData name="Fernando C Correa" userId="a08d7f3c16d54179" providerId="LiveId" clId="{DAECEB32-C126-44A1-B729-3AADB1682972}" dt="2020-06-18T22:39:45.765" v="2139"/>
         <pc:sldMkLst>
           <pc:docMk/>
           <pc:sldMk cId="244390866" sldId="295"/>
@@ -1127,7 +1129,7 @@
         </pc:picChg>
       </pc:sldChg>
       <pc:sldChg chg="addSp delSp modSp mod ord delAnim modAnim">
-        <pc:chgData name="Fernando C Correa" userId="a08d7f3c16d54179" providerId="LiveId" clId="{DAECEB32-C126-44A1-B729-3AADB1682972}" dt="2020-06-17T02:40:29.529" v="1902" actId="1037"/>
+        <pc:chgData name="Fernando C Correa" userId="a08d7f3c16d54179" providerId="LiveId" clId="{DAECEB32-C126-44A1-B729-3AADB1682972}" dt="2020-06-18T22:39:31.583" v="2136"/>
         <pc:sldMkLst>
           <pc:docMk/>
           <pc:sldMk cId="2602158399" sldId="296"/>
@@ -1412,7 +1414,7 @@
         </pc:spChg>
       </pc:sldChg>
       <pc:sldChg chg="addSp delSp modSp mod modAnim">
-        <pc:chgData name="Fernando C Correa" userId="a08d7f3c16d54179" providerId="LiveId" clId="{DAECEB32-C126-44A1-B729-3AADB1682972}" dt="2020-06-17T02:30:45.288" v="1744"/>
+        <pc:chgData name="Fernando C Correa" userId="a08d7f3c16d54179" providerId="LiveId" clId="{DAECEB32-C126-44A1-B729-3AADB1682972}" dt="2020-06-18T22:40:08.667" v="2141"/>
         <pc:sldMkLst>
           <pc:docMk/>
           <pc:sldMk cId="2306638093" sldId="299"/>
@@ -1640,7 +1642,7 @@
         </pc:sldMkLst>
       </pc:sldChg>
       <pc:sldChg chg="addSp delSp modSp add mod delAnim modAnim">
-        <pc:chgData name="Fernando C Correa" userId="a08d7f3c16d54179" providerId="LiveId" clId="{DAECEB32-C126-44A1-B729-3AADB1682972}" dt="2020-06-17T02:40:29.846" v="1903" actId="1038"/>
+        <pc:chgData name="Fernando C Correa" userId="a08d7f3c16d54179" providerId="LiveId" clId="{DAECEB32-C126-44A1-B729-3AADB1682972}" dt="2020-06-18T22:39:34.202" v="2137"/>
         <pc:sldMkLst>
           <pc:docMk/>
           <pc:sldMk cId="1298849621" sldId="303"/>
@@ -1878,8 +1880,8 @@
           </ac:picMkLst>
         </pc:picChg>
       </pc:sldChg>
-      <pc:sldChg chg="addSp delSp modSp add mod modAnim">
-        <pc:chgData name="Fernando C Correa" userId="a08d7f3c16d54179" providerId="LiveId" clId="{DAECEB32-C126-44A1-B729-3AADB1682972}" dt="2020-06-17T02:30:23.844" v="1738"/>
+      <pc:sldChg chg="addSp delSp modSp add mod delAnim modAnim">
+        <pc:chgData name="Fernando C Correa" userId="a08d7f3c16d54179" providerId="LiveId" clId="{DAECEB32-C126-44A1-B729-3AADB1682972}" dt="2020-06-18T22:39:04.278" v="2134"/>
         <pc:sldMkLst>
           <pc:docMk/>
           <pc:sldMk cId="2190780406" sldId="304"/>
@@ -1948,17 +1950,41 @@
             <ac:picMk id="4" creationId="{CE59E904-DE2E-44FD-8FAC-39DBA644EE5C}"/>
           </ac:picMkLst>
         </pc:picChg>
-        <pc:picChg chg="add mod">
-          <ac:chgData name="Fernando C Correa" userId="a08d7f3c16d54179" providerId="LiveId" clId="{DAECEB32-C126-44A1-B729-3AADB1682972}" dt="2020-06-17T02:18:44.471" v="1524" actId="1076"/>
+        <pc:picChg chg="add del mod">
+          <ac:chgData name="Fernando C Correa" userId="a08d7f3c16d54179" providerId="LiveId" clId="{DAECEB32-C126-44A1-B729-3AADB1682972}" dt="2020-06-18T22:34:54.829" v="2117" actId="478"/>
+          <ac:picMkLst>
+            <pc:docMk/>
+            <pc:sldMk cId="2190780406" sldId="304"/>
+            <ac:picMk id="5" creationId="{89752C3D-A82D-43D5-9165-13EE32B69AE5}"/>
+          </ac:picMkLst>
+        </pc:picChg>
+        <pc:picChg chg="add del mod">
+          <ac:chgData name="Fernando C Correa" userId="a08d7f3c16d54179" providerId="LiveId" clId="{DAECEB32-C126-44A1-B729-3AADB1682972}" dt="2020-06-18T22:36:17.834" v="2124" actId="478"/>
+          <ac:picMkLst>
+            <pc:docMk/>
+            <pc:sldMk cId="2190780406" sldId="304"/>
+            <ac:picMk id="7" creationId="{91554513-C358-446F-ABDC-9AC81E9B4E24}"/>
+          </ac:picMkLst>
+        </pc:picChg>
+        <pc:picChg chg="add del mod">
+          <ac:chgData name="Fernando C Correa" userId="a08d7f3c16d54179" providerId="LiveId" clId="{DAECEB32-C126-44A1-B729-3AADB1682972}" dt="2020-06-18T22:33:16.915" v="2099" actId="478"/>
           <ac:picMkLst>
             <pc:docMk/>
             <pc:sldMk cId="2190780406" sldId="304"/>
             <ac:picMk id="15" creationId="{A03E8544-6208-4BA9-93EB-9C6D1B7FED2F}"/>
           </ac:picMkLst>
         </pc:picChg>
+        <pc:picChg chg="add mod">
+          <ac:chgData name="Fernando C Correa" userId="a08d7f3c16d54179" providerId="LiveId" clId="{DAECEB32-C126-44A1-B729-3AADB1682972}" dt="2020-06-18T22:38:54.383" v="2132" actId="1076"/>
+          <ac:picMkLst>
+            <pc:docMk/>
+            <pc:sldMk cId="2190780406" sldId="304"/>
+            <ac:picMk id="17" creationId="{08DAA0A6-4CA7-4D6E-B5EA-8E5E5D8DDEC5}"/>
+          </ac:picMkLst>
+        </pc:picChg>
       </pc:sldChg>
       <pc:sldChg chg="addSp delSp modSp add mod modAnim">
-        <pc:chgData name="Fernando C Correa" userId="a08d7f3c16d54179" providerId="LiveId" clId="{DAECEB32-C126-44A1-B729-3AADB1682972}" dt="2020-06-17T02:30:34.018" v="1741"/>
+        <pc:chgData name="Fernando C Correa" userId="a08d7f3c16d54179" providerId="LiveId" clId="{DAECEB32-C126-44A1-B729-3AADB1682972}" dt="2020-06-18T22:40:15.195" v="2142"/>
         <pc:sldMkLst>
           <pc:docMk/>
           <pc:sldMk cId="1108433508" sldId="305"/>
@@ -2106,6 +2132,29 @@
           </ac:spMkLst>
         </pc:spChg>
       </pc:sldChg>
+      <pc:sldChg chg="addSp delSp modSp add mod delAnim modAnim">
+        <pc:chgData name="Fernando C Correa" userId="a08d7f3c16d54179" providerId="LiveId" clId="{DAECEB32-C126-44A1-B729-3AADB1682972}" dt="2020-06-18T22:35:59.168" v="2122"/>
+        <pc:sldMkLst>
+          <pc:docMk/>
+          <pc:sldMk cId="1166053751" sldId="308"/>
+        </pc:sldMkLst>
+        <pc:picChg chg="add mod">
+          <ac:chgData name="Fernando C Correa" userId="a08d7f3c16d54179" providerId="LiveId" clId="{DAECEB32-C126-44A1-B729-3AADB1682972}" dt="2020-06-18T22:33:43.104" v="2107" actId="1076"/>
+          <ac:picMkLst>
+            <pc:docMk/>
+            <pc:sldMk cId="1166053751" sldId="308"/>
+            <ac:picMk id="5" creationId="{C0EB70A9-CA61-4D0B-9BF3-2C20CA891859}"/>
+          </ac:picMkLst>
+        </pc:picChg>
+        <pc:picChg chg="del">
+          <ac:chgData name="Fernando C Correa" userId="a08d7f3c16d54179" providerId="LiveId" clId="{DAECEB32-C126-44A1-B729-3AADB1682972}" dt="2020-06-18T22:33:19.238" v="2100" actId="478"/>
+          <ac:picMkLst>
+            <pc:docMk/>
+            <pc:sldMk cId="1166053751" sldId="308"/>
+            <ac:picMk id="15" creationId="{A03E8544-6208-4BA9-93EB-9C6D1B7FED2F}"/>
+          </ac:picMkLst>
+        </pc:picChg>
+      </pc:sldChg>
       <pc:sldChg chg="delSp modSp add del mod">
         <pc:chgData name="Fernando C Correa" userId="a08d7f3c16d54179" providerId="LiveId" clId="{DAECEB32-C126-44A1-B729-3AADB1682972}" dt="2020-06-17T02:31:03.540" v="1748" actId="47"/>
         <pc:sldMkLst>
@@ -2152,6 +2201,13 @@
             <ac:picMk id="18" creationId="{E06E4486-40EB-49C0-BDD4-6308F01F4996}"/>
           </ac:picMkLst>
         </pc:picChg>
+      </pc:sldChg>
+      <pc:sldChg chg="add">
+        <pc:chgData name="Fernando C Correa" userId="a08d7f3c16d54179" providerId="LiveId" clId="{DAECEB32-C126-44A1-B729-3AADB1682972}" dt="2020-06-18T22:36:15.291" v="2123"/>
+        <pc:sldMkLst>
+          <pc:docMk/>
+          <pc:sldMk cId="1834702266" sldId="309"/>
+        </pc:sldMkLst>
       </pc:sldChg>
     </pc:docChg>
   </pc:docChgLst>
@@ -27325,7 +27381,7 @@
           <a:p>
             <a:fld id="{25037C36-C8CA-4564-9B7E-8E9BA0061FB2}" type="datetimeFigureOut">
               <a:rPr lang="pt-BR" smtClean="0"/>
-              <a:t>17/06/2020</a:t>
+              <a:t>18/06/2020</a:t>
             </a:fld>
             <a:endParaRPr lang="pt-BR"/>
           </a:p>
@@ -27523,7 +27579,7 @@
           <a:p>
             <a:fld id="{25037C36-C8CA-4564-9B7E-8E9BA0061FB2}" type="datetimeFigureOut">
               <a:rPr lang="pt-BR" smtClean="0"/>
-              <a:t>17/06/2020</a:t>
+              <a:t>18/06/2020</a:t>
             </a:fld>
             <a:endParaRPr lang="pt-BR"/>
           </a:p>
@@ -27731,7 +27787,7 @@
           <a:p>
             <a:fld id="{25037C36-C8CA-4564-9B7E-8E9BA0061FB2}" type="datetimeFigureOut">
               <a:rPr lang="pt-BR" smtClean="0"/>
-              <a:t>17/06/2020</a:t>
+              <a:t>18/06/2020</a:t>
             </a:fld>
             <a:endParaRPr lang="pt-BR"/>
           </a:p>
@@ -27929,7 +27985,7 @@
           <a:p>
             <a:fld id="{25037C36-C8CA-4564-9B7E-8E9BA0061FB2}" type="datetimeFigureOut">
               <a:rPr lang="pt-BR" smtClean="0"/>
-              <a:t>17/06/2020</a:t>
+              <a:t>18/06/2020</a:t>
             </a:fld>
             <a:endParaRPr lang="pt-BR"/>
           </a:p>
@@ -28204,7 +28260,7 @@
           <a:p>
             <a:fld id="{25037C36-C8CA-4564-9B7E-8E9BA0061FB2}" type="datetimeFigureOut">
               <a:rPr lang="pt-BR" smtClean="0"/>
-              <a:t>17/06/2020</a:t>
+              <a:t>18/06/2020</a:t>
             </a:fld>
             <a:endParaRPr lang="pt-BR"/>
           </a:p>
@@ -28469,7 +28525,7 @@
           <a:p>
             <a:fld id="{25037C36-C8CA-4564-9B7E-8E9BA0061FB2}" type="datetimeFigureOut">
               <a:rPr lang="pt-BR" smtClean="0"/>
-              <a:t>17/06/2020</a:t>
+              <a:t>18/06/2020</a:t>
             </a:fld>
             <a:endParaRPr lang="pt-BR"/>
           </a:p>
@@ -28881,7 +28937,7 @@
           <a:p>
             <a:fld id="{25037C36-C8CA-4564-9B7E-8E9BA0061FB2}" type="datetimeFigureOut">
               <a:rPr lang="pt-BR" smtClean="0"/>
-              <a:t>17/06/2020</a:t>
+              <a:t>18/06/2020</a:t>
             </a:fld>
             <a:endParaRPr lang="pt-BR"/>
           </a:p>
@@ -29022,7 +29078,7 @@
           <a:p>
             <a:fld id="{25037C36-C8CA-4564-9B7E-8E9BA0061FB2}" type="datetimeFigureOut">
               <a:rPr lang="pt-BR" smtClean="0"/>
-              <a:t>17/06/2020</a:t>
+              <a:t>18/06/2020</a:t>
             </a:fld>
             <a:endParaRPr lang="pt-BR"/>
           </a:p>
@@ -29135,7 +29191,7 @@
           <a:p>
             <a:fld id="{25037C36-C8CA-4564-9B7E-8E9BA0061FB2}" type="datetimeFigureOut">
               <a:rPr lang="pt-BR" smtClean="0"/>
-              <a:t>17/06/2020</a:t>
+              <a:t>18/06/2020</a:t>
             </a:fld>
             <a:endParaRPr lang="pt-BR"/>
           </a:p>
@@ -29446,7 +29502,7 @@
           <a:p>
             <a:fld id="{25037C36-C8CA-4564-9B7E-8E9BA0061FB2}" type="datetimeFigureOut">
               <a:rPr lang="pt-BR" smtClean="0"/>
-              <a:t>17/06/2020</a:t>
+              <a:t>18/06/2020</a:t>
             </a:fld>
             <a:endParaRPr lang="pt-BR"/>
           </a:p>
@@ -29734,7 +29790,7 @@
           <a:p>
             <a:fld id="{25037C36-C8CA-4564-9B7E-8E9BA0061FB2}" type="datetimeFigureOut">
               <a:rPr lang="pt-BR" smtClean="0"/>
-              <a:t>17/06/2020</a:t>
+              <a:t>18/06/2020</a:t>
             </a:fld>
             <a:endParaRPr lang="pt-BR"/>
           </a:p>
@@ -29975,7 +30031,7 @@
           <a:p>
             <a:fld id="{25037C36-C8CA-4564-9B7E-8E9BA0061FB2}" type="datetimeFigureOut">
               <a:rPr lang="pt-BR" smtClean="0"/>
-              <a:t>17/06/2020</a:t>
+              <a:t>18/06/2020</a:t>
             </a:fld>
             <a:endParaRPr lang="pt-BR"/>
           </a:p>
@@ -33702,105 +33758,6 @@
                       </p:childTnLst>
                     </p:cTn>
                   </p:par>
-                  <p:par>
-                    <p:cTn id="10" fill="hold">
-                      <p:stCondLst>
-                        <p:cond delay="indefinite"/>
-                      </p:stCondLst>
-                      <p:childTnLst>
-                        <p:par>
-                          <p:cTn id="11" fill="hold">
-                            <p:stCondLst>
-                              <p:cond delay="0"/>
-                            </p:stCondLst>
-                            <p:childTnLst>
-                              <p:par>
-                                <p:cTn id="12" presetID="53" presetClass="exit" presetSubtype="32" fill="hold" nodeType="clickEffect">
-                                  <p:stCondLst>
-                                    <p:cond delay="0"/>
-                                  </p:stCondLst>
-                                  <p:childTnLst>
-                                    <p:anim calcmode="lin" valueType="num">
-                                      <p:cBhvr>
-                                        <p:cTn id="13" dur="500"/>
-                                        <p:tgtEl>
-                                          <p:spTgt spid="4"/>
-                                        </p:tgtEl>
-                                        <p:attrNameLst>
-                                          <p:attrName>ppt_w</p:attrName>
-                                        </p:attrNameLst>
-                                      </p:cBhvr>
-                                      <p:tavLst>
-                                        <p:tav tm="0">
-                                          <p:val>
-                                            <p:strVal val="ppt_w"/>
-                                          </p:val>
-                                        </p:tav>
-                                        <p:tav tm="100000">
-                                          <p:val>
-                                            <p:fltVal val="0"/>
-                                          </p:val>
-                                        </p:tav>
-                                      </p:tavLst>
-                                    </p:anim>
-                                    <p:anim calcmode="lin" valueType="num">
-                                      <p:cBhvr>
-                                        <p:cTn id="14" dur="500"/>
-                                        <p:tgtEl>
-                                          <p:spTgt spid="4"/>
-                                        </p:tgtEl>
-                                        <p:attrNameLst>
-                                          <p:attrName>ppt_h</p:attrName>
-                                        </p:attrNameLst>
-                                      </p:cBhvr>
-                                      <p:tavLst>
-                                        <p:tav tm="0">
-                                          <p:val>
-                                            <p:strVal val="ppt_h"/>
-                                          </p:val>
-                                        </p:tav>
-                                        <p:tav tm="100000">
-                                          <p:val>
-                                            <p:fltVal val="0"/>
-                                          </p:val>
-                                        </p:tav>
-                                      </p:tavLst>
-                                    </p:anim>
-                                    <p:animEffect transition="out" filter="fade">
-                                      <p:cBhvr>
-                                        <p:cTn id="15" dur="500"/>
-                                        <p:tgtEl>
-                                          <p:spTgt spid="4"/>
-                                        </p:tgtEl>
-                                      </p:cBhvr>
-                                    </p:animEffect>
-                                    <p:set>
-                                      <p:cBhvr>
-                                        <p:cTn id="16" dur="1" fill="hold">
-                                          <p:stCondLst>
-                                            <p:cond delay="499"/>
-                                          </p:stCondLst>
-                                        </p:cTn>
-                                        <p:tgtEl>
-                                          <p:spTgt spid="4"/>
-                                        </p:tgtEl>
-                                        <p:attrNameLst>
-                                          <p:attrName>style.visibility</p:attrName>
-                                        </p:attrNameLst>
-                                      </p:cBhvr>
-                                      <p:to>
-                                        <p:strVal val="hidden"/>
-                                      </p:to>
-                                    </p:set>
-                                  </p:childTnLst>
-                                </p:cTn>
-                              </p:par>
-                            </p:childTnLst>
-                          </p:cTn>
-                        </p:par>
-                      </p:childTnLst>
-                    </p:cTn>
-                  </p:par>
                 </p:childTnLst>
               </p:cTn>
               <p:prevCondLst>
@@ -34378,42 +34335,6 @@
           </a:p>
         </p:txBody>
       </p:sp>
-      <p:pic>
-        <p:nvPicPr>
-          <p:cNvPr id="15" name="Imagem 14" descr="Tela de celular com texto preto sobre fundo branco&#10;&#10;Descrição gerada automaticamente">
-            <a:extLst>
-              <a:ext uri="{FF2B5EF4-FFF2-40B4-BE49-F238E27FC236}">
-                <a16:creationId xmlns:a16="http://schemas.microsoft.com/office/drawing/2014/main" id="{A03E8544-6208-4BA9-93EB-9C6D1B7FED2F}"/>
-              </a:ext>
-            </a:extLst>
-          </p:cNvPr>
-          <p:cNvPicPr>
-            <a:picLocks noChangeAspect="1"/>
-          </p:cNvPicPr>
-          <p:nvPr/>
-        </p:nvPicPr>
-        <p:blipFill>
-          <a:blip r:embed="rId2">
-            <a:extLst>
-              <a:ext uri="{28A0092B-C50C-407E-A947-70E740481C1C}">
-                <a14:useLocalDpi xmlns:a14="http://schemas.microsoft.com/office/drawing/2010/main" val="0"/>
-              </a:ext>
-            </a:extLst>
-          </a:blip>
-          <a:stretch>
-            <a:fillRect/>
-          </a:stretch>
-        </p:blipFill>
-        <p:spPr>
-          <a:xfrm>
-            <a:off x="3486149" y="1924032"/>
-            <a:ext cx="8447149" cy="3592465"/>
-          </a:xfrm>
-          <a:prstGeom prst="rect">
-            <a:avLst/>
-          </a:prstGeom>
-        </p:spPr>
-      </p:pic>
       <p:sp>
         <p:nvSpPr>
           <p:cNvPr id="16" name="CaixaDeTexto 15">
@@ -34485,6 +34406,42 @@
           </a:p>
         </p:txBody>
       </p:sp>
+      <p:pic>
+        <p:nvPicPr>
+          <p:cNvPr id="17" name="Imagem 16" descr="Tela de celular com texto preto sobre fundo branco&#10;&#10;Descrição gerada automaticamente">
+            <a:extLst>
+              <a:ext uri="{FF2B5EF4-FFF2-40B4-BE49-F238E27FC236}">
+                <a16:creationId xmlns:a16="http://schemas.microsoft.com/office/drawing/2014/main" id="{08DAA0A6-4CA7-4D6E-B5EA-8E5E5D8DDEC5}"/>
+              </a:ext>
+            </a:extLst>
+          </p:cNvPr>
+          <p:cNvPicPr>
+            <a:picLocks noChangeAspect="1"/>
+          </p:cNvPicPr>
+          <p:nvPr/>
+        </p:nvPicPr>
+        <p:blipFill>
+          <a:blip r:embed="rId2">
+            <a:extLst>
+              <a:ext uri="{28A0092B-C50C-407E-A947-70E740481C1C}">
+                <a14:useLocalDpi xmlns:a14="http://schemas.microsoft.com/office/drawing/2010/main" val="0"/>
+              </a:ext>
+            </a:extLst>
+          </a:blip>
+          <a:stretch>
+            <a:fillRect/>
+          </a:stretch>
+        </p:blipFill>
+        <p:spPr>
+          <a:xfrm>
+            <a:off x="3368462" y="1691786"/>
+            <a:ext cx="8692699" cy="3687625"/>
+          </a:xfrm>
+          <a:prstGeom prst="rect">
+            <a:avLst/>
+          </a:prstGeom>
+        </p:spPr>
+      </p:pic>
     </p:spTree>
     <p:extLst>
       <p:ext uri="{BB962C8B-B14F-4D97-AF65-F5344CB8AC3E}">
@@ -34532,7 +34489,7 @@
                                           </p:stCondLst>
                                         </p:cTn>
                                         <p:tgtEl>
-                                          <p:spTgt spid="15"/>
+                                          <p:spTgt spid="17"/>
                                         </p:tgtEl>
                                         <p:attrNameLst>
                                           <p:attrName>style.visibility</p:attrName>
@@ -34546,7 +34503,7 @@
                                       <p:cBhvr>
                                         <p:cTn id="7" dur="500" fill="hold"/>
                                         <p:tgtEl>
-                                          <p:spTgt spid="15"/>
+                                          <p:spTgt spid="17"/>
                                         </p:tgtEl>
                                         <p:attrNameLst>
                                           <p:attrName>ppt_w</p:attrName>
@@ -34569,7 +34526,7 @@
                                       <p:cBhvr>
                                         <p:cTn id="8" dur="500" fill="hold"/>
                                         <p:tgtEl>
-                                          <p:spTgt spid="15"/>
+                                          <p:spTgt spid="17"/>
                                         </p:tgtEl>
                                         <p:attrNameLst>
                                           <p:attrName>ppt_h</p:attrName>
@@ -34592,109 +34549,10 @@
                                       <p:cBhvr>
                                         <p:cTn id="9" dur="500"/>
                                         <p:tgtEl>
-                                          <p:spTgt spid="15"/>
+                                          <p:spTgt spid="17"/>
                                         </p:tgtEl>
                                       </p:cBhvr>
                                     </p:animEffect>
-                                  </p:childTnLst>
-                                </p:cTn>
-                              </p:par>
-                            </p:childTnLst>
-                          </p:cTn>
-                        </p:par>
-                      </p:childTnLst>
-                    </p:cTn>
-                  </p:par>
-                  <p:par>
-                    <p:cTn id="10" fill="hold">
-                      <p:stCondLst>
-                        <p:cond delay="indefinite"/>
-                      </p:stCondLst>
-                      <p:childTnLst>
-                        <p:par>
-                          <p:cTn id="11" fill="hold">
-                            <p:stCondLst>
-                              <p:cond delay="0"/>
-                            </p:stCondLst>
-                            <p:childTnLst>
-                              <p:par>
-                                <p:cTn id="12" presetID="53" presetClass="exit" presetSubtype="32" fill="hold" nodeType="clickEffect">
-                                  <p:stCondLst>
-                                    <p:cond delay="0"/>
-                                  </p:stCondLst>
-                                  <p:childTnLst>
-                                    <p:anim calcmode="lin" valueType="num">
-                                      <p:cBhvr>
-                                        <p:cTn id="13" dur="500"/>
-                                        <p:tgtEl>
-                                          <p:spTgt spid="15"/>
-                                        </p:tgtEl>
-                                        <p:attrNameLst>
-                                          <p:attrName>ppt_w</p:attrName>
-                                        </p:attrNameLst>
-                                      </p:cBhvr>
-                                      <p:tavLst>
-                                        <p:tav tm="0">
-                                          <p:val>
-                                            <p:strVal val="ppt_w"/>
-                                          </p:val>
-                                        </p:tav>
-                                        <p:tav tm="100000">
-                                          <p:val>
-                                            <p:fltVal val="0"/>
-                                          </p:val>
-                                        </p:tav>
-                                      </p:tavLst>
-                                    </p:anim>
-                                    <p:anim calcmode="lin" valueType="num">
-                                      <p:cBhvr>
-                                        <p:cTn id="14" dur="500"/>
-                                        <p:tgtEl>
-                                          <p:spTgt spid="15"/>
-                                        </p:tgtEl>
-                                        <p:attrNameLst>
-                                          <p:attrName>ppt_h</p:attrName>
-                                        </p:attrNameLst>
-                                      </p:cBhvr>
-                                      <p:tavLst>
-                                        <p:tav tm="0">
-                                          <p:val>
-                                            <p:strVal val="ppt_h"/>
-                                          </p:val>
-                                        </p:tav>
-                                        <p:tav tm="100000">
-                                          <p:val>
-                                            <p:fltVal val="0"/>
-                                          </p:val>
-                                        </p:tav>
-                                      </p:tavLst>
-                                    </p:anim>
-                                    <p:animEffect transition="out" filter="fade">
-                                      <p:cBhvr>
-                                        <p:cTn id="15" dur="500"/>
-                                        <p:tgtEl>
-                                          <p:spTgt spid="15"/>
-                                        </p:tgtEl>
-                                      </p:cBhvr>
-                                    </p:animEffect>
-                                    <p:set>
-                                      <p:cBhvr>
-                                        <p:cTn id="16" dur="1" fill="hold">
-                                          <p:stCondLst>
-                                            <p:cond delay="499"/>
-                                          </p:stCondLst>
-                                        </p:cTn>
-                                        <p:tgtEl>
-                                          <p:spTgt spid="15"/>
-                                        </p:tgtEl>
-                                        <p:attrNameLst>
-                                          <p:attrName>style.visibility</p:attrName>
-                                        </p:attrNameLst>
-                                      </p:cBhvr>
-                                      <p:to>
-                                        <p:strVal val="hidden"/>
-                                      </p:to>
-                                    </p:set>
                                   </p:childTnLst>
                                 </p:cTn>
                               </p:par>
@@ -34730,6 +34588,1614 @@
 </file>
 
 <file path=ppt/slides/slide15.xml><?xml version="1.0" encoding="utf-8"?>
+<p:sld xmlns:a="http://schemas.openxmlformats.org/drawingml/2006/main" xmlns:r="http://schemas.openxmlformats.org/officeDocument/2006/relationships" xmlns:p="http://schemas.openxmlformats.org/presentationml/2006/main">
+  <p:cSld>
+    <p:spTree>
+      <p:nvGrpSpPr>
+        <p:cNvPr id="1" name=""/>
+        <p:cNvGrpSpPr/>
+        <p:nvPr/>
+      </p:nvGrpSpPr>
+      <p:grpSpPr>
+        <a:xfrm>
+          <a:off x="0" y="0"/>
+          <a:ext cx="0" cy="0"/>
+          <a:chOff x="0" y="0"/>
+          <a:chExt cx="0" cy="0"/>
+        </a:xfrm>
+      </p:grpSpPr>
+      <p:sp useBgFill="1">
+        <p:nvSpPr>
+          <p:cNvPr id="10" name="Rectangle 9"/>
+          <p:cNvSpPr>
+            <a:spLocks noGrp="1" noRot="1" noChangeAspect="1" noMove="1" noResize="1" noEditPoints="1" noAdjustHandles="1" noChangeArrowheads="1" noChangeShapeType="1" noTextEdit="1"/>
+          </p:cNvSpPr>
+          <p:nvPr/>
+        </p:nvSpPr>
+        <p:spPr>
+          <a:xfrm>
+            <a:off x="0" y="0"/>
+            <a:ext cx="12192000" cy="6858000"/>
+          </a:xfrm>
+          <a:prstGeom prst="rect">
+            <a:avLst/>
+          </a:prstGeom>
+          <a:ln>
+            <a:noFill/>
+          </a:ln>
+        </p:spPr>
+        <p:style>
+          <a:lnRef idx="2">
+            <a:schemeClr val="accent1">
+              <a:shade val="50000"/>
+            </a:schemeClr>
+          </a:lnRef>
+          <a:fillRef idx="1">
+            <a:schemeClr val="accent1"/>
+          </a:fillRef>
+          <a:effectRef idx="0">
+            <a:schemeClr val="accent1"/>
+          </a:effectRef>
+          <a:fontRef idx="minor">
+            <a:schemeClr val="lt1"/>
+          </a:fontRef>
+        </p:style>
+        <p:txBody>
+          <a:bodyPr rtlCol="0" anchor="ctr"/>
+          <a:lstStyle/>
+          <a:p>
+            <a:pPr algn="ctr"/>
+            <a:endParaRPr lang="en-US" dirty="0"/>
+          </a:p>
+        </p:txBody>
+      </p:sp>
+      <p:sp>
+        <p:nvSpPr>
+          <p:cNvPr id="2" name="Título 1"/>
+          <p:cNvSpPr>
+            <a:spLocks noGrp="1"/>
+          </p:cNvSpPr>
+          <p:nvPr>
+            <p:ph type="title"/>
+          </p:nvPr>
+        </p:nvSpPr>
+        <p:spPr>
+          <a:xfrm>
+            <a:off x="1812897" y="518649"/>
+            <a:ext cx="9882278" cy="1067634"/>
+          </a:xfrm>
+        </p:spPr>
+        <p:txBody>
+          <a:bodyPr anchor="ctr">
+            <a:normAutofit/>
+          </a:bodyPr>
+          <a:lstStyle/>
+          <a:p>
+            <a:r>
+              <a:rPr lang="pt-BR" dirty="0"/>
+              <a:t>Aplicação</a:t>
+            </a:r>
+          </a:p>
+        </p:txBody>
+      </p:sp>
+      <p:grpSp>
+        <p:nvGrpSpPr>
+          <p:cNvPr id="12" name="Group 11"/>
+          <p:cNvGrpSpPr>
+            <a:grpSpLocks noGrp="1" noUngrp="1" noRot="1" noChangeAspect="1" noMove="1" noResize="1"/>
+          </p:cNvGrpSpPr>
+          <p:nvPr/>
+        </p:nvGrpSpPr>
+        <p:grpSpPr>
+          <a:xfrm>
+            <a:off x="472021" y="628863"/>
+            <a:ext cx="1128382" cy="847206"/>
+            <a:chOff x="8183879" y="1000124"/>
+            <a:chExt cx="1562267" cy="1172973"/>
+          </a:xfrm>
+        </p:grpSpPr>
+        <p:sp>
+          <p:nvSpPr>
+            <p:cNvPr id="13" name="Freeform 5"/>
+            <p:cNvSpPr/>
+            <p:nvPr/>
+          </p:nvSpPr>
+          <p:spPr bwMode="auto">
+            <a:xfrm>
+              <a:off x="8183879" y="1348782"/>
+              <a:ext cx="935037" cy="824315"/>
+            </a:xfrm>
+            <a:custGeom>
+              <a:avLst/>
+              <a:gdLst>
+                <a:gd name="T0" fmla="*/ 225 w 785"/>
+                <a:gd name="T1" fmla="*/ 692 h 692"/>
+                <a:gd name="T2" fmla="*/ 177 w 785"/>
+                <a:gd name="T3" fmla="*/ 665 h 692"/>
+                <a:gd name="T4" fmla="*/ 9 w 785"/>
+                <a:gd name="T5" fmla="*/ 374 h 692"/>
+                <a:gd name="T6" fmla="*/ 9 w 785"/>
+                <a:gd name="T7" fmla="*/ 318 h 692"/>
+                <a:gd name="T8" fmla="*/ 177 w 785"/>
+                <a:gd name="T9" fmla="*/ 27 h 692"/>
+                <a:gd name="T10" fmla="*/ 225 w 785"/>
+                <a:gd name="T11" fmla="*/ 0 h 692"/>
+                <a:gd name="T12" fmla="*/ 561 w 785"/>
+                <a:gd name="T13" fmla="*/ 0 h 692"/>
+                <a:gd name="T14" fmla="*/ 609 w 785"/>
+                <a:gd name="T15" fmla="*/ 27 h 692"/>
+                <a:gd name="T16" fmla="*/ 777 w 785"/>
+                <a:gd name="T17" fmla="*/ 318 h 692"/>
+                <a:gd name="T18" fmla="*/ 777 w 785"/>
+                <a:gd name="T19" fmla="*/ 374 h 692"/>
+                <a:gd name="T20" fmla="*/ 609 w 785"/>
+                <a:gd name="T21" fmla="*/ 665 h 692"/>
+                <a:gd name="T22" fmla="*/ 561 w 785"/>
+                <a:gd name="T23" fmla="*/ 692 h 692"/>
+                <a:gd name="T24" fmla="*/ 225 w 785"/>
+                <a:gd name="T25" fmla="*/ 692 h 692"/>
+              </a:gdLst>
+              <a:ahLst/>
+              <a:cxnLst>
+                <a:cxn ang="0">
+                  <a:pos x="T0" y="T1"/>
+                </a:cxn>
+                <a:cxn ang="0">
+                  <a:pos x="T2" y="T3"/>
+                </a:cxn>
+                <a:cxn ang="0">
+                  <a:pos x="T4" y="T5"/>
+                </a:cxn>
+                <a:cxn ang="0">
+                  <a:pos x="T6" y="T7"/>
+                </a:cxn>
+                <a:cxn ang="0">
+                  <a:pos x="T8" y="T9"/>
+                </a:cxn>
+                <a:cxn ang="0">
+                  <a:pos x="T10" y="T11"/>
+                </a:cxn>
+                <a:cxn ang="0">
+                  <a:pos x="T12" y="T13"/>
+                </a:cxn>
+                <a:cxn ang="0">
+                  <a:pos x="T14" y="T15"/>
+                </a:cxn>
+                <a:cxn ang="0">
+                  <a:pos x="T16" y="T17"/>
+                </a:cxn>
+                <a:cxn ang="0">
+                  <a:pos x="T18" y="T19"/>
+                </a:cxn>
+                <a:cxn ang="0">
+                  <a:pos x="T20" y="T21"/>
+                </a:cxn>
+                <a:cxn ang="0">
+                  <a:pos x="T22" y="T23"/>
+                </a:cxn>
+                <a:cxn ang="0">
+                  <a:pos x="T24" y="T25"/>
+                </a:cxn>
+              </a:cxnLst>
+              <a:rect l="0" t="0" r="r" b="b"/>
+              <a:pathLst>
+                <a:path w="785" h="692">
+                  <a:moveTo>
+                    <a:pt x="225" y="692"/>
+                  </a:moveTo>
+                  <a:cubicBezTo>
+                    <a:pt x="207" y="692"/>
+                    <a:pt x="185" y="680"/>
+                    <a:pt x="177" y="665"/>
+                  </a:cubicBezTo>
+                  <a:cubicBezTo>
+                    <a:pt x="9" y="374"/>
+                    <a:pt x="9" y="374"/>
+                    <a:pt x="9" y="374"/>
+                  </a:cubicBezTo>
+                  <a:cubicBezTo>
+                    <a:pt x="0" y="358"/>
+                    <a:pt x="0" y="334"/>
+                    <a:pt x="9" y="318"/>
+                  </a:cubicBezTo>
+                  <a:cubicBezTo>
+                    <a:pt x="177" y="27"/>
+                    <a:pt x="177" y="27"/>
+                    <a:pt x="177" y="27"/>
+                  </a:cubicBezTo>
+                  <a:cubicBezTo>
+                    <a:pt x="185" y="12"/>
+                    <a:pt x="207" y="0"/>
+                    <a:pt x="225" y="0"/>
+                  </a:cubicBezTo>
+                  <a:cubicBezTo>
+                    <a:pt x="561" y="0"/>
+                    <a:pt x="561" y="0"/>
+                    <a:pt x="561" y="0"/>
+                  </a:cubicBezTo>
+                  <a:cubicBezTo>
+                    <a:pt x="578" y="0"/>
+                    <a:pt x="600" y="12"/>
+                    <a:pt x="609" y="27"/>
+                  </a:cubicBezTo>
+                  <a:cubicBezTo>
+                    <a:pt x="777" y="318"/>
+                    <a:pt x="777" y="318"/>
+                    <a:pt x="777" y="318"/>
+                  </a:cubicBezTo>
+                  <a:cubicBezTo>
+                    <a:pt x="785" y="334"/>
+                    <a:pt x="785" y="358"/>
+                    <a:pt x="777" y="374"/>
+                  </a:cubicBezTo>
+                  <a:cubicBezTo>
+                    <a:pt x="609" y="665"/>
+                    <a:pt x="609" y="665"/>
+                    <a:pt x="609" y="665"/>
+                  </a:cubicBezTo>
+                  <a:cubicBezTo>
+                    <a:pt x="600" y="680"/>
+                    <a:pt x="578" y="692"/>
+                    <a:pt x="561" y="692"/>
+                  </a:cubicBezTo>
+                  <a:lnTo>
+                    <a:pt x="225" y="692"/>
+                  </a:lnTo>
+                  <a:close/>
+                </a:path>
+              </a:pathLst>
+            </a:custGeom>
+            <a:noFill/>
+            <a:ln w="28575" cmpd="sng">
+              <a:solidFill>
+                <a:schemeClr val="tx1"/>
+              </a:solidFill>
+            </a:ln>
+          </p:spPr>
+          <p:txBody>
+            <a:bodyPr vert="horz" wrap="square" lIns="91440" tIns="45720" rIns="91440" bIns="45720" numCol="1" anchor="t" anchorCtr="0" compatLnSpc="1"/>
+            <a:lstStyle/>
+            <a:p>
+              <a:endParaRPr lang="en-US"/>
+            </a:p>
+          </p:txBody>
+        </p:sp>
+        <p:sp>
+          <p:nvSpPr>
+            <p:cNvPr id="14" name="Freeform 5"/>
+            <p:cNvSpPr/>
+            <p:nvPr/>
+          </p:nvSpPr>
+          <p:spPr bwMode="auto">
+            <a:xfrm>
+              <a:off x="8983979" y="1000124"/>
+              <a:ext cx="762167" cy="671915"/>
+            </a:xfrm>
+            <a:custGeom>
+              <a:avLst/>
+              <a:gdLst>
+                <a:gd name="T0" fmla="*/ 225 w 785"/>
+                <a:gd name="T1" fmla="*/ 692 h 692"/>
+                <a:gd name="T2" fmla="*/ 177 w 785"/>
+                <a:gd name="T3" fmla="*/ 665 h 692"/>
+                <a:gd name="T4" fmla="*/ 9 w 785"/>
+                <a:gd name="T5" fmla="*/ 374 h 692"/>
+                <a:gd name="T6" fmla="*/ 9 w 785"/>
+                <a:gd name="T7" fmla="*/ 318 h 692"/>
+                <a:gd name="T8" fmla="*/ 177 w 785"/>
+                <a:gd name="T9" fmla="*/ 27 h 692"/>
+                <a:gd name="T10" fmla="*/ 225 w 785"/>
+                <a:gd name="T11" fmla="*/ 0 h 692"/>
+                <a:gd name="T12" fmla="*/ 561 w 785"/>
+                <a:gd name="T13" fmla="*/ 0 h 692"/>
+                <a:gd name="T14" fmla="*/ 609 w 785"/>
+                <a:gd name="T15" fmla="*/ 27 h 692"/>
+                <a:gd name="T16" fmla="*/ 777 w 785"/>
+                <a:gd name="T17" fmla="*/ 318 h 692"/>
+                <a:gd name="T18" fmla="*/ 777 w 785"/>
+                <a:gd name="T19" fmla="*/ 374 h 692"/>
+                <a:gd name="T20" fmla="*/ 609 w 785"/>
+                <a:gd name="T21" fmla="*/ 665 h 692"/>
+                <a:gd name="T22" fmla="*/ 561 w 785"/>
+                <a:gd name="T23" fmla="*/ 692 h 692"/>
+                <a:gd name="T24" fmla="*/ 225 w 785"/>
+                <a:gd name="T25" fmla="*/ 692 h 692"/>
+              </a:gdLst>
+              <a:ahLst/>
+              <a:cxnLst>
+                <a:cxn ang="0">
+                  <a:pos x="T0" y="T1"/>
+                </a:cxn>
+                <a:cxn ang="0">
+                  <a:pos x="T2" y="T3"/>
+                </a:cxn>
+                <a:cxn ang="0">
+                  <a:pos x="T4" y="T5"/>
+                </a:cxn>
+                <a:cxn ang="0">
+                  <a:pos x="T6" y="T7"/>
+                </a:cxn>
+                <a:cxn ang="0">
+                  <a:pos x="T8" y="T9"/>
+                </a:cxn>
+                <a:cxn ang="0">
+                  <a:pos x="T10" y="T11"/>
+                </a:cxn>
+                <a:cxn ang="0">
+                  <a:pos x="T12" y="T13"/>
+                </a:cxn>
+                <a:cxn ang="0">
+                  <a:pos x="T14" y="T15"/>
+                </a:cxn>
+                <a:cxn ang="0">
+                  <a:pos x="T16" y="T17"/>
+                </a:cxn>
+                <a:cxn ang="0">
+                  <a:pos x="T18" y="T19"/>
+                </a:cxn>
+                <a:cxn ang="0">
+                  <a:pos x="T20" y="T21"/>
+                </a:cxn>
+                <a:cxn ang="0">
+                  <a:pos x="T22" y="T23"/>
+                </a:cxn>
+                <a:cxn ang="0">
+                  <a:pos x="T24" y="T25"/>
+                </a:cxn>
+              </a:cxnLst>
+              <a:rect l="0" t="0" r="r" b="b"/>
+              <a:pathLst>
+                <a:path w="785" h="692">
+                  <a:moveTo>
+                    <a:pt x="225" y="692"/>
+                  </a:moveTo>
+                  <a:cubicBezTo>
+                    <a:pt x="207" y="692"/>
+                    <a:pt x="185" y="680"/>
+                    <a:pt x="177" y="665"/>
+                  </a:cubicBezTo>
+                  <a:cubicBezTo>
+                    <a:pt x="9" y="374"/>
+                    <a:pt x="9" y="374"/>
+                    <a:pt x="9" y="374"/>
+                  </a:cubicBezTo>
+                  <a:cubicBezTo>
+                    <a:pt x="0" y="358"/>
+                    <a:pt x="0" y="334"/>
+                    <a:pt x="9" y="318"/>
+                  </a:cubicBezTo>
+                  <a:cubicBezTo>
+                    <a:pt x="177" y="27"/>
+                    <a:pt x="177" y="27"/>
+                    <a:pt x="177" y="27"/>
+                  </a:cubicBezTo>
+                  <a:cubicBezTo>
+                    <a:pt x="185" y="12"/>
+                    <a:pt x="207" y="0"/>
+                    <a:pt x="225" y="0"/>
+                  </a:cubicBezTo>
+                  <a:cubicBezTo>
+                    <a:pt x="561" y="0"/>
+                    <a:pt x="561" y="0"/>
+                    <a:pt x="561" y="0"/>
+                  </a:cubicBezTo>
+                  <a:cubicBezTo>
+                    <a:pt x="578" y="0"/>
+                    <a:pt x="600" y="12"/>
+                    <a:pt x="609" y="27"/>
+                  </a:cubicBezTo>
+                  <a:cubicBezTo>
+                    <a:pt x="777" y="318"/>
+                    <a:pt x="777" y="318"/>
+                    <a:pt x="777" y="318"/>
+                  </a:cubicBezTo>
+                  <a:cubicBezTo>
+                    <a:pt x="785" y="334"/>
+                    <a:pt x="785" y="358"/>
+                    <a:pt x="777" y="374"/>
+                  </a:cubicBezTo>
+                  <a:cubicBezTo>
+                    <a:pt x="609" y="665"/>
+                    <a:pt x="609" y="665"/>
+                    <a:pt x="609" y="665"/>
+                  </a:cubicBezTo>
+                  <a:cubicBezTo>
+                    <a:pt x="600" y="680"/>
+                    <a:pt x="578" y="692"/>
+                    <a:pt x="561" y="692"/>
+                  </a:cubicBezTo>
+                  <a:lnTo>
+                    <a:pt x="225" y="692"/>
+                  </a:lnTo>
+                  <a:close/>
+                </a:path>
+              </a:pathLst>
+            </a:custGeom>
+            <a:noFill/>
+            <a:ln w="28575" cmpd="sng">
+              <a:solidFill>
+                <a:schemeClr val="tx1"/>
+              </a:solidFill>
+            </a:ln>
+          </p:spPr>
+          <p:txBody>
+            <a:bodyPr vert="horz" wrap="square" lIns="91440" tIns="45720" rIns="91440" bIns="45720" numCol="1" anchor="t" anchorCtr="0" compatLnSpc="1"/>
+            <a:lstStyle/>
+            <a:p>
+              <a:endParaRPr lang="en-US"/>
+            </a:p>
+          </p:txBody>
+        </p:sp>
+      </p:grpSp>
+      <p:sp>
+        <p:nvSpPr>
+          <p:cNvPr id="3" name="CaixaDeTexto 2">
+            <a:extLst>
+              <a:ext uri="{FF2B5EF4-FFF2-40B4-BE49-F238E27FC236}">
+                <a16:creationId xmlns:a16="http://schemas.microsoft.com/office/drawing/2014/main" id="{19035CAF-1C8B-4AE3-8033-3A58E61E6860}"/>
+              </a:ext>
+            </a:extLst>
+          </p:cNvPr>
+          <p:cNvSpPr txBox="1"/>
+          <p:nvPr/>
+        </p:nvSpPr>
+        <p:spPr>
+          <a:xfrm>
+            <a:off x="496827" y="2172092"/>
+            <a:ext cx="3288958" cy="369332"/>
+          </a:xfrm>
+          <a:prstGeom prst="rect">
+            <a:avLst/>
+          </a:prstGeom>
+          <a:noFill/>
+        </p:spPr>
+        <p:txBody>
+          <a:bodyPr wrap="square" rtlCol="0">
+            <a:spAutoFit/>
+          </a:bodyPr>
+          <a:lstStyle/>
+          <a:p>
+            <a:r>
+              <a:rPr lang="pt-BR" dirty="0"/>
+              <a:t>- Modelagem de Dados</a:t>
+            </a:r>
+          </a:p>
+        </p:txBody>
+      </p:sp>
+      <p:sp>
+        <p:nvSpPr>
+          <p:cNvPr id="9" name="CaixaDeTexto 8">
+            <a:extLst>
+              <a:ext uri="{FF2B5EF4-FFF2-40B4-BE49-F238E27FC236}">
+                <a16:creationId xmlns:a16="http://schemas.microsoft.com/office/drawing/2014/main" id="{9DB075A3-56FB-45D0-9830-D7302566A0CB}"/>
+              </a:ext>
+            </a:extLst>
+          </p:cNvPr>
+          <p:cNvSpPr txBox="1"/>
+          <p:nvPr/>
+        </p:nvSpPr>
+        <p:spPr>
+          <a:xfrm>
+            <a:off x="484424" y="2757243"/>
+            <a:ext cx="3288958" cy="400110"/>
+          </a:xfrm>
+          <a:prstGeom prst="rect">
+            <a:avLst/>
+          </a:prstGeom>
+          <a:noFill/>
+          <a:effectLst>
+            <a:outerShdw blurRad="50800" dist="38100" dir="5400000" algn="t" rotWithShape="0">
+              <a:prstClr val="black">
+                <a:alpha val="40000"/>
+              </a:prstClr>
+            </a:outerShdw>
+          </a:effectLst>
+        </p:spPr>
+        <p:txBody>
+          <a:bodyPr wrap="square" rtlCol="0">
+            <a:spAutoFit/>
+          </a:bodyPr>
+          <a:lstStyle/>
+          <a:p>
+            <a:r>
+              <a:rPr lang="pt-BR" sz="2000" dirty="0"/>
+              <a:t>- Desenho de Arquitetura</a:t>
+            </a:r>
+          </a:p>
+        </p:txBody>
+      </p:sp>
+      <p:sp>
+        <p:nvSpPr>
+          <p:cNvPr id="11" name="CaixaDeTexto 10">
+            <a:extLst>
+              <a:ext uri="{FF2B5EF4-FFF2-40B4-BE49-F238E27FC236}">
+                <a16:creationId xmlns:a16="http://schemas.microsoft.com/office/drawing/2014/main" id="{16EB44B9-02AC-4947-965B-A08DBFC98023}"/>
+              </a:ext>
+            </a:extLst>
+          </p:cNvPr>
+          <p:cNvSpPr txBox="1"/>
+          <p:nvPr/>
+        </p:nvSpPr>
+        <p:spPr>
+          <a:xfrm>
+            <a:off x="472021" y="3350933"/>
+            <a:ext cx="3288958" cy="369332"/>
+          </a:xfrm>
+          <a:prstGeom prst="rect">
+            <a:avLst/>
+          </a:prstGeom>
+          <a:noFill/>
+        </p:spPr>
+        <p:txBody>
+          <a:bodyPr wrap="square" rtlCol="0">
+            <a:spAutoFit/>
+          </a:bodyPr>
+          <a:lstStyle/>
+          <a:p>
+            <a:r>
+              <a:rPr lang="pt-BR" dirty="0"/>
+              <a:t>- Diagrama de Classe</a:t>
+            </a:r>
+          </a:p>
+        </p:txBody>
+      </p:sp>
+      <p:sp>
+        <p:nvSpPr>
+          <p:cNvPr id="16" name="CaixaDeTexto 15">
+            <a:extLst>
+              <a:ext uri="{FF2B5EF4-FFF2-40B4-BE49-F238E27FC236}">
+                <a16:creationId xmlns:a16="http://schemas.microsoft.com/office/drawing/2014/main" id="{DE7433E1-F016-48B0-8744-19C111456B85}"/>
+              </a:ext>
+            </a:extLst>
+          </p:cNvPr>
+          <p:cNvSpPr txBox="1"/>
+          <p:nvPr/>
+        </p:nvSpPr>
+        <p:spPr>
+          <a:xfrm>
+            <a:off x="472021" y="3944623"/>
+            <a:ext cx="3288958" cy="369332"/>
+          </a:xfrm>
+          <a:prstGeom prst="rect">
+            <a:avLst/>
+          </a:prstGeom>
+          <a:noFill/>
+        </p:spPr>
+        <p:txBody>
+          <a:bodyPr wrap="square" rtlCol="0">
+            <a:spAutoFit/>
+          </a:bodyPr>
+          <a:lstStyle/>
+          <a:p>
+            <a:r>
+              <a:rPr lang="pt-BR" dirty="0"/>
+              <a:t>- Planilha de Testes</a:t>
+            </a:r>
+          </a:p>
+        </p:txBody>
+      </p:sp>
+      <p:sp>
+        <p:nvSpPr>
+          <p:cNvPr id="20" name="CaixaDeTexto 19">
+            <a:extLst>
+              <a:ext uri="{FF2B5EF4-FFF2-40B4-BE49-F238E27FC236}">
+                <a16:creationId xmlns:a16="http://schemas.microsoft.com/office/drawing/2014/main" id="{E81768B2-0974-4D89-BB1D-234A1ECBF059}"/>
+              </a:ext>
+            </a:extLst>
+          </p:cNvPr>
+          <p:cNvSpPr txBox="1"/>
+          <p:nvPr/>
+        </p:nvSpPr>
+        <p:spPr>
+          <a:xfrm>
+            <a:off x="496827" y="4519325"/>
+            <a:ext cx="3288958" cy="369332"/>
+          </a:xfrm>
+          <a:prstGeom prst="rect">
+            <a:avLst/>
+          </a:prstGeom>
+          <a:noFill/>
+          <a:effectLst/>
+        </p:spPr>
+        <p:txBody>
+          <a:bodyPr wrap="square" rtlCol="0">
+            <a:spAutoFit/>
+          </a:bodyPr>
+          <a:lstStyle/>
+          <a:p>
+            <a:r>
+              <a:rPr lang="pt-BR" dirty="0"/>
+              <a:t>- Arquivo de Exportação</a:t>
+            </a:r>
+          </a:p>
+        </p:txBody>
+      </p:sp>
+      <p:pic>
+        <p:nvPicPr>
+          <p:cNvPr id="7" name="Imagem 6" descr="Tela de celular com texto preto sobre fundo branco&#10;&#10;Descrição gerada automaticamente">
+            <a:extLst>
+              <a:ext uri="{FF2B5EF4-FFF2-40B4-BE49-F238E27FC236}">
+                <a16:creationId xmlns:a16="http://schemas.microsoft.com/office/drawing/2014/main" id="{91554513-C358-446F-ABDC-9AC81E9B4E24}"/>
+              </a:ext>
+            </a:extLst>
+          </p:cNvPr>
+          <p:cNvPicPr>
+            <a:picLocks noChangeAspect="1"/>
+          </p:cNvPicPr>
+          <p:nvPr/>
+        </p:nvPicPr>
+        <p:blipFill>
+          <a:blip r:embed="rId2">
+            <a:extLst>
+              <a:ext uri="{28A0092B-C50C-407E-A947-70E740481C1C}">
+                <a14:useLocalDpi xmlns:a14="http://schemas.microsoft.com/office/drawing/2010/main" val="0"/>
+              </a:ext>
+            </a:extLst>
+          </a:blip>
+          <a:stretch>
+            <a:fillRect/>
+          </a:stretch>
+        </p:blipFill>
+        <p:spPr>
+          <a:xfrm>
+            <a:off x="4521091" y="1138990"/>
+            <a:ext cx="6505575" cy="5162550"/>
+          </a:xfrm>
+          <a:prstGeom prst="rect">
+            <a:avLst/>
+          </a:prstGeom>
+        </p:spPr>
+      </p:pic>
+    </p:spTree>
+    <p:extLst>
+      <p:ext uri="{BB962C8B-B14F-4D97-AF65-F5344CB8AC3E}">
+        <p14:creationId xmlns:p14="http://schemas.microsoft.com/office/powerpoint/2010/main" val="1834702266"/>
+      </p:ext>
+    </p:extLst>
+  </p:cSld>
+  <p:clrMapOvr>
+    <a:masterClrMapping/>
+  </p:clrMapOvr>
+  <p:timing>
+    <p:tnLst>
+      <p:par>
+        <p:cTn id="1" dur="indefinite" restart="never" nodeType="tmRoot">
+          <p:childTnLst>
+            <p:seq concurrent="1" nextAc="seek">
+              <p:cTn id="2" dur="indefinite" nodeType="mainSeq">
+                <p:childTnLst>
+                  <p:par>
+                    <p:cTn id="3" fill="hold">
+                      <p:stCondLst>
+                        <p:cond delay="indefinite"/>
+                        <p:cond evt="onBegin" delay="0">
+                          <p:tn val="2"/>
+                        </p:cond>
+                      </p:stCondLst>
+                      <p:childTnLst>
+                        <p:par>
+                          <p:cTn id="4" fill="hold">
+                            <p:stCondLst>
+                              <p:cond delay="0"/>
+                            </p:stCondLst>
+                            <p:childTnLst>
+                              <p:par>
+                                <p:cTn id="5" presetID="53" presetClass="entr" presetSubtype="16" fill="hold" nodeType="withEffect">
+                                  <p:stCondLst>
+                                    <p:cond delay="0"/>
+                                  </p:stCondLst>
+                                  <p:childTnLst>
+                                    <p:set>
+                                      <p:cBhvr>
+                                        <p:cTn id="6" dur="1" fill="hold">
+                                          <p:stCondLst>
+                                            <p:cond delay="0"/>
+                                          </p:stCondLst>
+                                        </p:cTn>
+                                        <p:tgtEl>
+                                          <p:spTgt spid="7"/>
+                                        </p:tgtEl>
+                                        <p:attrNameLst>
+                                          <p:attrName>style.visibility</p:attrName>
+                                        </p:attrNameLst>
+                                      </p:cBhvr>
+                                      <p:to>
+                                        <p:strVal val="visible"/>
+                                      </p:to>
+                                    </p:set>
+                                    <p:anim calcmode="lin" valueType="num">
+                                      <p:cBhvr>
+                                        <p:cTn id="7" dur="500" fill="hold"/>
+                                        <p:tgtEl>
+                                          <p:spTgt spid="7"/>
+                                        </p:tgtEl>
+                                        <p:attrNameLst>
+                                          <p:attrName>ppt_w</p:attrName>
+                                        </p:attrNameLst>
+                                      </p:cBhvr>
+                                      <p:tavLst>
+                                        <p:tav tm="0">
+                                          <p:val>
+                                            <p:fltVal val="0"/>
+                                          </p:val>
+                                        </p:tav>
+                                        <p:tav tm="100000">
+                                          <p:val>
+                                            <p:strVal val="#ppt_w"/>
+                                          </p:val>
+                                        </p:tav>
+                                      </p:tavLst>
+                                    </p:anim>
+                                    <p:anim calcmode="lin" valueType="num">
+                                      <p:cBhvr>
+                                        <p:cTn id="8" dur="500" fill="hold"/>
+                                        <p:tgtEl>
+                                          <p:spTgt spid="7"/>
+                                        </p:tgtEl>
+                                        <p:attrNameLst>
+                                          <p:attrName>ppt_h</p:attrName>
+                                        </p:attrNameLst>
+                                      </p:cBhvr>
+                                      <p:tavLst>
+                                        <p:tav tm="0">
+                                          <p:val>
+                                            <p:fltVal val="0"/>
+                                          </p:val>
+                                        </p:tav>
+                                        <p:tav tm="100000">
+                                          <p:val>
+                                            <p:strVal val="#ppt_h"/>
+                                          </p:val>
+                                        </p:tav>
+                                      </p:tavLst>
+                                    </p:anim>
+                                    <p:animEffect transition="in" filter="fade">
+                                      <p:cBhvr>
+                                        <p:cTn id="9" dur="500"/>
+                                        <p:tgtEl>
+                                          <p:spTgt spid="7"/>
+                                        </p:tgtEl>
+                                      </p:cBhvr>
+                                    </p:animEffect>
+                                  </p:childTnLst>
+                                </p:cTn>
+                              </p:par>
+                            </p:childTnLst>
+                          </p:cTn>
+                        </p:par>
+                      </p:childTnLst>
+                    </p:cTn>
+                  </p:par>
+                </p:childTnLst>
+              </p:cTn>
+              <p:prevCondLst>
+                <p:cond evt="onPrev" delay="0">
+                  <p:tgtEl>
+                    <p:sldTgt/>
+                  </p:tgtEl>
+                </p:cond>
+              </p:prevCondLst>
+              <p:nextCondLst>
+                <p:cond evt="onNext" delay="0">
+                  <p:tgtEl>
+                    <p:sldTgt/>
+                  </p:tgtEl>
+                </p:cond>
+              </p:nextCondLst>
+            </p:seq>
+          </p:childTnLst>
+        </p:cTn>
+      </p:par>
+    </p:tnLst>
+  </p:timing>
+</p:sld>
+</file>
+
+<file path=ppt/slides/slide16.xml><?xml version="1.0" encoding="utf-8"?>
+<p:sld xmlns:a="http://schemas.openxmlformats.org/drawingml/2006/main" xmlns:r="http://schemas.openxmlformats.org/officeDocument/2006/relationships" xmlns:p="http://schemas.openxmlformats.org/presentationml/2006/main">
+  <p:cSld>
+    <p:spTree>
+      <p:nvGrpSpPr>
+        <p:cNvPr id="1" name=""/>
+        <p:cNvGrpSpPr/>
+        <p:nvPr/>
+      </p:nvGrpSpPr>
+      <p:grpSpPr>
+        <a:xfrm>
+          <a:off x="0" y="0"/>
+          <a:ext cx="0" cy="0"/>
+          <a:chOff x="0" y="0"/>
+          <a:chExt cx="0" cy="0"/>
+        </a:xfrm>
+      </p:grpSpPr>
+      <p:sp useBgFill="1">
+        <p:nvSpPr>
+          <p:cNvPr id="10" name="Rectangle 9"/>
+          <p:cNvSpPr>
+            <a:spLocks noGrp="1" noRot="1" noChangeAspect="1" noMove="1" noResize="1" noEditPoints="1" noAdjustHandles="1" noChangeArrowheads="1" noChangeShapeType="1" noTextEdit="1"/>
+          </p:cNvSpPr>
+          <p:nvPr/>
+        </p:nvSpPr>
+        <p:spPr>
+          <a:xfrm>
+            <a:off x="0" y="0"/>
+            <a:ext cx="12192000" cy="6858000"/>
+          </a:xfrm>
+          <a:prstGeom prst="rect">
+            <a:avLst/>
+          </a:prstGeom>
+          <a:ln>
+            <a:noFill/>
+          </a:ln>
+        </p:spPr>
+        <p:style>
+          <a:lnRef idx="2">
+            <a:schemeClr val="accent1">
+              <a:shade val="50000"/>
+            </a:schemeClr>
+          </a:lnRef>
+          <a:fillRef idx="1">
+            <a:schemeClr val="accent1"/>
+          </a:fillRef>
+          <a:effectRef idx="0">
+            <a:schemeClr val="accent1"/>
+          </a:effectRef>
+          <a:fontRef idx="minor">
+            <a:schemeClr val="lt1"/>
+          </a:fontRef>
+        </p:style>
+        <p:txBody>
+          <a:bodyPr rtlCol="0" anchor="ctr"/>
+          <a:lstStyle/>
+          <a:p>
+            <a:pPr algn="ctr"/>
+            <a:endParaRPr lang="en-US" dirty="0"/>
+          </a:p>
+        </p:txBody>
+      </p:sp>
+      <p:sp>
+        <p:nvSpPr>
+          <p:cNvPr id="2" name="Título 1"/>
+          <p:cNvSpPr>
+            <a:spLocks noGrp="1"/>
+          </p:cNvSpPr>
+          <p:nvPr>
+            <p:ph type="title"/>
+          </p:nvPr>
+        </p:nvSpPr>
+        <p:spPr>
+          <a:xfrm>
+            <a:off x="1812897" y="518649"/>
+            <a:ext cx="9882278" cy="1067634"/>
+          </a:xfrm>
+        </p:spPr>
+        <p:txBody>
+          <a:bodyPr anchor="ctr">
+            <a:normAutofit/>
+          </a:bodyPr>
+          <a:lstStyle/>
+          <a:p>
+            <a:r>
+              <a:rPr lang="pt-BR" dirty="0"/>
+              <a:t>Aplicação</a:t>
+            </a:r>
+          </a:p>
+        </p:txBody>
+      </p:sp>
+      <p:grpSp>
+        <p:nvGrpSpPr>
+          <p:cNvPr id="12" name="Group 11"/>
+          <p:cNvGrpSpPr>
+            <a:grpSpLocks noGrp="1" noUngrp="1" noRot="1" noChangeAspect="1" noMove="1" noResize="1"/>
+          </p:cNvGrpSpPr>
+          <p:nvPr/>
+        </p:nvGrpSpPr>
+        <p:grpSpPr>
+          <a:xfrm>
+            <a:off x="472021" y="628863"/>
+            <a:ext cx="1128382" cy="847206"/>
+            <a:chOff x="8183879" y="1000124"/>
+            <a:chExt cx="1562267" cy="1172973"/>
+          </a:xfrm>
+        </p:grpSpPr>
+        <p:sp>
+          <p:nvSpPr>
+            <p:cNvPr id="13" name="Freeform 5"/>
+            <p:cNvSpPr/>
+            <p:nvPr/>
+          </p:nvSpPr>
+          <p:spPr bwMode="auto">
+            <a:xfrm>
+              <a:off x="8183879" y="1348782"/>
+              <a:ext cx="935037" cy="824315"/>
+            </a:xfrm>
+            <a:custGeom>
+              <a:avLst/>
+              <a:gdLst>
+                <a:gd name="T0" fmla="*/ 225 w 785"/>
+                <a:gd name="T1" fmla="*/ 692 h 692"/>
+                <a:gd name="T2" fmla="*/ 177 w 785"/>
+                <a:gd name="T3" fmla="*/ 665 h 692"/>
+                <a:gd name="T4" fmla="*/ 9 w 785"/>
+                <a:gd name="T5" fmla="*/ 374 h 692"/>
+                <a:gd name="T6" fmla="*/ 9 w 785"/>
+                <a:gd name="T7" fmla="*/ 318 h 692"/>
+                <a:gd name="T8" fmla="*/ 177 w 785"/>
+                <a:gd name="T9" fmla="*/ 27 h 692"/>
+                <a:gd name="T10" fmla="*/ 225 w 785"/>
+                <a:gd name="T11" fmla="*/ 0 h 692"/>
+                <a:gd name="T12" fmla="*/ 561 w 785"/>
+                <a:gd name="T13" fmla="*/ 0 h 692"/>
+                <a:gd name="T14" fmla="*/ 609 w 785"/>
+                <a:gd name="T15" fmla="*/ 27 h 692"/>
+                <a:gd name="T16" fmla="*/ 777 w 785"/>
+                <a:gd name="T17" fmla="*/ 318 h 692"/>
+                <a:gd name="T18" fmla="*/ 777 w 785"/>
+                <a:gd name="T19" fmla="*/ 374 h 692"/>
+                <a:gd name="T20" fmla="*/ 609 w 785"/>
+                <a:gd name="T21" fmla="*/ 665 h 692"/>
+                <a:gd name="T22" fmla="*/ 561 w 785"/>
+                <a:gd name="T23" fmla="*/ 692 h 692"/>
+                <a:gd name="T24" fmla="*/ 225 w 785"/>
+                <a:gd name="T25" fmla="*/ 692 h 692"/>
+              </a:gdLst>
+              <a:ahLst/>
+              <a:cxnLst>
+                <a:cxn ang="0">
+                  <a:pos x="T0" y="T1"/>
+                </a:cxn>
+                <a:cxn ang="0">
+                  <a:pos x="T2" y="T3"/>
+                </a:cxn>
+                <a:cxn ang="0">
+                  <a:pos x="T4" y="T5"/>
+                </a:cxn>
+                <a:cxn ang="0">
+                  <a:pos x="T6" y="T7"/>
+                </a:cxn>
+                <a:cxn ang="0">
+                  <a:pos x="T8" y="T9"/>
+                </a:cxn>
+                <a:cxn ang="0">
+                  <a:pos x="T10" y="T11"/>
+                </a:cxn>
+                <a:cxn ang="0">
+                  <a:pos x="T12" y="T13"/>
+                </a:cxn>
+                <a:cxn ang="0">
+                  <a:pos x="T14" y="T15"/>
+                </a:cxn>
+                <a:cxn ang="0">
+                  <a:pos x="T16" y="T17"/>
+                </a:cxn>
+                <a:cxn ang="0">
+                  <a:pos x="T18" y="T19"/>
+                </a:cxn>
+                <a:cxn ang="0">
+                  <a:pos x="T20" y="T21"/>
+                </a:cxn>
+                <a:cxn ang="0">
+                  <a:pos x="T22" y="T23"/>
+                </a:cxn>
+                <a:cxn ang="0">
+                  <a:pos x="T24" y="T25"/>
+                </a:cxn>
+              </a:cxnLst>
+              <a:rect l="0" t="0" r="r" b="b"/>
+              <a:pathLst>
+                <a:path w="785" h="692">
+                  <a:moveTo>
+                    <a:pt x="225" y="692"/>
+                  </a:moveTo>
+                  <a:cubicBezTo>
+                    <a:pt x="207" y="692"/>
+                    <a:pt x="185" y="680"/>
+                    <a:pt x="177" y="665"/>
+                  </a:cubicBezTo>
+                  <a:cubicBezTo>
+                    <a:pt x="9" y="374"/>
+                    <a:pt x="9" y="374"/>
+                    <a:pt x="9" y="374"/>
+                  </a:cubicBezTo>
+                  <a:cubicBezTo>
+                    <a:pt x="0" y="358"/>
+                    <a:pt x="0" y="334"/>
+                    <a:pt x="9" y="318"/>
+                  </a:cubicBezTo>
+                  <a:cubicBezTo>
+                    <a:pt x="177" y="27"/>
+                    <a:pt x="177" y="27"/>
+                    <a:pt x="177" y="27"/>
+                  </a:cubicBezTo>
+                  <a:cubicBezTo>
+                    <a:pt x="185" y="12"/>
+                    <a:pt x="207" y="0"/>
+                    <a:pt x="225" y="0"/>
+                  </a:cubicBezTo>
+                  <a:cubicBezTo>
+                    <a:pt x="561" y="0"/>
+                    <a:pt x="561" y="0"/>
+                    <a:pt x="561" y="0"/>
+                  </a:cubicBezTo>
+                  <a:cubicBezTo>
+                    <a:pt x="578" y="0"/>
+                    <a:pt x="600" y="12"/>
+                    <a:pt x="609" y="27"/>
+                  </a:cubicBezTo>
+                  <a:cubicBezTo>
+                    <a:pt x="777" y="318"/>
+                    <a:pt x="777" y="318"/>
+                    <a:pt x="777" y="318"/>
+                  </a:cubicBezTo>
+                  <a:cubicBezTo>
+                    <a:pt x="785" y="334"/>
+                    <a:pt x="785" y="358"/>
+                    <a:pt x="777" y="374"/>
+                  </a:cubicBezTo>
+                  <a:cubicBezTo>
+                    <a:pt x="609" y="665"/>
+                    <a:pt x="609" y="665"/>
+                    <a:pt x="609" y="665"/>
+                  </a:cubicBezTo>
+                  <a:cubicBezTo>
+                    <a:pt x="600" y="680"/>
+                    <a:pt x="578" y="692"/>
+                    <a:pt x="561" y="692"/>
+                  </a:cubicBezTo>
+                  <a:lnTo>
+                    <a:pt x="225" y="692"/>
+                  </a:lnTo>
+                  <a:close/>
+                </a:path>
+              </a:pathLst>
+            </a:custGeom>
+            <a:noFill/>
+            <a:ln w="28575" cmpd="sng">
+              <a:solidFill>
+                <a:schemeClr val="tx1"/>
+              </a:solidFill>
+            </a:ln>
+          </p:spPr>
+          <p:txBody>
+            <a:bodyPr vert="horz" wrap="square" lIns="91440" tIns="45720" rIns="91440" bIns="45720" numCol="1" anchor="t" anchorCtr="0" compatLnSpc="1"/>
+            <a:lstStyle/>
+            <a:p>
+              <a:endParaRPr lang="en-US"/>
+            </a:p>
+          </p:txBody>
+        </p:sp>
+        <p:sp>
+          <p:nvSpPr>
+            <p:cNvPr id="14" name="Freeform 5"/>
+            <p:cNvSpPr/>
+            <p:nvPr/>
+          </p:nvSpPr>
+          <p:spPr bwMode="auto">
+            <a:xfrm>
+              <a:off x="8983979" y="1000124"/>
+              <a:ext cx="762167" cy="671915"/>
+            </a:xfrm>
+            <a:custGeom>
+              <a:avLst/>
+              <a:gdLst>
+                <a:gd name="T0" fmla="*/ 225 w 785"/>
+                <a:gd name="T1" fmla="*/ 692 h 692"/>
+                <a:gd name="T2" fmla="*/ 177 w 785"/>
+                <a:gd name="T3" fmla="*/ 665 h 692"/>
+                <a:gd name="T4" fmla="*/ 9 w 785"/>
+                <a:gd name="T5" fmla="*/ 374 h 692"/>
+                <a:gd name="T6" fmla="*/ 9 w 785"/>
+                <a:gd name="T7" fmla="*/ 318 h 692"/>
+                <a:gd name="T8" fmla="*/ 177 w 785"/>
+                <a:gd name="T9" fmla="*/ 27 h 692"/>
+                <a:gd name="T10" fmla="*/ 225 w 785"/>
+                <a:gd name="T11" fmla="*/ 0 h 692"/>
+                <a:gd name="T12" fmla="*/ 561 w 785"/>
+                <a:gd name="T13" fmla="*/ 0 h 692"/>
+                <a:gd name="T14" fmla="*/ 609 w 785"/>
+                <a:gd name="T15" fmla="*/ 27 h 692"/>
+                <a:gd name="T16" fmla="*/ 777 w 785"/>
+                <a:gd name="T17" fmla="*/ 318 h 692"/>
+                <a:gd name="T18" fmla="*/ 777 w 785"/>
+                <a:gd name="T19" fmla="*/ 374 h 692"/>
+                <a:gd name="T20" fmla="*/ 609 w 785"/>
+                <a:gd name="T21" fmla="*/ 665 h 692"/>
+                <a:gd name="T22" fmla="*/ 561 w 785"/>
+                <a:gd name="T23" fmla="*/ 692 h 692"/>
+                <a:gd name="T24" fmla="*/ 225 w 785"/>
+                <a:gd name="T25" fmla="*/ 692 h 692"/>
+              </a:gdLst>
+              <a:ahLst/>
+              <a:cxnLst>
+                <a:cxn ang="0">
+                  <a:pos x="T0" y="T1"/>
+                </a:cxn>
+                <a:cxn ang="0">
+                  <a:pos x="T2" y="T3"/>
+                </a:cxn>
+                <a:cxn ang="0">
+                  <a:pos x="T4" y="T5"/>
+                </a:cxn>
+                <a:cxn ang="0">
+                  <a:pos x="T6" y="T7"/>
+                </a:cxn>
+                <a:cxn ang="0">
+                  <a:pos x="T8" y="T9"/>
+                </a:cxn>
+                <a:cxn ang="0">
+                  <a:pos x="T10" y="T11"/>
+                </a:cxn>
+                <a:cxn ang="0">
+                  <a:pos x="T12" y="T13"/>
+                </a:cxn>
+                <a:cxn ang="0">
+                  <a:pos x="T14" y="T15"/>
+                </a:cxn>
+                <a:cxn ang="0">
+                  <a:pos x="T16" y="T17"/>
+                </a:cxn>
+                <a:cxn ang="0">
+                  <a:pos x="T18" y="T19"/>
+                </a:cxn>
+                <a:cxn ang="0">
+                  <a:pos x="T20" y="T21"/>
+                </a:cxn>
+                <a:cxn ang="0">
+                  <a:pos x="T22" y="T23"/>
+                </a:cxn>
+                <a:cxn ang="0">
+                  <a:pos x="T24" y="T25"/>
+                </a:cxn>
+              </a:cxnLst>
+              <a:rect l="0" t="0" r="r" b="b"/>
+              <a:pathLst>
+                <a:path w="785" h="692">
+                  <a:moveTo>
+                    <a:pt x="225" y="692"/>
+                  </a:moveTo>
+                  <a:cubicBezTo>
+                    <a:pt x="207" y="692"/>
+                    <a:pt x="185" y="680"/>
+                    <a:pt x="177" y="665"/>
+                  </a:cubicBezTo>
+                  <a:cubicBezTo>
+                    <a:pt x="9" y="374"/>
+                    <a:pt x="9" y="374"/>
+                    <a:pt x="9" y="374"/>
+                  </a:cubicBezTo>
+                  <a:cubicBezTo>
+                    <a:pt x="0" y="358"/>
+                    <a:pt x="0" y="334"/>
+                    <a:pt x="9" y="318"/>
+                  </a:cubicBezTo>
+                  <a:cubicBezTo>
+                    <a:pt x="177" y="27"/>
+                    <a:pt x="177" y="27"/>
+                    <a:pt x="177" y="27"/>
+                  </a:cubicBezTo>
+                  <a:cubicBezTo>
+                    <a:pt x="185" y="12"/>
+                    <a:pt x="207" y="0"/>
+                    <a:pt x="225" y="0"/>
+                  </a:cubicBezTo>
+                  <a:cubicBezTo>
+                    <a:pt x="561" y="0"/>
+                    <a:pt x="561" y="0"/>
+                    <a:pt x="561" y="0"/>
+                  </a:cubicBezTo>
+                  <a:cubicBezTo>
+                    <a:pt x="578" y="0"/>
+                    <a:pt x="600" y="12"/>
+                    <a:pt x="609" y="27"/>
+                  </a:cubicBezTo>
+                  <a:cubicBezTo>
+                    <a:pt x="777" y="318"/>
+                    <a:pt x="777" y="318"/>
+                    <a:pt x="777" y="318"/>
+                  </a:cubicBezTo>
+                  <a:cubicBezTo>
+                    <a:pt x="785" y="334"/>
+                    <a:pt x="785" y="358"/>
+                    <a:pt x="777" y="374"/>
+                  </a:cubicBezTo>
+                  <a:cubicBezTo>
+                    <a:pt x="609" y="665"/>
+                    <a:pt x="609" y="665"/>
+                    <a:pt x="609" y="665"/>
+                  </a:cubicBezTo>
+                  <a:cubicBezTo>
+                    <a:pt x="600" y="680"/>
+                    <a:pt x="578" y="692"/>
+                    <a:pt x="561" y="692"/>
+                  </a:cubicBezTo>
+                  <a:lnTo>
+                    <a:pt x="225" y="692"/>
+                  </a:lnTo>
+                  <a:close/>
+                </a:path>
+              </a:pathLst>
+            </a:custGeom>
+            <a:noFill/>
+            <a:ln w="28575" cmpd="sng">
+              <a:solidFill>
+                <a:schemeClr val="tx1"/>
+              </a:solidFill>
+            </a:ln>
+          </p:spPr>
+          <p:txBody>
+            <a:bodyPr vert="horz" wrap="square" lIns="91440" tIns="45720" rIns="91440" bIns="45720" numCol="1" anchor="t" anchorCtr="0" compatLnSpc="1"/>
+            <a:lstStyle/>
+            <a:p>
+              <a:endParaRPr lang="en-US"/>
+            </a:p>
+          </p:txBody>
+        </p:sp>
+      </p:grpSp>
+      <p:sp>
+        <p:nvSpPr>
+          <p:cNvPr id="3" name="CaixaDeTexto 2">
+            <a:extLst>
+              <a:ext uri="{FF2B5EF4-FFF2-40B4-BE49-F238E27FC236}">
+                <a16:creationId xmlns:a16="http://schemas.microsoft.com/office/drawing/2014/main" id="{19035CAF-1C8B-4AE3-8033-3A58E61E6860}"/>
+              </a:ext>
+            </a:extLst>
+          </p:cNvPr>
+          <p:cNvSpPr txBox="1"/>
+          <p:nvPr/>
+        </p:nvSpPr>
+        <p:spPr>
+          <a:xfrm>
+            <a:off x="496827" y="2172092"/>
+            <a:ext cx="3288958" cy="369332"/>
+          </a:xfrm>
+          <a:prstGeom prst="rect">
+            <a:avLst/>
+          </a:prstGeom>
+          <a:noFill/>
+        </p:spPr>
+        <p:txBody>
+          <a:bodyPr wrap="square" rtlCol="0">
+            <a:spAutoFit/>
+          </a:bodyPr>
+          <a:lstStyle/>
+          <a:p>
+            <a:r>
+              <a:rPr lang="pt-BR" dirty="0"/>
+              <a:t>- Modelagem de Dados</a:t>
+            </a:r>
+          </a:p>
+        </p:txBody>
+      </p:sp>
+      <p:sp>
+        <p:nvSpPr>
+          <p:cNvPr id="9" name="CaixaDeTexto 8">
+            <a:extLst>
+              <a:ext uri="{FF2B5EF4-FFF2-40B4-BE49-F238E27FC236}">
+                <a16:creationId xmlns:a16="http://schemas.microsoft.com/office/drawing/2014/main" id="{9DB075A3-56FB-45D0-9830-D7302566A0CB}"/>
+              </a:ext>
+            </a:extLst>
+          </p:cNvPr>
+          <p:cNvSpPr txBox="1"/>
+          <p:nvPr/>
+        </p:nvSpPr>
+        <p:spPr>
+          <a:xfrm>
+            <a:off x="484424" y="2757243"/>
+            <a:ext cx="3288958" cy="400110"/>
+          </a:xfrm>
+          <a:prstGeom prst="rect">
+            <a:avLst/>
+          </a:prstGeom>
+          <a:noFill/>
+          <a:effectLst>
+            <a:outerShdw blurRad="50800" dist="38100" dir="5400000" algn="t" rotWithShape="0">
+              <a:prstClr val="black">
+                <a:alpha val="40000"/>
+              </a:prstClr>
+            </a:outerShdw>
+          </a:effectLst>
+        </p:spPr>
+        <p:txBody>
+          <a:bodyPr wrap="square" rtlCol="0">
+            <a:spAutoFit/>
+          </a:bodyPr>
+          <a:lstStyle/>
+          <a:p>
+            <a:r>
+              <a:rPr lang="pt-BR" sz="2000" dirty="0"/>
+              <a:t>- Desenho de Arquitetura</a:t>
+            </a:r>
+          </a:p>
+        </p:txBody>
+      </p:sp>
+      <p:sp>
+        <p:nvSpPr>
+          <p:cNvPr id="11" name="CaixaDeTexto 10">
+            <a:extLst>
+              <a:ext uri="{FF2B5EF4-FFF2-40B4-BE49-F238E27FC236}">
+                <a16:creationId xmlns:a16="http://schemas.microsoft.com/office/drawing/2014/main" id="{16EB44B9-02AC-4947-965B-A08DBFC98023}"/>
+              </a:ext>
+            </a:extLst>
+          </p:cNvPr>
+          <p:cNvSpPr txBox="1"/>
+          <p:nvPr/>
+        </p:nvSpPr>
+        <p:spPr>
+          <a:xfrm>
+            <a:off x="472021" y="3350933"/>
+            <a:ext cx="3288958" cy="369332"/>
+          </a:xfrm>
+          <a:prstGeom prst="rect">
+            <a:avLst/>
+          </a:prstGeom>
+          <a:noFill/>
+        </p:spPr>
+        <p:txBody>
+          <a:bodyPr wrap="square" rtlCol="0">
+            <a:spAutoFit/>
+          </a:bodyPr>
+          <a:lstStyle/>
+          <a:p>
+            <a:r>
+              <a:rPr lang="pt-BR" dirty="0"/>
+              <a:t>- Diagrama de Classe</a:t>
+            </a:r>
+          </a:p>
+        </p:txBody>
+      </p:sp>
+      <p:sp>
+        <p:nvSpPr>
+          <p:cNvPr id="16" name="CaixaDeTexto 15">
+            <a:extLst>
+              <a:ext uri="{FF2B5EF4-FFF2-40B4-BE49-F238E27FC236}">
+                <a16:creationId xmlns:a16="http://schemas.microsoft.com/office/drawing/2014/main" id="{DE7433E1-F016-48B0-8744-19C111456B85}"/>
+              </a:ext>
+            </a:extLst>
+          </p:cNvPr>
+          <p:cNvSpPr txBox="1"/>
+          <p:nvPr/>
+        </p:nvSpPr>
+        <p:spPr>
+          <a:xfrm>
+            <a:off x="472021" y="3944623"/>
+            <a:ext cx="3288958" cy="369332"/>
+          </a:xfrm>
+          <a:prstGeom prst="rect">
+            <a:avLst/>
+          </a:prstGeom>
+          <a:noFill/>
+        </p:spPr>
+        <p:txBody>
+          <a:bodyPr wrap="square" rtlCol="0">
+            <a:spAutoFit/>
+          </a:bodyPr>
+          <a:lstStyle/>
+          <a:p>
+            <a:r>
+              <a:rPr lang="pt-BR" dirty="0"/>
+              <a:t>- Planilha de Testes</a:t>
+            </a:r>
+          </a:p>
+        </p:txBody>
+      </p:sp>
+      <p:sp>
+        <p:nvSpPr>
+          <p:cNvPr id="20" name="CaixaDeTexto 19">
+            <a:extLst>
+              <a:ext uri="{FF2B5EF4-FFF2-40B4-BE49-F238E27FC236}">
+                <a16:creationId xmlns:a16="http://schemas.microsoft.com/office/drawing/2014/main" id="{E81768B2-0974-4D89-BB1D-234A1ECBF059}"/>
+              </a:ext>
+            </a:extLst>
+          </p:cNvPr>
+          <p:cNvSpPr txBox="1"/>
+          <p:nvPr/>
+        </p:nvSpPr>
+        <p:spPr>
+          <a:xfrm>
+            <a:off x="496827" y="4519325"/>
+            <a:ext cx="3288958" cy="369332"/>
+          </a:xfrm>
+          <a:prstGeom prst="rect">
+            <a:avLst/>
+          </a:prstGeom>
+          <a:noFill/>
+          <a:effectLst/>
+        </p:spPr>
+        <p:txBody>
+          <a:bodyPr wrap="square" rtlCol="0">
+            <a:spAutoFit/>
+          </a:bodyPr>
+          <a:lstStyle/>
+          <a:p>
+            <a:r>
+              <a:rPr lang="pt-BR" dirty="0"/>
+              <a:t>- Arquivo de Exportação</a:t>
+            </a:r>
+          </a:p>
+        </p:txBody>
+      </p:sp>
+      <p:pic>
+        <p:nvPicPr>
+          <p:cNvPr id="5" name="Imagem 4" descr="Texto preto sobre fundo branco&#10;&#10;Descrição gerada automaticamente">
+            <a:extLst>
+              <a:ext uri="{FF2B5EF4-FFF2-40B4-BE49-F238E27FC236}">
+                <a16:creationId xmlns:a16="http://schemas.microsoft.com/office/drawing/2014/main" id="{C0EB70A9-CA61-4D0B-9BF3-2C20CA891859}"/>
+              </a:ext>
+            </a:extLst>
+          </p:cNvPr>
+          <p:cNvPicPr>
+            <a:picLocks noChangeAspect="1"/>
+          </p:cNvPicPr>
+          <p:nvPr/>
+        </p:nvPicPr>
+        <p:blipFill>
+          <a:blip r:embed="rId2">
+            <a:extLst>
+              <a:ext uri="{28A0092B-C50C-407E-A947-70E740481C1C}">
+                <a14:useLocalDpi xmlns:a14="http://schemas.microsoft.com/office/drawing/2010/main" val="0"/>
+              </a:ext>
+            </a:extLst>
+          </a:blip>
+          <a:stretch>
+            <a:fillRect/>
+          </a:stretch>
+        </p:blipFill>
+        <p:spPr>
+          <a:xfrm>
+            <a:off x="4730497" y="782644"/>
+            <a:ext cx="6287194" cy="5875241"/>
+          </a:xfrm>
+          <a:prstGeom prst="rect">
+            <a:avLst/>
+          </a:prstGeom>
+        </p:spPr>
+      </p:pic>
+    </p:spTree>
+    <p:extLst>
+      <p:ext uri="{BB962C8B-B14F-4D97-AF65-F5344CB8AC3E}">
+        <p14:creationId xmlns:p14="http://schemas.microsoft.com/office/powerpoint/2010/main" val="1166053751"/>
+      </p:ext>
+    </p:extLst>
+  </p:cSld>
+  <p:clrMapOvr>
+    <a:masterClrMapping/>
+  </p:clrMapOvr>
+  <p:timing>
+    <p:tnLst>
+      <p:par>
+        <p:cTn id="1" dur="indefinite" restart="never" nodeType="tmRoot">
+          <p:childTnLst>
+            <p:seq concurrent="1" nextAc="seek">
+              <p:cTn id="2" dur="indefinite" nodeType="mainSeq">
+                <p:childTnLst>
+                  <p:par>
+                    <p:cTn id="3" fill="hold">
+                      <p:stCondLst>
+                        <p:cond delay="indefinite"/>
+                        <p:cond evt="onBegin" delay="0">
+                          <p:tn val="2"/>
+                        </p:cond>
+                      </p:stCondLst>
+                      <p:childTnLst>
+                        <p:par>
+                          <p:cTn id="4" fill="hold">
+                            <p:stCondLst>
+                              <p:cond delay="0"/>
+                            </p:stCondLst>
+                            <p:childTnLst>
+                              <p:par>
+                                <p:cTn id="5" presetID="53" presetClass="entr" presetSubtype="16" fill="hold" nodeType="withEffect">
+                                  <p:stCondLst>
+                                    <p:cond delay="0"/>
+                                  </p:stCondLst>
+                                  <p:childTnLst>
+                                    <p:set>
+                                      <p:cBhvr>
+                                        <p:cTn id="6" dur="1" fill="hold">
+                                          <p:stCondLst>
+                                            <p:cond delay="0"/>
+                                          </p:stCondLst>
+                                        </p:cTn>
+                                        <p:tgtEl>
+                                          <p:spTgt spid="5"/>
+                                        </p:tgtEl>
+                                        <p:attrNameLst>
+                                          <p:attrName>style.visibility</p:attrName>
+                                        </p:attrNameLst>
+                                      </p:cBhvr>
+                                      <p:to>
+                                        <p:strVal val="visible"/>
+                                      </p:to>
+                                    </p:set>
+                                    <p:anim calcmode="lin" valueType="num">
+                                      <p:cBhvr>
+                                        <p:cTn id="7" dur="500" fill="hold"/>
+                                        <p:tgtEl>
+                                          <p:spTgt spid="5"/>
+                                        </p:tgtEl>
+                                        <p:attrNameLst>
+                                          <p:attrName>ppt_w</p:attrName>
+                                        </p:attrNameLst>
+                                      </p:cBhvr>
+                                      <p:tavLst>
+                                        <p:tav tm="0">
+                                          <p:val>
+                                            <p:fltVal val="0"/>
+                                          </p:val>
+                                        </p:tav>
+                                        <p:tav tm="100000">
+                                          <p:val>
+                                            <p:strVal val="#ppt_w"/>
+                                          </p:val>
+                                        </p:tav>
+                                      </p:tavLst>
+                                    </p:anim>
+                                    <p:anim calcmode="lin" valueType="num">
+                                      <p:cBhvr>
+                                        <p:cTn id="8" dur="500" fill="hold"/>
+                                        <p:tgtEl>
+                                          <p:spTgt spid="5"/>
+                                        </p:tgtEl>
+                                        <p:attrNameLst>
+                                          <p:attrName>ppt_h</p:attrName>
+                                        </p:attrNameLst>
+                                      </p:cBhvr>
+                                      <p:tavLst>
+                                        <p:tav tm="0">
+                                          <p:val>
+                                            <p:fltVal val="0"/>
+                                          </p:val>
+                                        </p:tav>
+                                        <p:tav tm="100000">
+                                          <p:val>
+                                            <p:strVal val="#ppt_h"/>
+                                          </p:val>
+                                        </p:tav>
+                                      </p:tavLst>
+                                    </p:anim>
+                                    <p:animEffect transition="in" filter="fade">
+                                      <p:cBhvr>
+                                        <p:cTn id="9" dur="500"/>
+                                        <p:tgtEl>
+                                          <p:spTgt spid="5"/>
+                                        </p:tgtEl>
+                                      </p:cBhvr>
+                                    </p:animEffect>
+                                  </p:childTnLst>
+                                </p:cTn>
+                              </p:par>
+                            </p:childTnLst>
+                          </p:cTn>
+                        </p:par>
+                      </p:childTnLst>
+                    </p:cTn>
+                  </p:par>
+                </p:childTnLst>
+              </p:cTn>
+              <p:prevCondLst>
+                <p:cond evt="onPrev" delay="0">
+                  <p:tgtEl>
+                    <p:sldTgt/>
+                  </p:tgtEl>
+                </p:cond>
+              </p:prevCondLst>
+              <p:nextCondLst>
+                <p:cond evt="onNext" delay="0">
+                  <p:tgtEl>
+                    <p:sldTgt/>
+                  </p:tgtEl>
+                </p:cond>
+              </p:nextCondLst>
+            </p:seq>
+          </p:childTnLst>
+        </p:cTn>
+      </p:par>
+    </p:tnLst>
+  </p:timing>
+</p:sld>
+</file>
+
+<file path=ppt/slides/slide17.xml><?xml version="1.0" encoding="utf-8"?>
 <p:sld xmlns:a="http://schemas.openxmlformats.org/drawingml/2006/main" xmlns:r="http://schemas.openxmlformats.org/officeDocument/2006/relationships" xmlns:p="http://schemas.openxmlformats.org/presentationml/2006/main">
   <p:cSld>
     <p:spTree>
@@ -35508,105 +36974,6 @@
                       </p:childTnLst>
                     </p:cTn>
                   </p:par>
-                  <p:par>
-                    <p:cTn id="10" fill="hold">
-                      <p:stCondLst>
-                        <p:cond delay="indefinite"/>
-                      </p:stCondLst>
-                      <p:childTnLst>
-                        <p:par>
-                          <p:cTn id="11" fill="hold">
-                            <p:stCondLst>
-                              <p:cond delay="0"/>
-                            </p:stCondLst>
-                            <p:childTnLst>
-                              <p:par>
-                                <p:cTn id="12" presetID="53" presetClass="exit" presetSubtype="32" fill="hold" nodeType="clickEffect">
-                                  <p:stCondLst>
-                                    <p:cond delay="0"/>
-                                  </p:stCondLst>
-                                  <p:childTnLst>
-                                    <p:anim calcmode="lin" valueType="num">
-                                      <p:cBhvr>
-                                        <p:cTn id="13" dur="500"/>
-                                        <p:tgtEl>
-                                          <p:spTgt spid="15"/>
-                                        </p:tgtEl>
-                                        <p:attrNameLst>
-                                          <p:attrName>ppt_w</p:attrName>
-                                        </p:attrNameLst>
-                                      </p:cBhvr>
-                                      <p:tavLst>
-                                        <p:tav tm="0">
-                                          <p:val>
-                                            <p:strVal val="ppt_w"/>
-                                          </p:val>
-                                        </p:tav>
-                                        <p:tav tm="100000">
-                                          <p:val>
-                                            <p:fltVal val="0"/>
-                                          </p:val>
-                                        </p:tav>
-                                      </p:tavLst>
-                                    </p:anim>
-                                    <p:anim calcmode="lin" valueType="num">
-                                      <p:cBhvr>
-                                        <p:cTn id="14" dur="500"/>
-                                        <p:tgtEl>
-                                          <p:spTgt spid="15"/>
-                                        </p:tgtEl>
-                                        <p:attrNameLst>
-                                          <p:attrName>ppt_h</p:attrName>
-                                        </p:attrNameLst>
-                                      </p:cBhvr>
-                                      <p:tavLst>
-                                        <p:tav tm="0">
-                                          <p:val>
-                                            <p:strVal val="ppt_h"/>
-                                          </p:val>
-                                        </p:tav>
-                                        <p:tav tm="100000">
-                                          <p:val>
-                                            <p:fltVal val="0"/>
-                                          </p:val>
-                                        </p:tav>
-                                      </p:tavLst>
-                                    </p:anim>
-                                    <p:animEffect transition="out" filter="fade">
-                                      <p:cBhvr>
-                                        <p:cTn id="15" dur="500"/>
-                                        <p:tgtEl>
-                                          <p:spTgt spid="15"/>
-                                        </p:tgtEl>
-                                      </p:cBhvr>
-                                    </p:animEffect>
-                                    <p:set>
-                                      <p:cBhvr>
-                                        <p:cTn id="16" dur="1" fill="hold">
-                                          <p:stCondLst>
-                                            <p:cond delay="499"/>
-                                          </p:stCondLst>
-                                        </p:cTn>
-                                        <p:tgtEl>
-                                          <p:spTgt spid="15"/>
-                                        </p:tgtEl>
-                                        <p:attrNameLst>
-                                          <p:attrName>style.visibility</p:attrName>
-                                        </p:attrNameLst>
-                                      </p:cBhvr>
-                                      <p:to>
-                                        <p:strVal val="hidden"/>
-                                      </p:to>
-                                    </p:set>
-                                  </p:childTnLst>
-                                </p:cTn>
-                              </p:par>
-                            </p:childTnLst>
-                          </p:cTn>
-                        </p:par>
-                      </p:childTnLst>
-                    </p:cTn>
-                  </p:par>
                 </p:childTnLst>
               </p:cTn>
               <p:prevCondLst>
@@ -35632,7 +36999,7 @@
 </p:sld>
 </file>
 
-<file path=ppt/slides/slide16.xml><?xml version="1.0" encoding="utf-8"?>
+<file path=ppt/slides/slide18.xml><?xml version="1.0" encoding="utf-8"?>
 <p:sld xmlns:a="http://schemas.openxmlformats.org/drawingml/2006/main" xmlns:r="http://schemas.openxmlformats.org/officeDocument/2006/relationships" xmlns:p="http://schemas.openxmlformats.org/presentationml/2006/main">
   <p:cSld>
     <p:spTree>
@@ -36406,105 +37773,6 @@
                       </p:childTnLst>
                     </p:cTn>
                   </p:par>
-                  <p:par>
-                    <p:cTn id="10" fill="hold">
-                      <p:stCondLst>
-                        <p:cond delay="indefinite"/>
-                      </p:stCondLst>
-                      <p:childTnLst>
-                        <p:par>
-                          <p:cTn id="11" fill="hold">
-                            <p:stCondLst>
-                              <p:cond delay="0"/>
-                            </p:stCondLst>
-                            <p:childTnLst>
-                              <p:par>
-                                <p:cTn id="12" presetID="53" presetClass="exit" presetSubtype="32" fill="hold" nodeType="clickEffect">
-                                  <p:stCondLst>
-                                    <p:cond delay="0"/>
-                                  </p:stCondLst>
-                                  <p:childTnLst>
-                                    <p:anim calcmode="lin" valueType="num">
-                                      <p:cBhvr>
-                                        <p:cTn id="13" dur="500"/>
-                                        <p:tgtEl>
-                                          <p:spTgt spid="3"/>
-                                        </p:tgtEl>
-                                        <p:attrNameLst>
-                                          <p:attrName>ppt_w</p:attrName>
-                                        </p:attrNameLst>
-                                      </p:cBhvr>
-                                      <p:tavLst>
-                                        <p:tav tm="0">
-                                          <p:val>
-                                            <p:strVal val="ppt_w"/>
-                                          </p:val>
-                                        </p:tav>
-                                        <p:tav tm="100000">
-                                          <p:val>
-                                            <p:fltVal val="0"/>
-                                          </p:val>
-                                        </p:tav>
-                                      </p:tavLst>
-                                    </p:anim>
-                                    <p:anim calcmode="lin" valueType="num">
-                                      <p:cBhvr>
-                                        <p:cTn id="14" dur="500"/>
-                                        <p:tgtEl>
-                                          <p:spTgt spid="3"/>
-                                        </p:tgtEl>
-                                        <p:attrNameLst>
-                                          <p:attrName>ppt_h</p:attrName>
-                                        </p:attrNameLst>
-                                      </p:cBhvr>
-                                      <p:tavLst>
-                                        <p:tav tm="0">
-                                          <p:val>
-                                            <p:strVal val="ppt_h"/>
-                                          </p:val>
-                                        </p:tav>
-                                        <p:tav tm="100000">
-                                          <p:val>
-                                            <p:fltVal val="0"/>
-                                          </p:val>
-                                        </p:tav>
-                                      </p:tavLst>
-                                    </p:anim>
-                                    <p:animEffect transition="out" filter="fade">
-                                      <p:cBhvr>
-                                        <p:cTn id="15" dur="500"/>
-                                        <p:tgtEl>
-                                          <p:spTgt spid="3"/>
-                                        </p:tgtEl>
-                                      </p:cBhvr>
-                                    </p:animEffect>
-                                    <p:set>
-                                      <p:cBhvr>
-                                        <p:cTn id="16" dur="1" fill="hold">
-                                          <p:stCondLst>
-                                            <p:cond delay="499"/>
-                                          </p:stCondLst>
-                                        </p:cTn>
-                                        <p:tgtEl>
-                                          <p:spTgt spid="3"/>
-                                        </p:tgtEl>
-                                        <p:attrNameLst>
-                                          <p:attrName>style.visibility</p:attrName>
-                                        </p:attrNameLst>
-                                      </p:cBhvr>
-                                      <p:to>
-                                        <p:strVal val="hidden"/>
-                                      </p:to>
-                                    </p:set>
-                                  </p:childTnLst>
-                                </p:cTn>
-                              </p:par>
-                            </p:childTnLst>
-                          </p:cTn>
-                        </p:par>
-                      </p:childTnLst>
-                    </p:cTn>
-                  </p:par>
                 </p:childTnLst>
               </p:cTn>
               <p:prevCondLst>
@@ -36530,7 +37798,7 @@
 </p:sld>
 </file>
 
-<file path=ppt/slides/slide17.xml><?xml version="1.0" encoding="utf-8"?>
+<file path=ppt/slides/slide19.xml><?xml version="1.0" encoding="utf-8"?>
 <p:sld xmlns:a="http://schemas.openxmlformats.org/drawingml/2006/main" xmlns:r="http://schemas.openxmlformats.org/officeDocument/2006/relationships" xmlns:p="http://schemas.openxmlformats.org/presentationml/2006/main">
   <p:cSld>
     <p:spTree>
@@ -40847,105 +42115,6 @@
                       </p:childTnLst>
                     </p:cTn>
                   </p:par>
-                  <p:par>
-                    <p:cTn id="10" fill="hold">
-                      <p:stCondLst>
-                        <p:cond delay="indefinite"/>
-                      </p:stCondLst>
-                      <p:childTnLst>
-                        <p:par>
-                          <p:cTn id="11" fill="hold">
-                            <p:stCondLst>
-                              <p:cond delay="0"/>
-                            </p:stCondLst>
-                            <p:childTnLst>
-                              <p:par>
-                                <p:cTn id="12" presetID="53" presetClass="exit" presetSubtype="32" fill="hold" nodeType="clickEffect">
-                                  <p:stCondLst>
-                                    <p:cond delay="0"/>
-                                  </p:stCondLst>
-                                  <p:childTnLst>
-                                    <p:anim calcmode="lin" valueType="num">
-                                      <p:cBhvr>
-                                        <p:cTn id="13" dur="500"/>
-                                        <p:tgtEl>
-                                          <p:spTgt spid="8"/>
-                                        </p:tgtEl>
-                                        <p:attrNameLst>
-                                          <p:attrName>ppt_w</p:attrName>
-                                        </p:attrNameLst>
-                                      </p:cBhvr>
-                                      <p:tavLst>
-                                        <p:tav tm="0">
-                                          <p:val>
-                                            <p:strVal val="ppt_w"/>
-                                          </p:val>
-                                        </p:tav>
-                                        <p:tav tm="100000">
-                                          <p:val>
-                                            <p:fltVal val="0"/>
-                                          </p:val>
-                                        </p:tav>
-                                      </p:tavLst>
-                                    </p:anim>
-                                    <p:anim calcmode="lin" valueType="num">
-                                      <p:cBhvr>
-                                        <p:cTn id="14" dur="500"/>
-                                        <p:tgtEl>
-                                          <p:spTgt spid="8"/>
-                                        </p:tgtEl>
-                                        <p:attrNameLst>
-                                          <p:attrName>ppt_h</p:attrName>
-                                        </p:attrNameLst>
-                                      </p:cBhvr>
-                                      <p:tavLst>
-                                        <p:tav tm="0">
-                                          <p:val>
-                                            <p:strVal val="ppt_h"/>
-                                          </p:val>
-                                        </p:tav>
-                                        <p:tav tm="100000">
-                                          <p:val>
-                                            <p:fltVal val="0"/>
-                                          </p:val>
-                                        </p:tav>
-                                      </p:tavLst>
-                                    </p:anim>
-                                    <p:animEffect transition="out" filter="fade">
-                                      <p:cBhvr>
-                                        <p:cTn id="15" dur="500"/>
-                                        <p:tgtEl>
-                                          <p:spTgt spid="8"/>
-                                        </p:tgtEl>
-                                      </p:cBhvr>
-                                    </p:animEffect>
-                                    <p:set>
-                                      <p:cBhvr>
-                                        <p:cTn id="16" dur="1" fill="hold">
-                                          <p:stCondLst>
-                                            <p:cond delay="499"/>
-                                          </p:stCondLst>
-                                        </p:cTn>
-                                        <p:tgtEl>
-                                          <p:spTgt spid="8"/>
-                                        </p:tgtEl>
-                                        <p:attrNameLst>
-                                          <p:attrName>style.visibility</p:attrName>
-                                        </p:attrNameLst>
-                                      </p:cBhvr>
-                                      <p:to>
-                                        <p:strVal val="hidden"/>
-                                      </p:to>
-                                    </p:set>
-                                  </p:childTnLst>
-                                </p:cTn>
-                              </p:par>
-                            </p:childTnLst>
-                          </p:cTn>
-                        </p:par>
-                      </p:childTnLst>
-                    </p:cTn>
-                  </p:par>
                 </p:childTnLst>
               </p:cTn>
               <p:prevCondLst>
@@ -41744,105 +42913,6 @@
                       </p:childTnLst>
                     </p:cTn>
                   </p:par>
-                  <p:par>
-                    <p:cTn id="10" fill="hold">
-                      <p:stCondLst>
-                        <p:cond delay="indefinite"/>
-                      </p:stCondLst>
-                      <p:childTnLst>
-                        <p:par>
-                          <p:cTn id="11" fill="hold">
-                            <p:stCondLst>
-                              <p:cond delay="0"/>
-                            </p:stCondLst>
-                            <p:childTnLst>
-                              <p:par>
-                                <p:cTn id="12" presetID="53" presetClass="exit" presetSubtype="32" fill="hold" nodeType="clickEffect">
-                                  <p:stCondLst>
-                                    <p:cond delay="0"/>
-                                  </p:stCondLst>
-                                  <p:childTnLst>
-                                    <p:anim calcmode="lin" valueType="num">
-                                      <p:cBhvr>
-                                        <p:cTn id="13" dur="500"/>
-                                        <p:tgtEl>
-                                          <p:spTgt spid="15"/>
-                                        </p:tgtEl>
-                                        <p:attrNameLst>
-                                          <p:attrName>ppt_w</p:attrName>
-                                        </p:attrNameLst>
-                                      </p:cBhvr>
-                                      <p:tavLst>
-                                        <p:tav tm="0">
-                                          <p:val>
-                                            <p:strVal val="ppt_w"/>
-                                          </p:val>
-                                        </p:tav>
-                                        <p:tav tm="100000">
-                                          <p:val>
-                                            <p:fltVal val="0"/>
-                                          </p:val>
-                                        </p:tav>
-                                      </p:tavLst>
-                                    </p:anim>
-                                    <p:anim calcmode="lin" valueType="num">
-                                      <p:cBhvr>
-                                        <p:cTn id="14" dur="500"/>
-                                        <p:tgtEl>
-                                          <p:spTgt spid="15"/>
-                                        </p:tgtEl>
-                                        <p:attrNameLst>
-                                          <p:attrName>ppt_h</p:attrName>
-                                        </p:attrNameLst>
-                                      </p:cBhvr>
-                                      <p:tavLst>
-                                        <p:tav tm="0">
-                                          <p:val>
-                                            <p:strVal val="ppt_h"/>
-                                          </p:val>
-                                        </p:tav>
-                                        <p:tav tm="100000">
-                                          <p:val>
-                                            <p:fltVal val="0"/>
-                                          </p:val>
-                                        </p:tav>
-                                      </p:tavLst>
-                                    </p:anim>
-                                    <p:animEffect transition="out" filter="fade">
-                                      <p:cBhvr>
-                                        <p:cTn id="15" dur="500"/>
-                                        <p:tgtEl>
-                                          <p:spTgt spid="15"/>
-                                        </p:tgtEl>
-                                      </p:cBhvr>
-                                    </p:animEffect>
-                                    <p:set>
-                                      <p:cBhvr>
-                                        <p:cTn id="16" dur="1" fill="hold">
-                                          <p:stCondLst>
-                                            <p:cond delay="499"/>
-                                          </p:stCondLst>
-                                        </p:cTn>
-                                        <p:tgtEl>
-                                          <p:spTgt spid="15"/>
-                                        </p:tgtEl>
-                                        <p:attrNameLst>
-                                          <p:attrName>style.visibility</p:attrName>
-                                        </p:attrNameLst>
-                                      </p:cBhvr>
-                                      <p:to>
-                                        <p:strVal val="hidden"/>
-                                      </p:to>
-                                    </p:set>
-                                  </p:childTnLst>
-                                </p:cTn>
-                              </p:par>
-                            </p:childTnLst>
-                          </p:cTn>
-                        </p:par>
-                      </p:childTnLst>
-                    </p:cTn>
-                  </p:par>
                 </p:childTnLst>
               </p:cTn>
               <p:prevCondLst>
@@ -42680,105 +43750,6 @@
                       </p:childTnLst>
                     </p:cTn>
                   </p:par>
-                  <p:par>
-                    <p:cTn id="10" fill="hold">
-                      <p:stCondLst>
-                        <p:cond delay="indefinite"/>
-                      </p:stCondLst>
-                      <p:childTnLst>
-                        <p:par>
-                          <p:cTn id="11" fill="hold">
-                            <p:stCondLst>
-                              <p:cond delay="0"/>
-                            </p:stCondLst>
-                            <p:childTnLst>
-                              <p:par>
-                                <p:cTn id="12" presetID="53" presetClass="exit" presetSubtype="32" fill="hold" nodeType="clickEffect">
-                                  <p:stCondLst>
-                                    <p:cond delay="0"/>
-                                  </p:stCondLst>
-                                  <p:childTnLst>
-                                    <p:anim calcmode="lin" valueType="num">
-                                      <p:cBhvr>
-                                        <p:cTn id="13" dur="500"/>
-                                        <p:tgtEl>
-                                          <p:spTgt spid="9"/>
-                                        </p:tgtEl>
-                                        <p:attrNameLst>
-                                          <p:attrName>ppt_w</p:attrName>
-                                        </p:attrNameLst>
-                                      </p:cBhvr>
-                                      <p:tavLst>
-                                        <p:tav tm="0">
-                                          <p:val>
-                                            <p:strVal val="ppt_w"/>
-                                          </p:val>
-                                        </p:tav>
-                                        <p:tav tm="100000">
-                                          <p:val>
-                                            <p:fltVal val="0"/>
-                                          </p:val>
-                                        </p:tav>
-                                      </p:tavLst>
-                                    </p:anim>
-                                    <p:anim calcmode="lin" valueType="num">
-                                      <p:cBhvr>
-                                        <p:cTn id="14" dur="500"/>
-                                        <p:tgtEl>
-                                          <p:spTgt spid="9"/>
-                                        </p:tgtEl>
-                                        <p:attrNameLst>
-                                          <p:attrName>ppt_h</p:attrName>
-                                        </p:attrNameLst>
-                                      </p:cBhvr>
-                                      <p:tavLst>
-                                        <p:tav tm="0">
-                                          <p:val>
-                                            <p:strVal val="ppt_h"/>
-                                          </p:val>
-                                        </p:tav>
-                                        <p:tav tm="100000">
-                                          <p:val>
-                                            <p:fltVal val="0"/>
-                                          </p:val>
-                                        </p:tav>
-                                      </p:tavLst>
-                                    </p:anim>
-                                    <p:animEffect transition="out" filter="fade">
-                                      <p:cBhvr>
-                                        <p:cTn id="15" dur="500"/>
-                                        <p:tgtEl>
-                                          <p:spTgt spid="9"/>
-                                        </p:tgtEl>
-                                      </p:cBhvr>
-                                    </p:animEffect>
-                                    <p:set>
-                                      <p:cBhvr>
-                                        <p:cTn id="16" dur="1" fill="hold">
-                                          <p:stCondLst>
-                                            <p:cond delay="499"/>
-                                          </p:stCondLst>
-                                        </p:cTn>
-                                        <p:tgtEl>
-                                          <p:spTgt spid="9"/>
-                                        </p:tgtEl>
-                                        <p:attrNameLst>
-                                          <p:attrName>style.visibility</p:attrName>
-                                        </p:attrNameLst>
-                                      </p:cBhvr>
-                                      <p:to>
-                                        <p:strVal val="hidden"/>
-                                      </p:to>
-                                    </p:set>
-                                  </p:childTnLst>
-                                </p:cTn>
-                              </p:par>
-                            </p:childTnLst>
-                          </p:cTn>
-                        </p:par>
-                      </p:childTnLst>
-                    </p:cTn>
-                  </p:par>
                 </p:childTnLst>
               </p:cTn>
               <p:prevCondLst>
@@ -43614,105 +44585,6 @@
                                         </p:tgtEl>
                                       </p:cBhvr>
                                     </p:animEffect>
-                                  </p:childTnLst>
-                                </p:cTn>
-                              </p:par>
-                            </p:childTnLst>
-                          </p:cTn>
-                        </p:par>
-                      </p:childTnLst>
-                    </p:cTn>
-                  </p:par>
-                  <p:par>
-                    <p:cTn id="10" fill="hold">
-                      <p:stCondLst>
-                        <p:cond delay="indefinite"/>
-                      </p:stCondLst>
-                      <p:childTnLst>
-                        <p:par>
-                          <p:cTn id="11" fill="hold">
-                            <p:stCondLst>
-                              <p:cond delay="0"/>
-                            </p:stCondLst>
-                            <p:childTnLst>
-                              <p:par>
-                                <p:cTn id="12" presetID="53" presetClass="exit" presetSubtype="32" fill="hold" nodeType="clickEffect">
-                                  <p:stCondLst>
-                                    <p:cond delay="0"/>
-                                  </p:stCondLst>
-                                  <p:childTnLst>
-                                    <p:anim calcmode="lin" valueType="num">
-                                      <p:cBhvr>
-                                        <p:cTn id="13" dur="500"/>
-                                        <p:tgtEl>
-                                          <p:spTgt spid="4"/>
-                                        </p:tgtEl>
-                                        <p:attrNameLst>
-                                          <p:attrName>ppt_w</p:attrName>
-                                        </p:attrNameLst>
-                                      </p:cBhvr>
-                                      <p:tavLst>
-                                        <p:tav tm="0">
-                                          <p:val>
-                                            <p:strVal val="ppt_w"/>
-                                          </p:val>
-                                        </p:tav>
-                                        <p:tav tm="100000">
-                                          <p:val>
-                                            <p:fltVal val="0"/>
-                                          </p:val>
-                                        </p:tav>
-                                      </p:tavLst>
-                                    </p:anim>
-                                    <p:anim calcmode="lin" valueType="num">
-                                      <p:cBhvr>
-                                        <p:cTn id="14" dur="500"/>
-                                        <p:tgtEl>
-                                          <p:spTgt spid="4"/>
-                                        </p:tgtEl>
-                                        <p:attrNameLst>
-                                          <p:attrName>ppt_h</p:attrName>
-                                        </p:attrNameLst>
-                                      </p:cBhvr>
-                                      <p:tavLst>
-                                        <p:tav tm="0">
-                                          <p:val>
-                                            <p:strVal val="ppt_h"/>
-                                          </p:val>
-                                        </p:tav>
-                                        <p:tav tm="100000">
-                                          <p:val>
-                                            <p:fltVal val="0"/>
-                                          </p:val>
-                                        </p:tav>
-                                      </p:tavLst>
-                                    </p:anim>
-                                    <p:animEffect transition="out" filter="fade">
-                                      <p:cBhvr>
-                                        <p:cTn id="15" dur="500"/>
-                                        <p:tgtEl>
-                                          <p:spTgt spid="4"/>
-                                        </p:tgtEl>
-                                      </p:cBhvr>
-                                    </p:animEffect>
-                                    <p:set>
-                                      <p:cBhvr>
-                                        <p:cTn id="16" dur="1" fill="hold">
-                                          <p:stCondLst>
-                                            <p:cond delay="499"/>
-                                          </p:stCondLst>
-                                        </p:cTn>
-                                        <p:tgtEl>
-                                          <p:spTgt spid="4"/>
-                                        </p:tgtEl>
-                                        <p:attrNameLst>
-                                          <p:attrName>style.visibility</p:attrName>
-                                        </p:attrNameLst>
-                                      </p:cBhvr>
-                                      <p:to>
-                                        <p:strVal val="hidden"/>
-                                      </p:to>
-                                    </p:set>
                                   </p:childTnLst>
                                 </p:cTn>
                               </p:par>
@@ -44567,105 +45439,6 @@
                       </p:childTnLst>
                     </p:cTn>
                   </p:par>
-                  <p:par>
-                    <p:cTn id="10" fill="hold">
-                      <p:stCondLst>
-                        <p:cond delay="indefinite"/>
-                      </p:stCondLst>
-                      <p:childTnLst>
-                        <p:par>
-                          <p:cTn id="11" fill="hold">
-                            <p:stCondLst>
-                              <p:cond delay="0"/>
-                            </p:stCondLst>
-                            <p:childTnLst>
-                              <p:par>
-                                <p:cTn id="12" presetID="53" presetClass="exit" presetSubtype="32" fill="hold" nodeType="clickEffect">
-                                  <p:stCondLst>
-                                    <p:cond delay="0"/>
-                                  </p:stCondLst>
-                                  <p:childTnLst>
-                                    <p:anim calcmode="lin" valueType="num">
-                                      <p:cBhvr>
-                                        <p:cTn id="13" dur="500"/>
-                                        <p:tgtEl>
-                                          <p:spTgt spid="4"/>
-                                        </p:tgtEl>
-                                        <p:attrNameLst>
-                                          <p:attrName>ppt_w</p:attrName>
-                                        </p:attrNameLst>
-                                      </p:cBhvr>
-                                      <p:tavLst>
-                                        <p:tav tm="0">
-                                          <p:val>
-                                            <p:strVal val="ppt_w"/>
-                                          </p:val>
-                                        </p:tav>
-                                        <p:tav tm="100000">
-                                          <p:val>
-                                            <p:fltVal val="0"/>
-                                          </p:val>
-                                        </p:tav>
-                                      </p:tavLst>
-                                    </p:anim>
-                                    <p:anim calcmode="lin" valueType="num">
-                                      <p:cBhvr>
-                                        <p:cTn id="14" dur="500"/>
-                                        <p:tgtEl>
-                                          <p:spTgt spid="4"/>
-                                        </p:tgtEl>
-                                        <p:attrNameLst>
-                                          <p:attrName>ppt_h</p:attrName>
-                                        </p:attrNameLst>
-                                      </p:cBhvr>
-                                      <p:tavLst>
-                                        <p:tav tm="0">
-                                          <p:val>
-                                            <p:strVal val="ppt_h"/>
-                                          </p:val>
-                                        </p:tav>
-                                        <p:tav tm="100000">
-                                          <p:val>
-                                            <p:fltVal val="0"/>
-                                          </p:val>
-                                        </p:tav>
-                                      </p:tavLst>
-                                    </p:anim>
-                                    <p:animEffect transition="out" filter="fade">
-                                      <p:cBhvr>
-                                        <p:cTn id="15" dur="500"/>
-                                        <p:tgtEl>
-                                          <p:spTgt spid="4"/>
-                                        </p:tgtEl>
-                                      </p:cBhvr>
-                                    </p:animEffect>
-                                    <p:set>
-                                      <p:cBhvr>
-                                        <p:cTn id="16" dur="1" fill="hold">
-                                          <p:stCondLst>
-                                            <p:cond delay="499"/>
-                                          </p:stCondLst>
-                                        </p:cTn>
-                                        <p:tgtEl>
-                                          <p:spTgt spid="4"/>
-                                        </p:tgtEl>
-                                        <p:attrNameLst>
-                                          <p:attrName>style.visibility</p:attrName>
-                                        </p:attrNameLst>
-                                      </p:cBhvr>
-                                      <p:to>
-                                        <p:strVal val="hidden"/>
-                                      </p:to>
-                                    </p:set>
-                                  </p:childTnLst>
-                                </p:cTn>
-                              </p:par>
-                            </p:childTnLst>
-                          </p:cTn>
-                        </p:par>
-                      </p:childTnLst>
-                    </p:cTn>
-                  </p:par>
                 </p:childTnLst>
               </p:cTn>
               <p:prevCondLst>

</xml_diff>

<commit_message>
atualização ppt e doc layout
</commit_message>
<xml_diff>
--- a/Documentação/Apresentação - Sprint 3.pptx
+++ b/Documentação/Apresentação - Sprint 3.pptx
@@ -40899,147 +40899,125 @@
           </a:p>
         </p:txBody>
       </p:sp>
-      <p:grpSp>
-        <p:nvGrpSpPr>
-          <p:cNvPr id="5" name="Agrupar 4">
+      <p:pic>
+        <p:nvPicPr>
+          <p:cNvPr id="22" name="Imagem 21">
             <a:extLst>
               <a:ext uri="{FF2B5EF4-FFF2-40B4-BE49-F238E27FC236}">
-                <a16:creationId xmlns:a16="http://schemas.microsoft.com/office/drawing/2014/main" id="{47A4E389-A66A-4606-888E-8E12D8DD919F}"/>
+                <a16:creationId xmlns:a16="http://schemas.microsoft.com/office/drawing/2014/main" id="{8D54C705-47F9-4144-8360-13503B9AABC4}"/>
               </a:ext>
             </a:extLst>
           </p:cNvPr>
-          <p:cNvGrpSpPr/>
+          <p:cNvPicPr>
+            <a:picLocks noChangeAspect="1"/>
+          </p:cNvPicPr>
           <p:nvPr/>
-        </p:nvGrpSpPr>
-        <p:grpSpPr>
+        </p:nvPicPr>
+        <p:blipFill>
+          <a:blip r:embed="rId2"/>
+          <a:stretch>
+            <a:fillRect/>
+          </a:stretch>
+        </p:blipFill>
+        <p:spPr>
+          <a:xfrm rot="5400000">
+            <a:off x="4840172" y="1414463"/>
+            <a:ext cx="6858002" cy="4029075"/>
+          </a:xfrm>
+          <a:prstGeom prst="rect">
+            <a:avLst/>
+          </a:prstGeom>
+        </p:spPr>
+      </p:pic>
+      <p:pic>
+        <p:nvPicPr>
+          <p:cNvPr id="3" name="Imagem 2">
+            <a:extLst>
+              <a:ext uri="{FF2B5EF4-FFF2-40B4-BE49-F238E27FC236}">
+                <a16:creationId xmlns:a16="http://schemas.microsoft.com/office/drawing/2014/main" id="{E91721DD-3F2F-47D3-8A41-B71058F31CAD}"/>
+              </a:ext>
+            </a:extLst>
+          </p:cNvPr>
+          <p:cNvPicPr>
+            <a:picLocks noChangeAspect="1"/>
+          </p:cNvPicPr>
+          <p:nvPr/>
+        </p:nvPicPr>
+        <p:blipFill rotWithShape="1">
+          <a:blip r:embed="rId3"/>
+          <a:srcRect l="1618" t="2521" r="2076" b="2931"/>
+          <a:stretch/>
+        </p:blipFill>
+        <p:spPr>
           <a:xfrm>
-            <a:off x="6254635" y="0"/>
-            <a:ext cx="4029075" cy="6858002"/>
-            <a:chOff x="6867524" y="-2"/>
-            <a:chExt cx="4029075" cy="6858002"/>
+            <a:off x="6678372" y="192930"/>
+            <a:ext cx="3188137" cy="2048400"/>
           </a:xfrm>
-        </p:grpSpPr>
-        <p:pic>
-          <p:nvPicPr>
-            <p:cNvPr id="22" name="Imagem 21">
-              <a:extLst>
-                <a:ext uri="{FF2B5EF4-FFF2-40B4-BE49-F238E27FC236}">
-                  <a16:creationId xmlns:a16="http://schemas.microsoft.com/office/drawing/2014/main" id="{8D54C705-47F9-4144-8360-13503B9AABC4}"/>
-                </a:ext>
-              </a:extLst>
-            </p:cNvPr>
-            <p:cNvPicPr>
-              <a:picLocks noChangeAspect="1"/>
-            </p:cNvPicPr>
-            <p:nvPr/>
-          </p:nvPicPr>
-          <p:blipFill>
-            <a:blip r:embed="rId2"/>
-            <a:stretch>
-              <a:fillRect/>
-            </a:stretch>
-          </p:blipFill>
-          <p:spPr>
-            <a:xfrm rot="5400000">
-              <a:off x="5453061" y="1414461"/>
-              <a:ext cx="6858002" cy="4029075"/>
-            </a:xfrm>
-            <a:prstGeom prst="rect">
-              <a:avLst/>
-            </a:prstGeom>
-          </p:spPr>
-        </p:pic>
-        <p:pic>
-          <p:nvPicPr>
-            <p:cNvPr id="23" name="Imagem 22" descr="Tela de celular com texto preto sobre fundo branco&#10;&#10;Descrição gerada automaticamente">
-              <a:extLst>
-                <a:ext uri="{FF2B5EF4-FFF2-40B4-BE49-F238E27FC236}">
-                  <a16:creationId xmlns:a16="http://schemas.microsoft.com/office/drawing/2014/main" id="{5A516734-AEA0-4764-B0B6-A4E4D46DFBF7}"/>
-                </a:ext>
-              </a:extLst>
-            </p:cNvPr>
-            <p:cNvPicPr>
-              <a:picLocks noChangeAspect="1"/>
-            </p:cNvPicPr>
-            <p:nvPr/>
-          </p:nvPicPr>
-          <p:blipFill>
-            <a:blip r:embed="rId3"/>
-            <a:stretch>
-              <a:fillRect/>
-            </a:stretch>
-          </p:blipFill>
-          <p:spPr>
-            <a:xfrm>
-              <a:off x="7260144" y="225003"/>
-              <a:ext cx="3248507" cy="1963902"/>
-            </a:xfrm>
-            <a:prstGeom prst="rect">
-              <a:avLst/>
-            </a:prstGeom>
-          </p:spPr>
-        </p:pic>
-        <p:pic>
-          <p:nvPicPr>
-            <p:cNvPr id="24" name="Imagem 23" descr="Tela de celular com texto preto sobre fundo branco&#10;&#10;Descrição gerada automaticamente">
-              <a:extLst>
-                <a:ext uri="{FF2B5EF4-FFF2-40B4-BE49-F238E27FC236}">
-                  <a16:creationId xmlns:a16="http://schemas.microsoft.com/office/drawing/2014/main" id="{D36C2A91-41AB-42D7-B966-BD1F43686DCE}"/>
-                </a:ext>
-              </a:extLst>
-            </p:cNvPr>
-            <p:cNvPicPr>
-              <a:picLocks noChangeAspect="1"/>
-            </p:cNvPicPr>
-            <p:nvPr/>
-          </p:nvPicPr>
-          <p:blipFill>
-            <a:blip r:embed="rId4"/>
-            <a:stretch>
-              <a:fillRect/>
-            </a:stretch>
-          </p:blipFill>
-          <p:spPr>
-            <a:xfrm>
-              <a:off x="7260144" y="2548488"/>
-              <a:ext cx="3248507" cy="1761019"/>
-            </a:xfrm>
-            <a:prstGeom prst="rect">
-              <a:avLst/>
-            </a:prstGeom>
-          </p:spPr>
-        </p:pic>
-        <p:pic>
-          <p:nvPicPr>
-            <p:cNvPr id="25" name="Imagem 24" descr="Tela de celular com texto preto sobre fundo branco&#10;&#10;Descrição gerada automaticamente">
-              <a:extLst>
-                <a:ext uri="{FF2B5EF4-FFF2-40B4-BE49-F238E27FC236}">
-                  <a16:creationId xmlns:a16="http://schemas.microsoft.com/office/drawing/2014/main" id="{092F571E-673D-4044-9922-F99EF299C1E8}"/>
-                </a:ext>
-              </a:extLst>
-            </p:cNvPr>
-            <p:cNvPicPr>
-              <a:picLocks noChangeAspect="1"/>
-            </p:cNvPicPr>
-            <p:nvPr/>
-          </p:nvPicPr>
-          <p:blipFill>
-            <a:blip r:embed="rId5"/>
-            <a:stretch>
-              <a:fillRect/>
-            </a:stretch>
-          </p:blipFill>
-          <p:spPr>
-            <a:xfrm>
-              <a:off x="7260144" y="5044169"/>
-              <a:ext cx="3248507" cy="933259"/>
-            </a:xfrm>
-            <a:prstGeom prst="rect">
-              <a:avLst/>
-            </a:prstGeom>
-          </p:spPr>
-        </p:pic>
-      </p:grpSp>
+          <a:prstGeom prst="rect">
+            <a:avLst/>
+          </a:prstGeom>
+        </p:spPr>
+      </p:pic>
+      <p:pic>
+        <p:nvPicPr>
+          <p:cNvPr id="4" name="Imagem 3">
+            <a:extLst>
+              <a:ext uri="{FF2B5EF4-FFF2-40B4-BE49-F238E27FC236}">
+                <a16:creationId xmlns:a16="http://schemas.microsoft.com/office/drawing/2014/main" id="{6E4BBC4B-E559-4BBA-8E82-D5E7BA9E396C}"/>
+              </a:ext>
+            </a:extLst>
+          </p:cNvPr>
+          <p:cNvPicPr>
+            <a:picLocks noChangeAspect="1"/>
+          </p:cNvPicPr>
+          <p:nvPr/>
+        </p:nvPicPr>
+        <p:blipFill>
+          <a:blip r:embed="rId4"/>
+          <a:stretch>
+            <a:fillRect/>
+          </a:stretch>
+        </p:blipFill>
+        <p:spPr>
+          <a:xfrm>
+            <a:off x="6725642" y="2412814"/>
+            <a:ext cx="3110818" cy="2051909"/>
+          </a:xfrm>
+          <a:prstGeom prst="rect">
+            <a:avLst/>
+          </a:prstGeom>
+        </p:spPr>
+      </p:pic>
+      <p:pic>
+        <p:nvPicPr>
+          <p:cNvPr id="6" name="Imagem 5">
+            <a:extLst>
+              <a:ext uri="{FF2B5EF4-FFF2-40B4-BE49-F238E27FC236}">
+                <a16:creationId xmlns:a16="http://schemas.microsoft.com/office/drawing/2014/main" id="{8105FA74-839F-4C19-9099-6415694751CE}"/>
+              </a:ext>
+            </a:extLst>
+          </p:cNvPr>
+          <p:cNvPicPr>
+            <a:picLocks noChangeAspect="1"/>
+          </p:cNvPicPr>
+          <p:nvPr/>
+        </p:nvPicPr>
+        <p:blipFill>
+          <a:blip r:embed="rId5"/>
+          <a:stretch>
+            <a:fillRect/>
+          </a:stretch>
+        </p:blipFill>
+        <p:spPr>
+          <a:xfrm>
+            <a:off x="6773493" y="5156011"/>
+            <a:ext cx="3015116" cy="1010701"/>
+          </a:xfrm>
+          <a:prstGeom prst="rect">
+            <a:avLst/>
+          </a:prstGeom>
+        </p:spPr>
+      </p:pic>
     </p:spTree>
     <p:extLst>
       <p:ext uri="{BB962C8B-B14F-4D97-AF65-F5344CB8AC3E}">
@@ -41050,237 +41028,6 @@
   <p:clrMapOvr>
     <a:masterClrMapping/>
   </p:clrMapOvr>
-  <p:timing>
-    <p:tnLst>
-      <p:par>
-        <p:cTn id="1" dur="indefinite" restart="never" nodeType="tmRoot">
-          <p:childTnLst>
-            <p:seq concurrent="1" nextAc="seek">
-              <p:cTn id="2" dur="indefinite" nodeType="mainSeq">
-                <p:childTnLst>
-                  <p:par>
-                    <p:cTn id="3" fill="hold">
-                      <p:stCondLst>
-                        <p:cond delay="indefinite"/>
-                        <p:cond evt="onBegin" delay="0">
-                          <p:tn val="2"/>
-                        </p:cond>
-                      </p:stCondLst>
-                      <p:childTnLst>
-                        <p:par>
-                          <p:cTn id="4" fill="hold">
-                            <p:stCondLst>
-                              <p:cond delay="0"/>
-                            </p:stCondLst>
-                            <p:childTnLst>
-                              <p:par>
-                                <p:cTn id="5" presetID="53" presetClass="entr" presetSubtype="16" fill="hold" nodeType="withEffect">
-                                  <p:stCondLst>
-                                    <p:cond delay="0"/>
-                                  </p:stCondLst>
-                                  <p:childTnLst>
-                                    <p:set>
-                                      <p:cBhvr>
-                                        <p:cTn id="6" dur="1" fill="hold">
-                                          <p:stCondLst>
-                                            <p:cond delay="0"/>
-                                          </p:stCondLst>
-                                        </p:cTn>
-                                        <p:tgtEl>
-                                          <p:spTgt spid="5"/>
-                                        </p:tgtEl>
-                                        <p:attrNameLst>
-                                          <p:attrName>style.visibility</p:attrName>
-                                        </p:attrNameLst>
-                                      </p:cBhvr>
-                                      <p:to>
-                                        <p:strVal val="visible"/>
-                                      </p:to>
-                                    </p:set>
-                                    <p:anim calcmode="lin" valueType="num">
-                                      <p:cBhvr>
-                                        <p:cTn id="7" dur="500" fill="hold"/>
-                                        <p:tgtEl>
-                                          <p:spTgt spid="5"/>
-                                        </p:tgtEl>
-                                        <p:attrNameLst>
-                                          <p:attrName>ppt_w</p:attrName>
-                                        </p:attrNameLst>
-                                      </p:cBhvr>
-                                      <p:tavLst>
-                                        <p:tav tm="0">
-                                          <p:val>
-                                            <p:fltVal val="0"/>
-                                          </p:val>
-                                        </p:tav>
-                                        <p:tav tm="100000">
-                                          <p:val>
-                                            <p:strVal val="#ppt_w"/>
-                                          </p:val>
-                                        </p:tav>
-                                      </p:tavLst>
-                                    </p:anim>
-                                    <p:anim calcmode="lin" valueType="num">
-                                      <p:cBhvr>
-                                        <p:cTn id="8" dur="500" fill="hold"/>
-                                        <p:tgtEl>
-                                          <p:spTgt spid="5"/>
-                                        </p:tgtEl>
-                                        <p:attrNameLst>
-                                          <p:attrName>ppt_h</p:attrName>
-                                        </p:attrNameLst>
-                                      </p:cBhvr>
-                                      <p:tavLst>
-                                        <p:tav tm="0">
-                                          <p:val>
-                                            <p:fltVal val="0"/>
-                                          </p:val>
-                                        </p:tav>
-                                        <p:tav tm="100000">
-                                          <p:val>
-                                            <p:strVal val="#ppt_h"/>
-                                          </p:val>
-                                        </p:tav>
-                                      </p:tavLst>
-                                    </p:anim>
-                                    <p:animEffect transition="in" filter="fade">
-                                      <p:cBhvr>
-                                        <p:cTn id="9" dur="500"/>
-                                        <p:tgtEl>
-                                          <p:spTgt spid="5"/>
-                                        </p:tgtEl>
-                                      </p:cBhvr>
-                                    </p:animEffect>
-                                  </p:childTnLst>
-                                </p:cTn>
-                              </p:par>
-                            </p:childTnLst>
-                          </p:cTn>
-                        </p:par>
-                      </p:childTnLst>
-                    </p:cTn>
-                  </p:par>
-                  <p:par>
-                    <p:cTn id="10" fill="hold">
-                      <p:stCondLst>
-                        <p:cond delay="indefinite"/>
-                      </p:stCondLst>
-                      <p:childTnLst>
-                        <p:par>
-                          <p:cTn id="11" fill="hold">
-                            <p:stCondLst>
-                              <p:cond delay="0"/>
-                            </p:stCondLst>
-                            <p:childTnLst>
-                              <p:par>
-                                <p:cTn id="12" presetID="53" presetClass="exit" presetSubtype="32" fill="hold" nodeType="clickEffect">
-                                  <p:stCondLst>
-                                    <p:cond delay="0"/>
-                                  </p:stCondLst>
-                                  <p:childTnLst>
-                                    <p:anim calcmode="lin" valueType="num">
-                                      <p:cBhvr>
-                                        <p:cTn id="13" dur="500"/>
-                                        <p:tgtEl>
-                                          <p:spTgt spid="5"/>
-                                        </p:tgtEl>
-                                        <p:attrNameLst>
-                                          <p:attrName>ppt_w</p:attrName>
-                                        </p:attrNameLst>
-                                      </p:cBhvr>
-                                      <p:tavLst>
-                                        <p:tav tm="0">
-                                          <p:val>
-                                            <p:strVal val="ppt_w"/>
-                                          </p:val>
-                                        </p:tav>
-                                        <p:tav tm="100000">
-                                          <p:val>
-                                            <p:fltVal val="0"/>
-                                          </p:val>
-                                        </p:tav>
-                                      </p:tavLst>
-                                    </p:anim>
-                                    <p:anim calcmode="lin" valueType="num">
-                                      <p:cBhvr>
-                                        <p:cTn id="14" dur="500"/>
-                                        <p:tgtEl>
-                                          <p:spTgt spid="5"/>
-                                        </p:tgtEl>
-                                        <p:attrNameLst>
-                                          <p:attrName>ppt_h</p:attrName>
-                                        </p:attrNameLst>
-                                      </p:cBhvr>
-                                      <p:tavLst>
-                                        <p:tav tm="0">
-                                          <p:val>
-                                            <p:strVal val="ppt_h"/>
-                                          </p:val>
-                                        </p:tav>
-                                        <p:tav tm="100000">
-                                          <p:val>
-                                            <p:fltVal val="0"/>
-                                          </p:val>
-                                        </p:tav>
-                                      </p:tavLst>
-                                    </p:anim>
-                                    <p:animEffect transition="out" filter="fade">
-                                      <p:cBhvr>
-                                        <p:cTn id="15" dur="500"/>
-                                        <p:tgtEl>
-                                          <p:spTgt spid="5"/>
-                                        </p:tgtEl>
-                                      </p:cBhvr>
-                                    </p:animEffect>
-                                    <p:set>
-                                      <p:cBhvr>
-                                        <p:cTn id="16" dur="1" fill="hold">
-                                          <p:stCondLst>
-                                            <p:cond delay="499"/>
-                                          </p:stCondLst>
-                                        </p:cTn>
-                                        <p:tgtEl>
-                                          <p:spTgt spid="5"/>
-                                        </p:tgtEl>
-                                        <p:attrNameLst>
-                                          <p:attrName>style.visibility</p:attrName>
-                                        </p:attrNameLst>
-                                      </p:cBhvr>
-                                      <p:to>
-                                        <p:strVal val="hidden"/>
-                                      </p:to>
-                                    </p:set>
-                                  </p:childTnLst>
-                                </p:cTn>
-                              </p:par>
-                            </p:childTnLst>
-                          </p:cTn>
-                        </p:par>
-                      </p:childTnLst>
-                    </p:cTn>
-                  </p:par>
-                </p:childTnLst>
-              </p:cTn>
-              <p:prevCondLst>
-                <p:cond evt="onPrev" delay="0">
-                  <p:tgtEl>
-                    <p:sldTgt/>
-                  </p:tgtEl>
-                </p:cond>
-              </p:prevCondLst>
-              <p:nextCondLst>
-                <p:cond evt="onNext" delay="0">
-                  <p:tgtEl>
-                    <p:sldTgt/>
-                  </p:tgtEl>
-                </p:cond>
-              </p:nextCondLst>
-            </p:seq>
-          </p:childTnLst>
-        </p:cTn>
-      </p:par>
-    </p:tnLst>
-  </p:timing>
 </p:sld>
 </file>
 

</xml_diff>